<commit_message>
Updates to Power Point
</commit_message>
<xml_diff>
--- a/PowerPoint/joint_talk_notes.pptx
+++ b/PowerPoint/joint_talk_notes.pptx
@@ -4,18 +4,26 @@
   <p:sldMasterIdLst>
     <p:sldMasterId id="2147483648" r:id="rId1"/>
   </p:sldMasterIdLst>
+  <p:notesMasterIdLst>
+    <p:notesMasterId r:id="rId18"/>
+  </p:notesMasterIdLst>
   <p:sldIdLst>
     <p:sldId id="256" r:id="rId2"/>
     <p:sldId id="257" r:id="rId3"/>
-    <p:sldId id="259" r:id="rId4"/>
-    <p:sldId id="260" r:id="rId5"/>
-    <p:sldId id="261" r:id="rId6"/>
-    <p:sldId id="258" r:id="rId7"/>
-    <p:sldId id="262" r:id="rId8"/>
-    <p:sldId id="263" r:id="rId9"/>
-    <p:sldId id="264" r:id="rId10"/>
-    <p:sldId id="265" r:id="rId11"/>
-    <p:sldId id="266" r:id="rId12"/>
+    <p:sldId id="270" r:id="rId4"/>
+    <p:sldId id="259" r:id="rId5"/>
+    <p:sldId id="260" r:id="rId6"/>
+    <p:sldId id="261" r:id="rId7"/>
+    <p:sldId id="267" r:id="rId8"/>
+    <p:sldId id="268" r:id="rId9"/>
+    <p:sldId id="269" r:id="rId10"/>
+    <p:sldId id="262" r:id="rId11"/>
+    <p:sldId id="263" r:id="rId12"/>
+    <p:sldId id="264" r:id="rId13"/>
+    <p:sldId id="265" r:id="rId14"/>
+    <p:sldId id="266" r:id="rId15"/>
+    <p:sldId id="271" r:id="rId16"/>
+    <p:sldId id="272" r:id="rId17"/>
   </p:sldIdLst>
   <p:sldSz cx="9144000" cy="6858000" type="screen4x3"/>
   <p:notesSz cx="6858000" cy="9144000"/>
@@ -117,6 +125,732 @@
 </p:presentation>
 </file>
 
+<file path=ppt/notesMasters/notesMaster1.xml><?xml version="1.0" encoding="utf-8"?>
+<p:notesMaster xmlns:a="http://schemas.openxmlformats.org/drawingml/2006/main" xmlns:r="http://schemas.openxmlformats.org/officeDocument/2006/relationships" xmlns:p="http://schemas.openxmlformats.org/presentationml/2006/main">
+  <p:cSld>
+    <p:bg>
+      <p:bgRef idx="1001">
+        <a:schemeClr val="bg1"/>
+      </p:bgRef>
+    </p:bg>
+    <p:spTree>
+      <p:nvGrpSpPr>
+        <p:cNvPr id="1" name=""/>
+        <p:cNvGrpSpPr/>
+        <p:nvPr/>
+      </p:nvGrpSpPr>
+      <p:grpSpPr>
+        <a:xfrm>
+          <a:off x="0" y="0"/>
+          <a:ext cx="0" cy="0"/>
+          <a:chOff x="0" y="0"/>
+          <a:chExt cx="0" cy="0"/>
+        </a:xfrm>
+      </p:grpSpPr>
+      <p:sp>
+        <p:nvSpPr>
+          <p:cNvPr id="2" name="Header Placeholder 1"/>
+          <p:cNvSpPr>
+            <a:spLocks noGrp="1"/>
+          </p:cNvSpPr>
+          <p:nvPr>
+            <p:ph type="hdr" sz="quarter"/>
+          </p:nvPr>
+        </p:nvSpPr>
+        <p:spPr>
+          <a:xfrm>
+            <a:off x="0" y="0"/>
+            <a:ext cx="2971800" cy="457200"/>
+          </a:xfrm>
+          <a:prstGeom prst="rect">
+            <a:avLst/>
+          </a:prstGeom>
+        </p:spPr>
+        <p:txBody>
+          <a:bodyPr vert="horz" lIns="91440" tIns="45720" rIns="91440" bIns="45720" rtlCol="0"/>
+          <a:lstStyle>
+            <a:lvl1pPr algn="l">
+              <a:defRPr sz="1200"/>
+            </a:lvl1pPr>
+          </a:lstStyle>
+          <a:p>
+            <a:endParaRPr lang="en-US"/>
+          </a:p>
+        </p:txBody>
+      </p:sp>
+      <p:sp>
+        <p:nvSpPr>
+          <p:cNvPr id="3" name="Date Placeholder 2"/>
+          <p:cNvSpPr>
+            <a:spLocks noGrp="1"/>
+          </p:cNvSpPr>
+          <p:nvPr>
+            <p:ph type="dt" idx="1"/>
+          </p:nvPr>
+        </p:nvSpPr>
+        <p:spPr>
+          <a:xfrm>
+            <a:off x="3884613" y="0"/>
+            <a:ext cx="2971800" cy="457200"/>
+          </a:xfrm>
+          <a:prstGeom prst="rect">
+            <a:avLst/>
+          </a:prstGeom>
+        </p:spPr>
+        <p:txBody>
+          <a:bodyPr vert="horz" lIns="91440" tIns="45720" rIns="91440" bIns="45720" rtlCol="0"/>
+          <a:lstStyle>
+            <a:lvl1pPr algn="r">
+              <a:defRPr sz="1200"/>
+            </a:lvl1pPr>
+          </a:lstStyle>
+          <a:p>
+            <a:fld id="{F0C7EA22-4F72-754E-8270-766357FB3B01}" type="datetimeFigureOut">
+              <a:rPr lang="en-US" smtClean="0"/>
+              <a:t>8/12/11</a:t>
+            </a:fld>
+            <a:endParaRPr lang="en-US"/>
+          </a:p>
+        </p:txBody>
+      </p:sp>
+      <p:sp>
+        <p:nvSpPr>
+          <p:cNvPr id="4" name="Slide Image Placeholder 3"/>
+          <p:cNvSpPr>
+            <a:spLocks noGrp="1" noRot="1" noChangeAspect="1"/>
+          </p:cNvSpPr>
+          <p:nvPr>
+            <p:ph type="sldImg" idx="2"/>
+          </p:nvPr>
+        </p:nvSpPr>
+        <p:spPr>
+          <a:xfrm>
+            <a:off x="1143000" y="685800"/>
+            <a:ext cx="4572000" cy="3429000"/>
+          </a:xfrm>
+          <a:prstGeom prst="rect">
+            <a:avLst/>
+          </a:prstGeom>
+          <a:noFill/>
+          <a:ln w="12700">
+            <a:solidFill>
+              <a:prstClr val="black"/>
+            </a:solidFill>
+          </a:ln>
+        </p:spPr>
+        <p:txBody>
+          <a:bodyPr vert="horz" lIns="91440" tIns="45720" rIns="91440" bIns="45720" rtlCol="0" anchor="ctr"/>
+          <a:lstStyle/>
+          <a:p>
+            <a:endParaRPr lang="en-US"/>
+          </a:p>
+        </p:txBody>
+      </p:sp>
+      <p:sp>
+        <p:nvSpPr>
+          <p:cNvPr id="5" name="Notes Placeholder 4"/>
+          <p:cNvSpPr>
+            <a:spLocks noGrp="1"/>
+          </p:cNvSpPr>
+          <p:nvPr>
+            <p:ph type="body" sz="quarter" idx="3"/>
+          </p:nvPr>
+        </p:nvSpPr>
+        <p:spPr>
+          <a:xfrm>
+            <a:off x="685800" y="4343400"/>
+            <a:ext cx="5486400" cy="4114800"/>
+          </a:xfrm>
+          <a:prstGeom prst="rect">
+            <a:avLst/>
+          </a:prstGeom>
+        </p:spPr>
+        <p:txBody>
+          <a:bodyPr vert="horz" lIns="91440" tIns="45720" rIns="91440" bIns="45720" rtlCol="0"/>
+          <a:lstStyle/>
+          <a:p>
+            <a:pPr lvl="0"/>
+            <a:r>
+              <a:rPr lang="en-US" smtClean="0"/>
+              <a:t>Click to edit Master text styles</a:t>
+            </a:r>
+          </a:p>
+          <a:p>
+            <a:pPr lvl="1"/>
+            <a:r>
+              <a:rPr lang="en-US" smtClean="0"/>
+              <a:t>Second level</a:t>
+            </a:r>
+          </a:p>
+          <a:p>
+            <a:pPr lvl="2"/>
+            <a:r>
+              <a:rPr lang="en-US" smtClean="0"/>
+              <a:t>Third level</a:t>
+            </a:r>
+          </a:p>
+          <a:p>
+            <a:pPr lvl="3"/>
+            <a:r>
+              <a:rPr lang="en-US" smtClean="0"/>
+              <a:t>Fourth level</a:t>
+            </a:r>
+          </a:p>
+          <a:p>
+            <a:pPr lvl="4"/>
+            <a:r>
+              <a:rPr lang="en-US" smtClean="0"/>
+              <a:t>Fifth level</a:t>
+            </a:r>
+            <a:endParaRPr lang="en-US"/>
+          </a:p>
+        </p:txBody>
+      </p:sp>
+      <p:sp>
+        <p:nvSpPr>
+          <p:cNvPr id="6" name="Footer Placeholder 5"/>
+          <p:cNvSpPr>
+            <a:spLocks noGrp="1"/>
+          </p:cNvSpPr>
+          <p:nvPr>
+            <p:ph type="ftr" sz="quarter" idx="4"/>
+          </p:nvPr>
+        </p:nvSpPr>
+        <p:spPr>
+          <a:xfrm>
+            <a:off x="0" y="8685213"/>
+            <a:ext cx="2971800" cy="457200"/>
+          </a:xfrm>
+          <a:prstGeom prst="rect">
+            <a:avLst/>
+          </a:prstGeom>
+        </p:spPr>
+        <p:txBody>
+          <a:bodyPr vert="horz" lIns="91440" tIns="45720" rIns="91440" bIns="45720" rtlCol="0" anchor="b"/>
+          <a:lstStyle>
+            <a:lvl1pPr algn="l">
+              <a:defRPr sz="1200"/>
+            </a:lvl1pPr>
+          </a:lstStyle>
+          <a:p>
+            <a:endParaRPr lang="en-US"/>
+          </a:p>
+        </p:txBody>
+      </p:sp>
+      <p:sp>
+        <p:nvSpPr>
+          <p:cNvPr id="7" name="Slide Number Placeholder 6"/>
+          <p:cNvSpPr>
+            <a:spLocks noGrp="1"/>
+          </p:cNvSpPr>
+          <p:nvPr>
+            <p:ph type="sldNum" sz="quarter" idx="5"/>
+          </p:nvPr>
+        </p:nvSpPr>
+        <p:spPr>
+          <a:xfrm>
+            <a:off x="3884613" y="8685213"/>
+            <a:ext cx="2971800" cy="457200"/>
+          </a:xfrm>
+          <a:prstGeom prst="rect">
+            <a:avLst/>
+          </a:prstGeom>
+        </p:spPr>
+        <p:txBody>
+          <a:bodyPr vert="horz" lIns="91440" tIns="45720" rIns="91440" bIns="45720" rtlCol="0" anchor="b"/>
+          <a:lstStyle>
+            <a:lvl1pPr algn="r">
+              <a:defRPr sz="1200"/>
+            </a:lvl1pPr>
+          </a:lstStyle>
+          <a:p>
+            <a:fld id="{2D6C2CB4-7DD0-0243-B916-C8D172714368}" type="slidenum">
+              <a:rPr lang="en-US" smtClean="0"/>
+              <a:t>‹#›</a:t>
+            </a:fld>
+            <a:endParaRPr lang="en-US"/>
+          </a:p>
+        </p:txBody>
+      </p:sp>
+    </p:spTree>
+    <p:extLst>
+      <p:ext uri="{BB962C8B-B14F-4D97-AF65-F5344CB8AC3E}">
+        <p14:creationId xmlns:p14="http://schemas.microsoft.com/office/powerpoint/2010/main" val="2105722964"/>
+      </p:ext>
+    </p:extLst>
+  </p:cSld>
+  <p:clrMap bg1="lt1" tx1="dk1" bg2="lt2" tx2="dk2" accent1="accent1" accent2="accent2" accent3="accent3" accent4="accent4" accent5="accent5" accent6="accent6" hlink="hlink" folHlink="folHlink"/>
+  <p:notesStyle>
+    <a:lvl1pPr marL="0" algn="l" defTabSz="457200" rtl="0" eaLnBrk="1" latinLnBrk="0" hangingPunct="1">
+      <a:defRPr sz="1200" kern="1200">
+        <a:solidFill>
+          <a:schemeClr val="tx1"/>
+        </a:solidFill>
+        <a:latin typeface="+mn-lt"/>
+        <a:ea typeface="+mn-ea"/>
+        <a:cs typeface="+mn-cs"/>
+      </a:defRPr>
+    </a:lvl1pPr>
+    <a:lvl2pPr marL="457200" algn="l" defTabSz="457200" rtl="0" eaLnBrk="1" latinLnBrk="0" hangingPunct="1">
+      <a:defRPr sz="1200" kern="1200">
+        <a:solidFill>
+          <a:schemeClr val="tx1"/>
+        </a:solidFill>
+        <a:latin typeface="+mn-lt"/>
+        <a:ea typeface="+mn-ea"/>
+        <a:cs typeface="+mn-cs"/>
+      </a:defRPr>
+    </a:lvl2pPr>
+    <a:lvl3pPr marL="914400" algn="l" defTabSz="457200" rtl="0" eaLnBrk="1" latinLnBrk="0" hangingPunct="1">
+      <a:defRPr sz="1200" kern="1200">
+        <a:solidFill>
+          <a:schemeClr val="tx1"/>
+        </a:solidFill>
+        <a:latin typeface="+mn-lt"/>
+        <a:ea typeface="+mn-ea"/>
+        <a:cs typeface="+mn-cs"/>
+      </a:defRPr>
+    </a:lvl3pPr>
+    <a:lvl4pPr marL="1371600" algn="l" defTabSz="457200" rtl="0" eaLnBrk="1" latinLnBrk="0" hangingPunct="1">
+      <a:defRPr sz="1200" kern="1200">
+        <a:solidFill>
+          <a:schemeClr val="tx1"/>
+        </a:solidFill>
+        <a:latin typeface="+mn-lt"/>
+        <a:ea typeface="+mn-ea"/>
+        <a:cs typeface="+mn-cs"/>
+      </a:defRPr>
+    </a:lvl4pPr>
+    <a:lvl5pPr marL="1828800" algn="l" defTabSz="457200" rtl="0" eaLnBrk="1" latinLnBrk="0" hangingPunct="1">
+      <a:defRPr sz="1200" kern="1200">
+        <a:solidFill>
+          <a:schemeClr val="tx1"/>
+        </a:solidFill>
+        <a:latin typeface="+mn-lt"/>
+        <a:ea typeface="+mn-ea"/>
+        <a:cs typeface="+mn-cs"/>
+      </a:defRPr>
+    </a:lvl5pPr>
+    <a:lvl6pPr marL="2286000" algn="l" defTabSz="457200" rtl="0" eaLnBrk="1" latinLnBrk="0" hangingPunct="1">
+      <a:defRPr sz="1200" kern="1200">
+        <a:solidFill>
+          <a:schemeClr val="tx1"/>
+        </a:solidFill>
+        <a:latin typeface="+mn-lt"/>
+        <a:ea typeface="+mn-ea"/>
+        <a:cs typeface="+mn-cs"/>
+      </a:defRPr>
+    </a:lvl6pPr>
+    <a:lvl7pPr marL="2743200" algn="l" defTabSz="457200" rtl="0" eaLnBrk="1" latinLnBrk="0" hangingPunct="1">
+      <a:defRPr sz="1200" kern="1200">
+        <a:solidFill>
+          <a:schemeClr val="tx1"/>
+        </a:solidFill>
+        <a:latin typeface="+mn-lt"/>
+        <a:ea typeface="+mn-ea"/>
+        <a:cs typeface="+mn-cs"/>
+      </a:defRPr>
+    </a:lvl7pPr>
+    <a:lvl8pPr marL="3200400" algn="l" defTabSz="457200" rtl="0" eaLnBrk="1" latinLnBrk="0" hangingPunct="1">
+      <a:defRPr sz="1200" kern="1200">
+        <a:solidFill>
+          <a:schemeClr val="tx1"/>
+        </a:solidFill>
+        <a:latin typeface="+mn-lt"/>
+        <a:ea typeface="+mn-ea"/>
+        <a:cs typeface="+mn-cs"/>
+      </a:defRPr>
+    </a:lvl8pPr>
+    <a:lvl9pPr marL="3657600" algn="l" defTabSz="457200" rtl="0" eaLnBrk="1" latinLnBrk="0" hangingPunct="1">
+      <a:defRPr sz="1200" kern="1200">
+        <a:solidFill>
+          <a:schemeClr val="tx1"/>
+        </a:solidFill>
+        <a:latin typeface="+mn-lt"/>
+        <a:ea typeface="+mn-ea"/>
+        <a:cs typeface="+mn-cs"/>
+      </a:defRPr>
+    </a:lvl9pPr>
+  </p:notesStyle>
+</p:notesMaster>
+</file>
+
+<file path=ppt/notesSlides/notesSlide1.xml><?xml version="1.0" encoding="utf-8"?>
+<p:notes xmlns:a="http://schemas.openxmlformats.org/drawingml/2006/main" xmlns:r="http://schemas.openxmlformats.org/officeDocument/2006/relationships" xmlns:p="http://schemas.openxmlformats.org/presentationml/2006/main">
+  <p:cSld>
+    <p:spTree>
+      <p:nvGrpSpPr>
+        <p:cNvPr id="1" name=""/>
+        <p:cNvGrpSpPr/>
+        <p:nvPr/>
+      </p:nvGrpSpPr>
+      <p:grpSpPr>
+        <a:xfrm>
+          <a:off x="0" y="0"/>
+          <a:ext cx="0" cy="0"/>
+          <a:chOff x="0" y="0"/>
+          <a:chExt cx="0" cy="0"/>
+        </a:xfrm>
+      </p:grpSpPr>
+      <p:sp>
+        <p:nvSpPr>
+          <p:cNvPr id="2" name="Slide Image Placeholder 1"/>
+          <p:cNvSpPr>
+            <a:spLocks noGrp="1" noRot="1" noChangeAspect="1"/>
+          </p:cNvSpPr>
+          <p:nvPr>
+            <p:ph type="sldImg"/>
+          </p:nvPr>
+        </p:nvSpPr>
+        <p:spPr/>
+      </p:sp>
+      <p:sp>
+        <p:nvSpPr>
+          <p:cNvPr id="3" name="Notes Placeholder 2"/>
+          <p:cNvSpPr>
+            <a:spLocks noGrp="1"/>
+          </p:cNvSpPr>
+          <p:nvPr>
+            <p:ph type="body" idx="1"/>
+          </p:nvPr>
+        </p:nvSpPr>
+        <p:spPr/>
+        <p:txBody>
+          <a:bodyPr/>
+          <a:lstStyle/>
+          <a:p>
+            <a:r>
+              <a:rPr lang="en-US" dirty="0" smtClean="0"/>
+              <a:t>Oh My GOSH there’s a lot in this diagram.  But that’s the point – a LOT has happened.</a:t>
+            </a:r>
+            <a:r>
+              <a:rPr lang="en-US" baseline="0" dirty="0" smtClean="0"/>
+              <a:t>  It’s tough to see it all in one glance…..</a:t>
+            </a:r>
+            <a:endParaRPr lang="en-US" dirty="0"/>
+          </a:p>
+        </p:txBody>
+      </p:sp>
+      <p:sp>
+        <p:nvSpPr>
+          <p:cNvPr id="4" name="Slide Number Placeholder 3"/>
+          <p:cNvSpPr>
+            <a:spLocks noGrp="1"/>
+          </p:cNvSpPr>
+          <p:nvPr>
+            <p:ph type="sldNum" sz="quarter" idx="10"/>
+          </p:nvPr>
+        </p:nvSpPr>
+        <p:spPr/>
+        <p:txBody>
+          <a:bodyPr/>
+          <a:lstStyle/>
+          <a:p>
+            <a:fld id="{2D6C2CB4-7DD0-0243-B916-C8D172714368}" type="slidenum">
+              <a:rPr lang="en-US" smtClean="0"/>
+              <a:t>3</a:t>
+            </a:fld>
+            <a:endParaRPr lang="en-US"/>
+          </a:p>
+        </p:txBody>
+      </p:sp>
+    </p:spTree>
+    <p:extLst>
+      <p:ext uri="{BB962C8B-B14F-4D97-AF65-F5344CB8AC3E}">
+        <p14:creationId xmlns:p14="http://schemas.microsoft.com/office/powerpoint/2010/main" val="3260168071"/>
+      </p:ext>
+    </p:extLst>
+  </p:cSld>
+  <p:clrMapOvr>
+    <a:masterClrMapping/>
+  </p:clrMapOvr>
+</p:notes>
+</file>
+
+<file path=ppt/notesSlides/notesSlide2.xml><?xml version="1.0" encoding="utf-8"?>
+<p:notes xmlns:a="http://schemas.openxmlformats.org/drawingml/2006/main" xmlns:r="http://schemas.openxmlformats.org/officeDocument/2006/relationships" xmlns:p="http://schemas.openxmlformats.org/presentationml/2006/main">
+  <p:cSld>
+    <p:spTree>
+      <p:nvGrpSpPr>
+        <p:cNvPr id="1" name=""/>
+        <p:cNvGrpSpPr/>
+        <p:nvPr/>
+      </p:nvGrpSpPr>
+      <p:grpSpPr>
+        <a:xfrm>
+          <a:off x="0" y="0"/>
+          <a:ext cx="0" cy="0"/>
+          <a:chOff x="0" y="0"/>
+          <a:chExt cx="0" cy="0"/>
+        </a:xfrm>
+      </p:grpSpPr>
+      <p:sp>
+        <p:nvSpPr>
+          <p:cNvPr id="2" name="Slide Image Placeholder 1"/>
+          <p:cNvSpPr>
+            <a:spLocks noGrp="1" noRot="1" noChangeAspect="1"/>
+          </p:cNvSpPr>
+          <p:nvPr>
+            <p:ph type="sldImg"/>
+          </p:nvPr>
+        </p:nvSpPr>
+        <p:spPr/>
+      </p:sp>
+      <p:sp>
+        <p:nvSpPr>
+          <p:cNvPr id="3" name="Notes Placeholder 2"/>
+          <p:cNvSpPr>
+            <a:spLocks noGrp="1"/>
+          </p:cNvSpPr>
+          <p:nvPr>
+            <p:ph type="body" idx="1"/>
+          </p:nvPr>
+        </p:nvSpPr>
+        <p:spPr/>
+        <p:txBody>
+          <a:bodyPr/>
+          <a:lstStyle/>
+          <a:p>
+            <a:r>
+              <a:rPr lang="en-US" dirty="0" smtClean="0"/>
+              <a:t>Of course MS claims that Chakra is faster – cause they’ve sucked so bad up to this point.  But better runtimes in each browser raises overall water level for us.</a:t>
+            </a:r>
+            <a:endParaRPr lang="en-US" dirty="0"/>
+          </a:p>
+        </p:txBody>
+      </p:sp>
+      <p:sp>
+        <p:nvSpPr>
+          <p:cNvPr id="4" name="Slide Number Placeholder 3"/>
+          <p:cNvSpPr>
+            <a:spLocks noGrp="1"/>
+          </p:cNvSpPr>
+          <p:nvPr>
+            <p:ph type="sldNum" sz="quarter" idx="10"/>
+          </p:nvPr>
+        </p:nvSpPr>
+        <p:spPr/>
+        <p:txBody>
+          <a:bodyPr/>
+          <a:lstStyle/>
+          <a:p>
+            <a:fld id="{2D6C2CB4-7DD0-0243-B916-C8D172714368}" type="slidenum">
+              <a:rPr lang="en-US" smtClean="0"/>
+              <a:t>4</a:t>
+            </a:fld>
+            <a:endParaRPr lang="en-US"/>
+          </a:p>
+        </p:txBody>
+      </p:sp>
+    </p:spTree>
+    <p:extLst>
+      <p:ext uri="{BB962C8B-B14F-4D97-AF65-F5344CB8AC3E}">
+        <p14:creationId xmlns:p14="http://schemas.microsoft.com/office/powerpoint/2010/main" val="3962781486"/>
+      </p:ext>
+    </p:extLst>
+  </p:cSld>
+  <p:clrMapOvr>
+    <a:masterClrMapping/>
+  </p:clrMapOvr>
+</p:notes>
+</file>
+
+<file path=ppt/notesSlides/notesSlide3.xml><?xml version="1.0" encoding="utf-8"?>
+<p:notes xmlns:a="http://schemas.openxmlformats.org/drawingml/2006/main" xmlns:r="http://schemas.openxmlformats.org/officeDocument/2006/relationships" xmlns:p="http://schemas.openxmlformats.org/presentationml/2006/main">
+  <p:cSld>
+    <p:spTree>
+      <p:nvGrpSpPr>
+        <p:cNvPr id="1" name=""/>
+        <p:cNvGrpSpPr/>
+        <p:nvPr/>
+      </p:nvGrpSpPr>
+      <p:grpSpPr>
+        <a:xfrm>
+          <a:off x="0" y="0"/>
+          <a:ext cx="0" cy="0"/>
+          <a:chOff x="0" y="0"/>
+          <a:chExt cx="0" cy="0"/>
+        </a:xfrm>
+      </p:grpSpPr>
+      <p:sp>
+        <p:nvSpPr>
+          <p:cNvPr id="2" name="Slide Image Placeholder 1"/>
+          <p:cNvSpPr>
+            <a:spLocks noGrp="1" noRot="1" noChangeAspect="1"/>
+          </p:cNvSpPr>
+          <p:nvPr>
+            <p:ph type="sldImg"/>
+          </p:nvPr>
+        </p:nvSpPr>
+        <p:spPr/>
+      </p:sp>
+      <p:sp>
+        <p:nvSpPr>
+          <p:cNvPr id="3" name="Notes Placeholder 2"/>
+          <p:cNvSpPr>
+            <a:spLocks noGrp="1"/>
+          </p:cNvSpPr>
+          <p:nvPr>
+            <p:ph type="body" idx="1"/>
+          </p:nvPr>
+        </p:nvSpPr>
+        <p:spPr/>
+        <p:txBody>
+          <a:bodyPr/>
+          <a:lstStyle/>
+          <a:p>
+            <a:r>
+              <a:rPr lang="en-US" dirty="0" smtClean="0"/>
+              <a:t>Five years ago – would</a:t>
+            </a:r>
+            <a:r>
+              <a:rPr lang="en-US" baseline="0" dirty="0" smtClean="0"/>
+              <a:t> any of us imagined that “</a:t>
+            </a:r>
+            <a:r>
+              <a:rPr lang="en-US" baseline="0" dirty="0" err="1" smtClean="0"/>
+              <a:t>js</a:t>
+            </a:r>
+            <a:r>
+              <a:rPr lang="en-US" baseline="0" dirty="0" smtClean="0"/>
+              <a:t>” conferences would be sell outs?</a:t>
+            </a:r>
+            <a:endParaRPr lang="en-US" dirty="0"/>
+          </a:p>
+        </p:txBody>
+      </p:sp>
+      <p:sp>
+        <p:nvSpPr>
+          <p:cNvPr id="4" name="Slide Number Placeholder 3"/>
+          <p:cNvSpPr>
+            <a:spLocks noGrp="1"/>
+          </p:cNvSpPr>
+          <p:nvPr>
+            <p:ph type="sldNum" sz="quarter" idx="10"/>
+          </p:nvPr>
+        </p:nvSpPr>
+        <p:spPr/>
+        <p:txBody>
+          <a:bodyPr/>
+          <a:lstStyle/>
+          <a:p>
+            <a:fld id="{2D6C2CB4-7DD0-0243-B916-C8D172714368}" type="slidenum">
+              <a:rPr lang="en-US" smtClean="0"/>
+              <a:t>6</a:t>
+            </a:fld>
+            <a:endParaRPr lang="en-US"/>
+          </a:p>
+        </p:txBody>
+      </p:sp>
+    </p:spTree>
+    <p:extLst>
+      <p:ext uri="{BB962C8B-B14F-4D97-AF65-F5344CB8AC3E}">
+        <p14:creationId xmlns:p14="http://schemas.microsoft.com/office/powerpoint/2010/main" val="2501548639"/>
+      </p:ext>
+    </p:extLst>
+  </p:cSld>
+  <p:clrMapOvr>
+    <a:masterClrMapping/>
+  </p:clrMapOvr>
+</p:notes>
+</file>
+
+<file path=ppt/notesSlides/notesSlide4.xml><?xml version="1.0" encoding="utf-8"?>
+<p:notes xmlns:a="http://schemas.openxmlformats.org/drawingml/2006/main" xmlns:r="http://schemas.openxmlformats.org/officeDocument/2006/relationships" xmlns:p="http://schemas.openxmlformats.org/presentationml/2006/main">
+  <p:cSld>
+    <p:spTree>
+      <p:nvGrpSpPr>
+        <p:cNvPr id="1" name=""/>
+        <p:cNvGrpSpPr/>
+        <p:nvPr/>
+      </p:nvGrpSpPr>
+      <p:grpSpPr>
+        <a:xfrm>
+          <a:off x="0" y="0"/>
+          <a:ext cx="0" cy="0"/>
+          <a:chOff x="0" y="0"/>
+          <a:chExt cx="0" cy="0"/>
+        </a:xfrm>
+      </p:grpSpPr>
+      <p:sp>
+        <p:nvSpPr>
+          <p:cNvPr id="2" name="Slide Image Placeholder 1"/>
+          <p:cNvSpPr>
+            <a:spLocks noGrp="1" noRot="1" noChangeAspect="1"/>
+          </p:cNvSpPr>
+          <p:nvPr>
+            <p:ph type="sldImg"/>
+          </p:nvPr>
+        </p:nvSpPr>
+        <p:spPr/>
+      </p:sp>
+      <p:sp>
+        <p:nvSpPr>
+          <p:cNvPr id="3" name="Notes Placeholder 2"/>
+          <p:cNvSpPr>
+            <a:spLocks noGrp="1"/>
+          </p:cNvSpPr>
+          <p:nvPr>
+            <p:ph type="body" idx="1"/>
+          </p:nvPr>
+        </p:nvSpPr>
+        <p:spPr/>
+        <p:txBody>
+          <a:bodyPr/>
+          <a:lstStyle/>
+          <a:p>
+            <a:r>
+              <a:rPr lang="en-US" dirty="0" smtClean="0"/>
+              <a:t>Might mention </a:t>
+            </a:r>
+            <a:r>
+              <a:rPr lang="en-US" dirty="0" err="1" smtClean="0"/>
+              <a:t>PouchDB</a:t>
+            </a:r>
+            <a:r>
+              <a:rPr lang="en-US" dirty="0" smtClean="0"/>
+              <a:t> and the possibilities it brings up</a:t>
+            </a:r>
+            <a:endParaRPr lang="en-US" dirty="0"/>
+          </a:p>
+        </p:txBody>
+      </p:sp>
+      <p:sp>
+        <p:nvSpPr>
+          <p:cNvPr id="4" name="Slide Number Placeholder 3"/>
+          <p:cNvSpPr>
+            <a:spLocks noGrp="1"/>
+          </p:cNvSpPr>
+          <p:nvPr>
+            <p:ph type="sldNum" sz="quarter" idx="10"/>
+          </p:nvPr>
+        </p:nvSpPr>
+        <p:spPr/>
+        <p:txBody>
+          <a:bodyPr/>
+          <a:lstStyle/>
+          <a:p>
+            <a:fld id="{2D6C2CB4-7DD0-0243-B916-C8D172714368}" type="slidenum">
+              <a:rPr lang="en-US" smtClean="0"/>
+              <a:t>7</a:t>
+            </a:fld>
+            <a:endParaRPr lang="en-US"/>
+          </a:p>
+        </p:txBody>
+      </p:sp>
+    </p:spTree>
+    <p:extLst>
+      <p:ext uri="{BB962C8B-B14F-4D97-AF65-F5344CB8AC3E}">
+        <p14:creationId xmlns:p14="http://schemas.microsoft.com/office/powerpoint/2010/main" val="1719812803"/>
+      </p:ext>
+    </p:extLst>
+  </p:cSld>
+  <p:clrMapOvr>
+    <a:masterClrMapping/>
+  </p:clrMapOvr>
+</p:notes>
+</file>
+
 <file path=ppt/slideLayouts/slideLayout1.xml><?xml version="1.0" encoding="utf-8"?>
 <p:sldLayout xmlns:a="http://schemas.openxmlformats.org/drawingml/2006/main" xmlns:r="http://schemas.openxmlformats.org/officeDocument/2006/relationships" xmlns:p="http://schemas.openxmlformats.org/presentationml/2006/main" type="title" preserve="1">
   <p:cSld name="Title Slide">
@@ -298,7 +1032,7 @@
           <a:p>
             <a:fld id="{47A2725F-F1FC-464A-BBE8-94773344B8ED}" type="datetimeFigureOut">
               <a:rPr lang="en-US" smtClean="0"/>
-              <a:t>8/9/11</a:t>
+              <a:t>8/12/11</a:t>
             </a:fld>
             <a:endParaRPr lang="en-US"/>
           </a:p>
@@ -468,7 +1202,7 @@
           <a:p>
             <a:fld id="{47A2725F-F1FC-464A-BBE8-94773344B8ED}" type="datetimeFigureOut">
               <a:rPr lang="en-US" smtClean="0"/>
-              <a:t>8/9/11</a:t>
+              <a:t>8/12/11</a:t>
             </a:fld>
             <a:endParaRPr lang="en-US"/>
           </a:p>
@@ -648,7 +1382,7 @@
           <a:p>
             <a:fld id="{47A2725F-F1FC-464A-BBE8-94773344B8ED}" type="datetimeFigureOut">
               <a:rPr lang="en-US" smtClean="0"/>
-              <a:t>8/9/11</a:t>
+              <a:t>8/12/11</a:t>
             </a:fld>
             <a:endParaRPr lang="en-US"/>
           </a:p>
@@ -818,7 +1552,7 @@
           <a:p>
             <a:fld id="{47A2725F-F1FC-464A-BBE8-94773344B8ED}" type="datetimeFigureOut">
               <a:rPr lang="en-US" smtClean="0"/>
-              <a:t>8/9/11</a:t>
+              <a:t>8/12/11</a:t>
             </a:fld>
             <a:endParaRPr lang="en-US"/>
           </a:p>
@@ -1064,7 +1798,7 @@
           <a:p>
             <a:fld id="{47A2725F-F1FC-464A-BBE8-94773344B8ED}" type="datetimeFigureOut">
               <a:rPr lang="en-US" smtClean="0"/>
-              <a:t>8/9/11</a:t>
+              <a:t>8/12/11</a:t>
             </a:fld>
             <a:endParaRPr lang="en-US"/>
           </a:p>
@@ -1352,7 +2086,7 @@
           <a:p>
             <a:fld id="{47A2725F-F1FC-464A-BBE8-94773344B8ED}" type="datetimeFigureOut">
               <a:rPr lang="en-US" smtClean="0"/>
-              <a:t>8/9/11</a:t>
+              <a:t>8/12/11</a:t>
             </a:fld>
             <a:endParaRPr lang="en-US"/>
           </a:p>
@@ -1774,7 +2508,7 @@
           <a:p>
             <a:fld id="{47A2725F-F1FC-464A-BBE8-94773344B8ED}" type="datetimeFigureOut">
               <a:rPr lang="en-US" smtClean="0"/>
-              <a:t>8/9/11</a:t>
+              <a:t>8/12/11</a:t>
             </a:fld>
             <a:endParaRPr lang="en-US"/>
           </a:p>
@@ -1892,7 +2626,7 @@
           <a:p>
             <a:fld id="{47A2725F-F1FC-464A-BBE8-94773344B8ED}" type="datetimeFigureOut">
               <a:rPr lang="en-US" smtClean="0"/>
-              <a:t>8/9/11</a:t>
+              <a:t>8/12/11</a:t>
             </a:fld>
             <a:endParaRPr lang="en-US"/>
           </a:p>
@@ -1987,7 +2721,7 @@
           <a:p>
             <a:fld id="{47A2725F-F1FC-464A-BBE8-94773344B8ED}" type="datetimeFigureOut">
               <a:rPr lang="en-US" smtClean="0"/>
-              <a:t>8/9/11</a:t>
+              <a:t>8/12/11</a:t>
             </a:fld>
             <a:endParaRPr lang="en-US"/>
           </a:p>
@@ -2264,7 +2998,7 @@
           <a:p>
             <a:fld id="{47A2725F-F1FC-464A-BBE8-94773344B8ED}" type="datetimeFigureOut">
               <a:rPr lang="en-US" smtClean="0"/>
-              <a:t>8/9/11</a:t>
+              <a:t>8/12/11</a:t>
             </a:fld>
             <a:endParaRPr lang="en-US"/>
           </a:p>
@@ -2517,7 +3251,7 @@
           <a:p>
             <a:fld id="{47A2725F-F1FC-464A-BBE8-94773344B8ED}" type="datetimeFigureOut">
               <a:rPr lang="en-US" smtClean="0"/>
-              <a:t>8/9/11</a:t>
+              <a:t>8/12/11</a:t>
             </a:fld>
             <a:endParaRPr lang="en-US"/>
           </a:p>
@@ -2730,7 +3464,7 @@
           <a:p>
             <a:fld id="{47A2725F-F1FC-464A-BBE8-94773344B8ED}" type="datetimeFigureOut">
               <a:rPr lang="en-US" smtClean="0"/>
-              <a:t>8/9/11</a:t>
+              <a:t>8/12/11</a:t>
             </a:fld>
             <a:endParaRPr lang="en-US"/>
           </a:p>
@@ -3197,7 +3931,7 @@
           <a:p>
             <a:r>
               <a:rPr lang="en-US" dirty="0" smtClean="0"/>
-              <a:t>REST: More than just a pretty URL</a:t>
+              <a:t>Server Side Zeitgeist</a:t>
             </a:r>
             <a:endParaRPr lang="en-US" dirty="0"/>
           </a:p>
@@ -3216,87 +3950,101 @@
         <p:spPr/>
         <p:txBody>
           <a:bodyPr>
-            <a:normAutofit fontScale="92500" lnSpcReduction="20000"/>
+            <a:normAutofit lnSpcReduction="10000"/>
           </a:bodyPr>
           <a:lstStyle/>
           <a:p>
             <a:r>
               <a:rPr lang="en-US" dirty="0" smtClean="0"/>
-              <a:t>Uniform access patterns to server-side state</a:t>
-            </a:r>
-          </a:p>
-          <a:p>
-            <a:r>
-              <a:rPr lang="en-US" dirty="0" smtClean="0"/>
-              <a:t>Taking full advantage of HTTP</a:t>
+              <a:t>Retreating to principles of HTTP and REST</a:t>
             </a:r>
           </a:p>
           <a:p>
             <a:pPr lvl="1"/>
             <a:r>
-              <a:rPr lang="en-US" dirty="0" smtClean="0"/>
-              <a:t>Responses communicate API</a:t>
+              <a:rPr lang="en-US" dirty="0" err="1" smtClean="0"/>
+              <a:t>Misultin</a:t>
+            </a:r>
+            <a:r>
+              <a:rPr lang="en-US" dirty="0" smtClean="0"/>
+              <a:t>, Cowboy, </a:t>
+            </a:r>
+            <a:r>
+              <a:rPr lang="en-US" dirty="0" err="1" smtClean="0"/>
+              <a:t>WebMachine</a:t>
+            </a:r>
+            <a:r>
+              <a:rPr lang="en-US" dirty="0" smtClean="0"/>
+              <a:t> (Erlang)</a:t>
             </a:r>
           </a:p>
           <a:p>
             <a:pPr lvl="1"/>
             <a:r>
               <a:rPr lang="en-US" dirty="0" smtClean="0"/>
-              <a:t>Use content negotiation</a:t>
+              <a:t>Sinatra (Ruby)</a:t>
             </a:r>
           </a:p>
           <a:p>
             <a:pPr lvl="1"/>
             <a:r>
               <a:rPr lang="en-US" dirty="0" smtClean="0"/>
-              <a:t>There’s more than GET / POST</a:t>
-            </a:r>
-          </a:p>
-          <a:p>
-            <a:r>
-              <a:rPr lang="en-US" dirty="0" smtClean="0"/>
-              <a:t>HTTP is device agnostic!</a:t>
-            </a:r>
-          </a:p>
-          <a:p>
-            <a:r>
-              <a:rPr lang="en-US" dirty="0" smtClean="0"/>
-              <a:t>HTTP is much, much simpler than</a:t>
+              <a:t>Express / Express-Resource (Node)</a:t>
             </a:r>
           </a:p>
           <a:p>
             <a:pPr lvl="1"/>
             <a:r>
               <a:rPr lang="en-US" dirty="0" smtClean="0"/>
-              <a:t>SOAP</a:t>
+              <a:t>Nancy, Kayak, OWIN (</a:t>
+            </a:r>
+            <a:r>
+              <a:rPr lang="en-US" dirty="0" err="1" smtClean="0"/>
+              <a:t>.Net</a:t>
+            </a:r>
+            <a:r>
+              <a:rPr lang="en-US" dirty="0" smtClean="0"/>
+              <a:t>)</a:t>
+            </a:r>
+          </a:p>
+          <a:p>
+            <a:r>
+              <a:rPr lang="en-US" dirty="0" smtClean="0"/>
+              <a:t>Focus </a:t>
             </a:r>
           </a:p>
           <a:p>
             <a:pPr lvl="1"/>
             <a:r>
               <a:rPr lang="en-US" dirty="0" smtClean="0"/>
-              <a:t>WS-*</a:t>
-            </a:r>
-          </a:p>
-          <a:p>
-            <a:r>
-              <a:rPr lang="en-US" dirty="0" smtClean="0"/>
-              <a:t>HTTP lets you transfer in *any* data format</a:t>
+              <a:t>server-side resources</a:t>
             </a:r>
           </a:p>
           <a:p>
             <a:pPr lvl="1"/>
-            <a:endParaRPr lang="en-US" dirty="0" smtClean="0"/>
-          </a:p>
-          <a:p>
-            <a:endParaRPr lang="en-US" dirty="0"/>
+            <a:r>
+              <a:rPr lang="en-US" b="1" i="1" dirty="0" smtClean="0"/>
+              <a:t>any </a:t>
+            </a:r>
+            <a:r>
+              <a:rPr lang="en-US" dirty="0" smtClean="0"/>
+              <a:t>client can consume</a:t>
+            </a:r>
+          </a:p>
+          <a:p>
+            <a:pPr lvl="1"/>
+            <a:r>
+              <a:rPr lang="en-US" b="1" i="1" dirty="0" smtClean="0"/>
+              <a:t>OPEN STANDARDS!</a:t>
+            </a:r>
+            <a:endParaRPr lang="en-US" b="1" i="1" dirty="0"/>
           </a:p>
         </p:txBody>
       </p:sp>
     </p:spTree>
     <p:extLst>
       <p:ext uri="{BB962C8B-B14F-4D97-AF65-F5344CB8AC3E}">
-        <p14:creationId xmlns:p14="http://schemas.microsoft.com/office/powerpoint/2010/main" val="2027851767"/>
+        <p14:creationId xmlns:p14="http://schemas.microsoft.com/office/powerpoint/2010/main" val="316421455"/>
       </p:ext>
     </p:extLst>
   </p:cSld>
@@ -3340,6 +4088,386 @@
           <a:p>
             <a:r>
               <a:rPr lang="en-US" dirty="0" smtClean="0"/>
+              <a:t>Where’s This Going?</a:t>
+            </a:r>
+            <a:endParaRPr lang="en-US" dirty="0"/>
+          </a:p>
+        </p:txBody>
+      </p:sp>
+      <p:sp>
+        <p:nvSpPr>
+          <p:cNvPr id="3" name="Content Placeholder 2"/>
+          <p:cNvSpPr>
+            <a:spLocks noGrp="1"/>
+          </p:cNvSpPr>
+          <p:nvPr>
+            <p:ph idx="1"/>
+          </p:nvPr>
+        </p:nvSpPr>
+        <p:spPr/>
+        <p:txBody>
+          <a:bodyPr>
+            <a:normAutofit lnSpcReduction="10000"/>
+          </a:bodyPr>
+          <a:lstStyle/>
+          <a:p>
+            <a:r>
+              <a:rPr lang="en-US" dirty="0" smtClean="0"/>
+              <a:t>Proliferation of powerful clients</a:t>
+            </a:r>
+          </a:p>
+          <a:p>
+            <a:pPr lvl="1"/>
+            <a:r>
+              <a:rPr lang="en-US" dirty="0" smtClean="0"/>
+              <a:t>PC (duh)</a:t>
+            </a:r>
+          </a:p>
+          <a:p>
+            <a:pPr lvl="1"/>
+            <a:r>
+              <a:rPr lang="en-US" dirty="0" smtClean="0"/>
+              <a:t>Mobile</a:t>
+            </a:r>
+          </a:p>
+          <a:p>
+            <a:pPr lvl="1"/>
+            <a:r>
+              <a:rPr lang="en-US" dirty="0" smtClean="0"/>
+              <a:t>Web</a:t>
+            </a:r>
+          </a:p>
+          <a:p>
+            <a:r>
+              <a:rPr lang="en-US" dirty="0" smtClean="0"/>
+              <a:t>Users expectations have shifted</a:t>
+            </a:r>
+          </a:p>
+          <a:p>
+            <a:pPr lvl="1"/>
+            <a:r>
+              <a:rPr lang="en-US" dirty="0" smtClean="0"/>
+              <a:t>Consistency of experience</a:t>
+            </a:r>
+          </a:p>
+          <a:p>
+            <a:pPr lvl="1"/>
+            <a:r>
+              <a:rPr lang="en-US" dirty="0" smtClean="0"/>
+              <a:t>Fluid device transition (Continuous Client)</a:t>
+            </a:r>
+          </a:p>
+          <a:p>
+            <a:r>
+              <a:rPr lang="en-US" b="1" dirty="0" smtClean="0"/>
+              <a:t>You can’t afford to write the server-side multiple times</a:t>
+            </a:r>
+            <a:endParaRPr lang="en-US" b="1" dirty="0"/>
+          </a:p>
+        </p:txBody>
+      </p:sp>
+    </p:spTree>
+    <p:extLst>
+      <p:ext uri="{BB962C8B-B14F-4D97-AF65-F5344CB8AC3E}">
+        <p14:creationId xmlns:p14="http://schemas.microsoft.com/office/powerpoint/2010/main" val="3913763961"/>
+      </p:ext>
+    </p:extLst>
+  </p:cSld>
+  <p:clrMapOvr>
+    <a:masterClrMapping/>
+  </p:clrMapOvr>
+</p:sld>
+</file>
+
+<file path=ppt/slides/slide12.xml><?xml version="1.0" encoding="utf-8"?>
+<p:sld xmlns:a="http://schemas.openxmlformats.org/drawingml/2006/main" xmlns:r="http://schemas.openxmlformats.org/officeDocument/2006/relationships" xmlns:p="http://schemas.openxmlformats.org/presentationml/2006/main">
+  <p:cSld>
+    <p:spTree>
+      <p:nvGrpSpPr>
+        <p:cNvPr id="1" name=""/>
+        <p:cNvGrpSpPr/>
+        <p:nvPr/>
+      </p:nvGrpSpPr>
+      <p:grpSpPr>
+        <a:xfrm>
+          <a:off x="0" y="0"/>
+          <a:ext cx="0" cy="0"/>
+          <a:chOff x="0" y="0"/>
+          <a:chExt cx="0" cy="0"/>
+        </a:xfrm>
+      </p:grpSpPr>
+      <p:sp>
+        <p:nvSpPr>
+          <p:cNvPr id="2" name="Title 1"/>
+          <p:cNvSpPr>
+            <a:spLocks noGrp="1"/>
+          </p:cNvSpPr>
+          <p:nvPr>
+            <p:ph type="title"/>
+          </p:nvPr>
+        </p:nvSpPr>
+        <p:spPr/>
+        <p:txBody>
+          <a:bodyPr>
+            <a:normAutofit fontScale="90000"/>
+          </a:bodyPr>
+          <a:lstStyle/>
+          <a:p>
+            <a:r>
+              <a:rPr lang="en-US" dirty="0" smtClean="0"/>
+              <a:t>Challenging The Reigning Assumption</a:t>
+            </a:r>
+            <a:endParaRPr lang="en-US" dirty="0"/>
+          </a:p>
+        </p:txBody>
+      </p:sp>
+      <p:sp>
+        <p:nvSpPr>
+          <p:cNvPr id="3" name="Content Placeholder 2"/>
+          <p:cNvSpPr>
+            <a:spLocks noGrp="1"/>
+          </p:cNvSpPr>
+          <p:nvPr>
+            <p:ph idx="1"/>
+          </p:nvPr>
+        </p:nvSpPr>
+        <p:spPr/>
+        <p:txBody>
+          <a:bodyPr/>
+          <a:lstStyle/>
+          <a:p>
+            <a:r>
+              <a:rPr lang="en-US" dirty="0" smtClean="0"/>
+              <a:t>Server-side web frameworks are not your best friend</a:t>
+            </a:r>
+          </a:p>
+          <a:p>
+            <a:pPr lvl="1"/>
+            <a:r>
+              <a:rPr lang="en-US" dirty="0" smtClean="0"/>
+              <a:t>Adding overhead</a:t>
+            </a:r>
+          </a:p>
+          <a:p>
+            <a:pPr lvl="1"/>
+            <a:r>
+              <a:rPr lang="en-US" dirty="0" smtClean="0"/>
+              <a:t>Providing poor abstractions</a:t>
+            </a:r>
+          </a:p>
+          <a:p>
+            <a:pPr lvl="1"/>
+            <a:r>
+              <a:rPr lang="en-US" dirty="0" smtClean="0"/>
+              <a:t>Myopic world view, “Everything is a web client!”</a:t>
+            </a:r>
+          </a:p>
+          <a:p>
+            <a:pPr lvl="1"/>
+            <a:r>
+              <a:rPr lang="en-US" dirty="0" smtClean="0"/>
+              <a:t>Tight coupling of server and client</a:t>
+            </a:r>
+          </a:p>
+          <a:p>
+            <a:r>
+              <a:rPr lang="en-US" dirty="0" smtClean="0"/>
+              <a:t>What if your server just provided access to state and governed access and operations?</a:t>
+            </a:r>
+            <a:endParaRPr lang="en-US" dirty="0"/>
+          </a:p>
+        </p:txBody>
+      </p:sp>
+    </p:spTree>
+    <p:extLst>
+      <p:ext uri="{BB962C8B-B14F-4D97-AF65-F5344CB8AC3E}">
+        <p14:creationId xmlns:p14="http://schemas.microsoft.com/office/powerpoint/2010/main" val="1558913479"/>
+      </p:ext>
+    </p:extLst>
+  </p:cSld>
+  <p:clrMapOvr>
+    <a:masterClrMapping/>
+  </p:clrMapOvr>
+</p:sld>
+</file>
+
+<file path=ppt/slides/slide13.xml><?xml version="1.0" encoding="utf-8"?>
+<p:sld xmlns:a="http://schemas.openxmlformats.org/drawingml/2006/main" xmlns:r="http://schemas.openxmlformats.org/officeDocument/2006/relationships" xmlns:p="http://schemas.openxmlformats.org/presentationml/2006/main">
+  <p:cSld>
+    <p:spTree>
+      <p:nvGrpSpPr>
+        <p:cNvPr id="1" name=""/>
+        <p:cNvGrpSpPr/>
+        <p:nvPr/>
+      </p:nvGrpSpPr>
+      <p:grpSpPr>
+        <a:xfrm>
+          <a:off x="0" y="0"/>
+          <a:ext cx="0" cy="0"/>
+          <a:chOff x="0" y="0"/>
+          <a:chExt cx="0" cy="0"/>
+        </a:xfrm>
+      </p:grpSpPr>
+      <p:sp>
+        <p:nvSpPr>
+          <p:cNvPr id="2" name="Title 1"/>
+          <p:cNvSpPr>
+            <a:spLocks noGrp="1"/>
+          </p:cNvSpPr>
+          <p:nvPr>
+            <p:ph type="title"/>
+          </p:nvPr>
+        </p:nvSpPr>
+        <p:spPr/>
+        <p:txBody>
+          <a:bodyPr/>
+          <a:lstStyle/>
+          <a:p>
+            <a:r>
+              <a:rPr lang="en-US" dirty="0" smtClean="0"/>
+              <a:t>REST: More than just a pretty URL</a:t>
+            </a:r>
+            <a:endParaRPr lang="en-US" dirty="0"/>
+          </a:p>
+        </p:txBody>
+      </p:sp>
+      <p:sp>
+        <p:nvSpPr>
+          <p:cNvPr id="3" name="Content Placeholder 2"/>
+          <p:cNvSpPr>
+            <a:spLocks noGrp="1"/>
+          </p:cNvSpPr>
+          <p:nvPr>
+            <p:ph idx="1"/>
+          </p:nvPr>
+        </p:nvSpPr>
+        <p:spPr/>
+        <p:txBody>
+          <a:bodyPr>
+            <a:normAutofit fontScale="92500" lnSpcReduction="20000"/>
+          </a:bodyPr>
+          <a:lstStyle/>
+          <a:p>
+            <a:r>
+              <a:rPr lang="en-US" dirty="0" smtClean="0"/>
+              <a:t>Uniform access patterns to server-side state</a:t>
+            </a:r>
+          </a:p>
+          <a:p>
+            <a:r>
+              <a:rPr lang="en-US" dirty="0" smtClean="0"/>
+              <a:t>Taking full advantage of HTTP</a:t>
+            </a:r>
+          </a:p>
+          <a:p>
+            <a:pPr lvl="1"/>
+            <a:r>
+              <a:rPr lang="en-US" dirty="0" smtClean="0"/>
+              <a:t>Responses communicate API</a:t>
+            </a:r>
+          </a:p>
+          <a:p>
+            <a:pPr lvl="1"/>
+            <a:r>
+              <a:rPr lang="en-US" dirty="0" smtClean="0"/>
+              <a:t>Use content negotiation</a:t>
+            </a:r>
+          </a:p>
+          <a:p>
+            <a:pPr lvl="1"/>
+            <a:r>
+              <a:rPr lang="en-US" dirty="0" smtClean="0"/>
+              <a:t>There’s more than GET / POST</a:t>
+            </a:r>
+          </a:p>
+          <a:p>
+            <a:r>
+              <a:rPr lang="en-US" dirty="0" smtClean="0"/>
+              <a:t>HTTP is device agnostic!</a:t>
+            </a:r>
+          </a:p>
+          <a:p>
+            <a:r>
+              <a:rPr lang="en-US" dirty="0" smtClean="0"/>
+              <a:t>HTTP is much, much simpler than</a:t>
+            </a:r>
+          </a:p>
+          <a:p>
+            <a:pPr lvl="1"/>
+            <a:r>
+              <a:rPr lang="en-US" dirty="0" smtClean="0"/>
+              <a:t>SOAP</a:t>
+            </a:r>
+          </a:p>
+          <a:p>
+            <a:pPr lvl="1"/>
+            <a:r>
+              <a:rPr lang="en-US" dirty="0" smtClean="0"/>
+              <a:t>WS-*</a:t>
+            </a:r>
+          </a:p>
+          <a:p>
+            <a:r>
+              <a:rPr lang="en-US" dirty="0" smtClean="0"/>
+              <a:t>HTTP lets you transfer in *any* data format</a:t>
+            </a:r>
+          </a:p>
+          <a:p>
+            <a:pPr lvl="1"/>
+            <a:endParaRPr lang="en-US" dirty="0" smtClean="0"/>
+          </a:p>
+          <a:p>
+            <a:endParaRPr lang="en-US" dirty="0"/>
+          </a:p>
+        </p:txBody>
+      </p:sp>
+    </p:spTree>
+    <p:extLst>
+      <p:ext uri="{BB962C8B-B14F-4D97-AF65-F5344CB8AC3E}">
+        <p14:creationId xmlns:p14="http://schemas.microsoft.com/office/powerpoint/2010/main" val="2027851767"/>
+      </p:ext>
+    </p:extLst>
+  </p:cSld>
+  <p:clrMapOvr>
+    <a:masterClrMapping/>
+  </p:clrMapOvr>
+</p:sld>
+</file>
+
+<file path=ppt/slides/slide14.xml><?xml version="1.0" encoding="utf-8"?>
+<p:sld xmlns:a="http://schemas.openxmlformats.org/drawingml/2006/main" xmlns:r="http://schemas.openxmlformats.org/officeDocument/2006/relationships" xmlns:p="http://schemas.openxmlformats.org/presentationml/2006/main">
+  <p:cSld>
+    <p:spTree>
+      <p:nvGrpSpPr>
+        <p:cNvPr id="1" name=""/>
+        <p:cNvGrpSpPr/>
+        <p:nvPr/>
+      </p:nvGrpSpPr>
+      <p:grpSpPr>
+        <a:xfrm>
+          <a:off x="0" y="0"/>
+          <a:ext cx="0" cy="0"/>
+          <a:chOff x="0" y="0"/>
+          <a:chExt cx="0" cy="0"/>
+        </a:xfrm>
+      </p:grpSpPr>
+      <p:sp>
+        <p:nvSpPr>
+          <p:cNvPr id="2" name="Title 1"/>
+          <p:cNvSpPr>
+            <a:spLocks noGrp="1"/>
+          </p:cNvSpPr>
+          <p:nvPr>
+            <p:ph type="title"/>
+          </p:nvPr>
+        </p:nvSpPr>
+        <p:spPr/>
+        <p:txBody>
+          <a:bodyPr/>
+          <a:lstStyle/>
+          <a:p>
+            <a:r>
+              <a:rPr lang="en-US" dirty="0" smtClean="0"/>
               <a:t>Throughput</a:t>
             </a:r>
             <a:endParaRPr lang="en-US" dirty="0"/>
@@ -3416,6 +4544,292 @@
   <p:clrMapOvr>
     <a:masterClrMapping/>
   </p:clrMapOvr>
+</p:sld>
+</file>
+
+<file path=ppt/slides/slide15.xml><?xml version="1.0" encoding="utf-8"?>
+<p:sld xmlns:a="http://schemas.openxmlformats.org/drawingml/2006/main" xmlns:r="http://schemas.openxmlformats.org/officeDocument/2006/relationships" xmlns:p="http://schemas.openxmlformats.org/presentationml/2006/main">
+  <p:cSld>
+    <p:spTree>
+      <p:nvGrpSpPr>
+        <p:cNvPr id="1" name=""/>
+        <p:cNvGrpSpPr/>
+        <p:nvPr/>
+      </p:nvGrpSpPr>
+      <p:grpSpPr>
+        <a:xfrm>
+          <a:off x="0" y="0"/>
+          <a:ext cx="0" cy="0"/>
+          <a:chOff x="0" y="0"/>
+          <a:chExt cx="0" cy="0"/>
+        </a:xfrm>
+      </p:grpSpPr>
+      <p:sp>
+        <p:nvSpPr>
+          <p:cNvPr id="2" name="Title 1"/>
+          <p:cNvSpPr>
+            <a:spLocks noGrp="1"/>
+          </p:cNvSpPr>
+          <p:nvPr>
+            <p:ph type="title"/>
+          </p:nvPr>
+        </p:nvSpPr>
+        <p:spPr/>
+        <p:txBody>
+          <a:bodyPr/>
+          <a:lstStyle/>
+          <a:p>
+            <a:r>
+              <a:rPr lang="en-US" dirty="0" smtClean="0"/>
+              <a:t>Putting it Together</a:t>
+            </a:r>
+            <a:endParaRPr lang="en-US" dirty="0"/>
+          </a:p>
+        </p:txBody>
+      </p:sp>
+      <p:sp>
+        <p:nvSpPr>
+          <p:cNvPr id="3" name="Content Placeholder 2"/>
+          <p:cNvSpPr>
+            <a:spLocks noGrp="1"/>
+          </p:cNvSpPr>
+          <p:nvPr>
+            <p:ph idx="1"/>
+          </p:nvPr>
+        </p:nvSpPr>
+        <p:spPr/>
+        <p:txBody>
+          <a:bodyPr/>
+          <a:lstStyle/>
+          <a:p>
+            <a:r>
+              <a:rPr lang="en-US" dirty="0" smtClean="0"/>
+              <a:t>Libraries like jQuery, jQuery UI, </a:t>
+            </a:r>
+            <a:r>
+              <a:rPr lang="en-US" dirty="0" err="1" smtClean="0"/>
+              <a:t>Amplify.js</a:t>
+            </a:r>
+            <a:endParaRPr lang="en-US" dirty="0" smtClean="0"/>
+          </a:p>
+          <a:p>
+            <a:pPr lvl="1"/>
+            <a:r>
+              <a:rPr lang="en-US" dirty="0" smtClean="0"/>
+              <a:t>Abstracting common pain points</a:t>
+            </a:r>
+          </a:p>
+          <a:p>
+            <a:pPr lvl="1"/>
+            <a:r>
+              <a:rPr lang="en-US" dirty="0" smtClean="0"/>
+              <a:t>Providing foundation for meta-frameworks</a:t>
+            </a:r>
+          </a:p>
+          <a:p>
+            <a:pPr lvl="2"/>
+            <a:r>
+              <a:rPr lang="en-US" dirty="0" err="1" smtClean="0"/>
+              <a:t>Backbone.js</a:t>
+            </a:r>
+            <a:endParaRPr lang="en-US" dirty="0" smtClean="0"/>
+          </a:p>
+          <a:p>
+            <a:pPr lvl="2"/>
+            <a:r>
+              <a:rPr lang="en-US" dirty="0" err="1" smtClean="0"/>
+              <a:t>Knockout.js</a:t>
+            </a:r>
+            <a:endParaRPr lang="en-US" dirty="0" smtClean="0"/>
+          </a:p>
+          <a:p>
+            <a:r>
+              <a:rPr lang="en-US" dirty="0" smtClean="0"/>
+              <a:t>jQuery UI, </a:t>
+            </a:r>
+            <a:r>
+              <a:rPr lang="en-US" dirty="0" err="1" smtClean="0"/>
+              <a:t>ExtJS</a:t>
+            </a:r>
+            <a:r>
+              <a:rPr lang="en-US" dirty="0" smtClean="0"/>
+              <a:t>, Dojo Toolkit</a:t>
+            </a:r>
+          </a:p>
+          <a:p>
+            <a:pPr lvl="1"/>
+            <a:r>
+              <a:rPr lang="en-US" dirty="0" smtClean="0"/>
+              <a:t>Making complex UI development accessible</a:t>
+            </a:r>
+          </a:p>
+          <a:p>
+            <a:pPr lvl="1"/>
+            <a:r>
+              <a:rPr lang="en-US" dirty="0" smtClean="0"/>
+              <a:t>Community-tested approaches (distilled wisdom)</a:t>
+            </a:r>
+            <a:endParaRPr lang="en-US" dirty="0"/>
+          </a:p>
+        </p:txBody>
+      </p:sp>
+    </p:spTree>
+    <p:extLst>
+      <p:ext uri="{BB962C8B-B14F-4D97-AF65-F5344CB8AC3E}">
+        <p14:creationId xmlns:p14="http://schemas.microsoft.com/office/powerpoint/2010/main" val="1642859947"/>
+      </p:ext>
+    </p:extLst>
+  </p:cSld>
+  <p:clrMapOvr>
+    <a:masterClrMapping/>
+  </p:clrMapOvr>
+  <p:timing>
+    <p:tnLst>
+      <p:par>
+        <p:cTn xmlns:p14="http://schemas.microsoft.com/office/powerpoint/2010/main" id="1" dur="indefinite" restart="never" nodeType="tmRoot"/>
+      </p:par>
+    </p:tnLst>
+  </p:timing>
+</p:sld>
+</file>
+
+<file path=ppt/slides/slide16.xml><?xml version="1.0" encoding="utf-8"?>
+<p:sld xmlns:a="http://schemas.openxmlformats.org/drawingml/2006/main" xmlns:r="http://schemas.openxmlformats.org/officeDocument/2006/relationships" xmlns:p="http://schemas.openxmlformats.org/presentationml/2006/main">
+  <p:cSld>
+    <p:spTree>
+      <p:nvGrpSpPr>
+        <p:cNvPr id="1" name=""/>
+        <p:cNvGrpSpPr/>
+        <p:nvPr/>
+      </p:nvGrpSpPr>
+      <p:grpSpPr>
+        <a:xfrm>
+          <a:off x="0" y="0"/>
+          <a:ext cx="0" cy="0"/>
+          <a:chOff x="0" y="0"/>
+          <a:chExt cx="0" cy="0"/>
+        </a:xfrm>
+      </p:grpSpPr>
+      <p:sp>
+        <p:nvSpPr>
+          <p:cNvPr id="2" name="Title 1"/>
+          <p:cNvSpPr>
+            <a:spLocks noGrp="1"/>
+          </p:cNvSpPr>
+          <p:nvPr>
+            <p:ph type="title"/>
+          </p:nvPr>
+        </p:nvSpPr>
+        <p:spPr/>
+        <p:txBody>
+          <a:bodyPr/>
+          <a:lstStyle/>
+          <a:p>
+            <a:r>
+              <a:rPr lang="en-US" dirty="0" smtClean="0"/>
+              <a:t>Putting it Together</a:t>
+            </a:r>
+            <a:endParaRPr lang="en-US" dirty="0"/>
+          </a:p>
+        </p:txBody>
+      </p:sp>
+      <p:sp>
+        <p:nvSpPr>
+          <p:cNvPr id="3" name="Content Placeholder 2"/>
+          <p:cNvSpPr>
+            <a:spLocks noGrp="1"/>
+          </p:cNvSpPr>
+          <p:nvPr>
+            <p:ph idx="1"/>
+          </p:nvPr>
+        </p:nvSpPr>
+        <p:spPr/>
+        <p:txBody>
+          <a:bodyPr/>
+          <a:lstStyle/>
+          <a:p>
+            <a:r>
+              <a:rPr lang="en-US" dirty="0" smtClean="0"/>
+              <a:t>Look for:</a:t>
+            </a:r>
+          </a:p>
+          <a:p>
+            <a:pPr lvl="1"/>
+            <a:r>
+              <a:rPr lang="en-US" dirty="0" smtClean="0"/>
+              <a:t>Push towards more interoperability</a:t>
+            </a:r>
+          </a:p>
+          <a:p>
+            <a:pPr lvl="1"/>
+            <a:r>
+              <a:rPr lang="en-US" dirty="0" smtClean="0"/>
+              <a:t>Better organization of code (</a:t>
+            </a:r>
+            <a:r>
+              <a:rPr lang="en-US" dirty="0" err="1" smtClean="0"/>
+              <a:t>CommonJS</a:t>
+            </a:r>
+            <a:r>
+              <a:rPr lang="en-US" dirty="0" smtClean="0"/>
+              <a:t>)</a:t>
+            </a:r>
+          </a:p>
+          <a:p>
+            <a:pPr lvl="1"/>
+            <a:r>
+              <a:rPr lang="en-US" dirty="0" smtClean="0"/>
+              <a:t>Patterns/Approaches to emerge:</a:t>
+            </a:r>
+          </a:p>
+          <a:p>
+            <a:pPr lvl="2"/>
+            <a:r>
+              <a:rPr lang="en-US" dirty="0" smtClean="0"/>
+              <a:t>Client side messaging</a:t>
+            </a:r>
+          </a:p>
+          <a:p>
+            <a:pPr lvl="2"/>
+            <a:r>
+              <a:rPr lang="en-US" dirty="0" smtClean="0"/>
+              <a:t>Local storage w/remote sync</a:t>
+            </a:r>
+          </a:p>
+          <a:p>
+            <a:pPr lvl="2"/>
+            <a:r>
+              <a:rPr lang="en-US" dirty="0" smtClean="0"/>
+              <a:t>Command-style HTTP interaction w/ server</a:t>
+            </a:r>
+          </a:p>
+          <a:p>
+            <a:pPr lvl="2"/>
+            <a:endParaRPr lang="en-US" dirty="0" smtClean="0"/>
+          </a:p>
+          <a:p>
+            <a:pPr lvl="2"/>
+            <a:endParaRPr lang="en-US" dirty="0"/>
+          </a:p>
+        </p:txBody>
+      </p:sp>
+    </p:spTree>
+    <p:extLst>
+      <p:ext uri="{BB962C8B-B14F-4D97-AF65-F5344CB8AC3E}">
+        <p14:creationId xmlns:p14="http://schemas.microsoft.com/office/powerpoint/2010/main" val="1472304662"/>
+      </p:ext>
+    </p:extLst>
+  </p:cSld>
+  <p:clrMapOvr>
+    <a:masterClrMapping/>
+  </p:clrMapOvr>
+  <p:timing>
+    <p:tnLst>
+      <p:par>
+        <p:cTn xmlns:p14="http://schemas.microsoft.com/office/powerpoint/2010/main" id="1" dur="indefinite" restart="never" nodeType="tmRoot"/>
+      </p:par>
+    </p:tnLst>
+  </p:timing>
 </p:sld>
 </file>
 
@@ -3599,6 +5013,62 @@
       </p:grpSpPr>
       <p:sp>
         <p:nvSpPr>
+          <p:cNvPr id="10" name="Oval 9"/>
+          <p:cNvSpPr/>
+          <p:nvPr/>
+        </p:nvSpPr>
+        <p:spPr>
+          <a:xfrm>
+            <a:off x="2652009" y="1123154"/>
+            <a:ext cx="3826265" cy="1682647"/>
+          </a:xfrm>
+          <a:prstGeom prst="ellipse">
+            <a:avLst/>
+          </a:prstGeom>
+          <a:solidFill>
+            <a:schemeClr val="accent6">
+              <a:lumMod val="75000"/>
+              <a:alpha val="46000"/>
+            </a:schemeClr>
+          </a:solidFill>
+        </p:spPr>
+        <p:style>
+          <a:lnRef idx="1">
+            <a:schemeClr val="accent1"/>
+          </a:lnRef>
+          <a:fillRef idx="3">
+            <a:schemeClr val="accent1"/>
+          </a:fillRef>
+          <a:effectRef idx="2">
+            <a:schemeClr val="accent1"/>
+          </a:effectRef>
+          <a:fontRef idx="minor">
+            <a:schemeClr val="lt1"/>
+          </a:fontRef>
+        </p:style>
+        <p:txBody>
+          <a:bodyPr rtlCol="0" anchor="t"/>
+          <a:lstStyle/>
+          <a:p>
+            <a:pPr algn="ctr"/>
+            <a:r>
+              <a:rPr lang="en-US" dirty="0" err="1" smtClean="0"/>
+              <a:t>NoSQL</a:t>
+            </a:r>
+            <a:r>
+              <a:rPr lang="en-US" dirty="0" smtClean="0"/>
+              <a:t> </a:t>
+            </a:r>
+            <a:r>
+              <a:rPr lang="en-US" dirty="0" smtClean="0"/>
+              <a:t>w/HTTP</a:t>
+            </a:r>
+            <a:endParaRPr lang="en-US" dirty="0"/>
+          </a:p>
+        </p:txBody>
+      </p:sp>
+      <p:sp>
+        <p:nvSpPr>
           <p:cNvPr id="2" name="Title 1"/>
           <p:cNvSpPr>
             <a:spLocks noGrp="1"/>
@@ -3609,12 +5079,12 @@
         </p:nvSpPr>
         <p:spPr/>
         <p:txBody>
-          <a:bodyPr/>
-          <a:lstStyle/>
-          <a:p>
-            <a:r>
-              <a:rPr lang="en-US" dirty="0" smtClean="0"/>
-              <a:t>Recent Runtime Improvements</a:t>
+          <a:bodyPr anchor="t"/>
+          <a:lstStyle/>
+          <a:p>
+            <a:r>
+              <a:rPr lang="en-US" dirty="0" smtClean="0"/>
+              <a:t>Convergence</a:t>
             </a:r>
             <a:endParaRPr lang="en-US" dirty="0"/>
           </a:p>
@@ -3622,35 +5092,473 @@
       </p:sp>
       <p:sp>
         <p:nvSpPr>
-          <p:cNvPr id="3" name="Content Placeholder 2"/>
-          <p:cNvSpPr>
-            <a:spLocks noGrp="1"/>
-          </p:cNvSpPr>
-          <p:nvPr>
-            <p:ph idx="1"/>
-          </p:nvPr>
-        </p:nvSpPr>
-        <p:spPr/>
-        <p:txBody>
-          <a:bodyPr/>
-          <a:lstStyle/>
-          <a:p>
-            <a:r>
-              <a:rPr lang="en-US" dirty="0" smtClean="0"/>
-              <a:t>V8</a:t>
-            </a:r>
-          </a:p>
-          <a:p>
+          <p:cNvPr id="5" name="Oval 4"/>
+          <p:cNvSpPr/>
+          <p:nvPr/>
+        </p:nvSpPr>
+        <p:spPr>
+          <a:xfrm>
+            <a:off x="2847453" y="1689439"/>
+            <a:ext cx="5839348" cy="4224099"/>
+          </a:xfrm>
+          <a:prstGeom prst="ellipse">
+            <a:avLst/>
+          </a:prstGeom>
+          <a:solidFill>
+            <a:schemeClr val="tx1">
+              <a:lumMod val="75000"/>
+              <a:lumOff val="25000"/>
+              <a:alpha val="28000"/>
+            </a:schemeClr>
+          </a:solidFill>
+        </p:spPr>
+        <p:style>
+          <a:lnRef idx="1">
+            <a:schemeClr val="accent1"/>
+          </a:lnRef>
+          <a:fillRef idx="3">
+            <a:schemeClr val="accent1"/>
+          </a:fillRef>
+          <a:effectRef idx="2">
+            <a:schemeClr val="accent1"/>
+          </a:effectRef>
+          <a:fontRef idx="minor">
+            <a:schemeClr val="lt1"/>
+          </a:fontRef>
+        </p:style>
+        <p:txBody>
+          <a:bodyPr rtlCol="0" anchor="ctr"/>
+          <a:lstStyle/>
+          <a:p>
+            <a:pPr algn="r"/>
+            <a:r>
+              <a:rPr lang="en-US" dirty="0" smtClean="0"/>
+              <a:t>Server-Side</a:t>
+            </a:r>
+          </a:p>
+          <a:p>
+            <a:pPr algn="r"/>
+            <a:r>
+              <a:rPr lang="en-US" dirty="0" smtClean="0"/>
+              <a:t>Performance</a:t>
+            </a:r>
+          </a:p>
+          <a:p>
+            <a:pPr algn="r"/>
+            <a:r>
+              <a:rPr lang="en-US" dirty="0" smtClean="0"/>
+              <a:t>Boosts</a:t>
+            </a:r>
+          </a:p>
+          <a:p>
+            <a:pPr algn="r"/>
+            <a:r>
+              <a:rPr lang="en-US" dirty="0" smtClean="0"/>
+              <a:t>w/</a:t>
+            </a:r>
             <a:r>
               <a:rPr lang="en-US" dirty="0" err="1" smtClean="0"/>
-              <a:t>SpiderMonkey</a:t>
+              <a:t>Node.js</a:t>
+            </a:r>
+            <a:r>
+              <a:rPr lang="en-US" dirty="0" smtClean="0"/>
+              <a:t>,</a:t>
+            </a:r>
+          </a:p>
+          <a:p>
+            <a:pPr algn="r"/>
+            <a:r>
+              <a:rPr lang="en-US" dirty="0" err="1" smtClean="0"/>
+              <a:t>Nginx</a:t>
+            </a:r>
+            <a:r>
+              <a:rPr lang="en-US" dirty="0" smtClean="0"/>
+              <a:t>,</a:t>
+            </a:r>
+          </a:p>
+          <a:p>
+            <a:pPr algn="r"/>
+            <a:r>
+              <a:rPr lang="en-US" dirty="0" err="1" smtClean="0"/>
+              <a:t>Misultin</a:t>
+            </a:r>
+            <a:r>
+              <a:rPr lang="en-US" dirty="0" smtClean="0"/>
+              <a:t>,</a:t>
+            </a:r>
+          </a:p>
+          <a:p>
+            <a:pPr algn="r"/>
+            <a:r>
+              <a:rPr lang="en-US" dirty="0" err="1" smtClean="0"/>
+              <a:t>WebMachine</a:t>
             </a:r>
             <a:endParaRPr lang="en-US" dirty="0" smtClean="0"/>
           </a:p>
           <a:p>
-            <a:r>
-              <a:rPr lang="en-US" dirty="0" smtClean="0"/>
-              <a:t>Chakra</a:t>
+            <a:pPr algn="r"/>
+            <a:endParaRPr lang="en-US" dirty="0" smtClean="0"/>
+          </a:p>
+          <a:p>
+            <a:pPr algn="r"/>
+            <a:r>
+              <a:rPr lang="en-US" dirty="0" err="1" smtClean="0"/>
+              <a:t>RESTful</a:t>
+            </a:r>
+            <a:r>
+              <a:rPr lang="en-US" dirty="0" smtClean="0"/>
+              <a:t> APIs</a:t>
+            </a:r>
+            <a:endParaRPr lang="en-US" dirty="0"/>
+          </a:p>
+        </p:txBody>
+      </p:sp>
+      <p:sp>
+        <p:nvSpPr>
+          <p:cNvPr id="7" name="Oval 6"/>
+          <p:cNvSpPr/>
+          <p:nvPr/>
+        </p:nvSpPr>
+        <p:spPr>
+          <a:xfrm>
+            <a:off x="457200" y="1689439"/>
+            <a:ext cx="5658349" cy="4224099"/>
+          </a:xfrm>
+          <a:prstGeom prst="ellipse">
+            <a:avLst/>
+          </a:prstGeom>
+          <a:gradFill flip="none" rotWithShape="1">
+            <a:gsLst>
+              <a:gs pos="0">
+                <a:schemeClr val="accent1">
+                  <a:tint val="100000"/>
+                  <a:shade val="100000"/>
+                  <a:satMod val="130000"/>
+                  <a:alpha val="39000"/>
+                </a:schemeClr>
+              </a:gs>
+              <a:gs pos="100000">
+                <a:schemeClr val="accent1">
+                  <a:tint val="50000"/>
+                  <a:shade val="100000"/>
+                  <a:satMod val="350000"/>
+                  <a:alpha val="39000"/>
+                </a:schemeClr>
+              </a:gs>
+            </a:gsLst>
+            <a:lin ang="16200000" scaled="0"/>
+            <a:tileRect/>
+          </a:gradFill>
+        </p:spPr>
+        <p:style>
+          <a:lnRef idx="1">
+            <a:schemeClr val="accent1"/>
+          </a:lnRef>
+          <a:fillRef idx="3">
+            <a:schemeClr val="accent1"/>
+          </a:fillRef>
+          <a:effectRef idx="2">
+            <a:schemeClr val="accent1"/>
+          </a:effectRef>
+          <a:fontRef idx="minor">
+            <a:schemeClr val="lt1"/>
+          </a:fontRef>
+        </p:style>
+        <p:txBody>
+          <a:bodyPr rtlCol="0" anchor="ctr"/>
+          <a:lstStyle/>
+          <a:p>
+            <a:r>
+              <a:rPr lang="en-US" dirty="0" smtClean="0"/>
+              <a:t>JavaScript</a:t>
+            </a:r>
+          </a:p>
+          <a:p>
+            <a:r>
+              <a:rPr lang="en-US" dirty="0" smtClean="0"/>
+              <a:t>run-time</a:t>
+            </a:r>
+          </a:p>
+          <a:p>
+            <a:r>
+              <a:rPr lang="en-US" dirty="0" smtClean="0"/>
+              <a:t>Improvements,</a:t>
+            </a:r>
+          </a:p>
+          <a:p>
+            <a:endParaRPr lang="en-US" dirty="0" smtClean="0"/>
+          </a:p>
+          <a:p>
+            <a:r>
+              <a:rPr lang="en-US" dirty="0" smtClean="0"/>
+              <a:t>Language</a:t>
+            </a:r>
+          </a:p>
+          <a:p>
+            <a:r>
+              <a:rPr lang="en-US" dirty="0" smtClean="0"/>
+              <a:t>Growth</a:t>
+            </a:r>
+          </a:p>
+          <a:p>
+            <a:r>
+              <a:rPr lang="en-US" dirty="0" smtClean="0"/>
+              <a:t>(ES5)</a:t>
+            </a:r>
+          </a:p>
+          <a:p>
+            <a:endParaRPr lang="en-US" dirty="0" smtClean="0"/>
+          </a:p>
+          <a:p>
+            <a:r>
+              <a:rPr lang="en-US" dirty="0" err="1" smtClean="0"/>
+              <a:t>CoffeeScript</a:t>
+            </a:r>
+            <a:endParaRPr lang="en-US" dirty="0"/>
+          </a:p>
+        </p:txBody>
+      </p:sp>
+      <p:sp>
+        <p:nvSpPr>
+          <p:cNvPr id="8" name="Oval 7"/>
+          <p:cNvSpPr/>
+          <p:nvPr/>
+        </p:nvSpPr>
+        <p:spPr>
+          <a:xfrm>
+            <a:off x="2483431" y="2111400"/>
+            <a:ext cx="1953578" cy="1407598"/>
+          </a:xfrm>
+          <a:prstGeom prst="ellipse">
+            <a:avLst/>
+          </a:prstGeom>
+          <a:solidFill>
+            <a:schemeClr val="accent3">
+              <a:lumMod val="60000"/>
+              <a:lumOff val="40000"/>
+              <a:alpha val="46000"/>
+            </a:schemeClr>
+          </a:solidFill>
+        </p:spPr>
+        <p:style>
+          <a:lnRef idx="1">
+            <a:schemeClr val="accent1"/>
+          </a:lnRef>
+          <a:fillRef idx="3">
+            <a:schemeClr val="accent1"/>
+          </a:fillRef>
+          <a:effectRef idx="2">
+            <a:schemeClr val="accent1"/>
+          </a:effectRef>
+          <a:fontRef idx="minor">
+            <a:schemeClr val="lt1"/>
+          </a:fontRef>
+        </p:style>
+        <p:txBody>
+          <a:bodyPr rtlCol="0" anchor="ctr"/>
+          <a:lstStyle/>
+          <a:p>
+            <a:pPr algn="ctr"/>
+            <a:r>
+              <a:rPr lang="en-US" dirty="0" smtClean="0"/>
+              <a:t>HTML5 Features</a:t>
+            </a:r>
+            <a:endParaRPr lang="en-US" dirty="0"/>
+          </a:p>
+        </p:txBody>
+      </p:sp>
+      <p:sp>
+        <p:nvSpPr>
+          <p:cNvPr id="9" name="Oval 8"/>
+          <p:cNvSpPr/>
+          <p:nvPr/>
+        </p:nvSpPr>
+        <p:spPr>
+          <a:xfrm>
+            <a:off x="2750379" y="4522100"/>
+            <a:ext cx="2176038" cy="1310537"/>
+          </a:xfrm>
+          <a:prstGeom prst="ellipse">
+            <a:avLst/>
+          </a:prstGeom>
+          <a:solidFill>
+            <a:schemeClr val="accent6">
+              <a:lumMod val="75000"/>
+              <a:alpha val="46000"/>
+            </a:schemeClr>
+          </a:solidFill>
+        </p:spPr>
+        <p:style>
+          <a:lnRef idx="1">
+            <a:schemeClr val="accent1"/>
+          </a:lnRef>
+          <a:fillRef idx="3">
+            <a:schemeClr val="accent1"/>
+          </a:fillRef>
+          <a:effectRef idx="2">
+            <a:schemeClr val="accent1"/>
+          </a:effectRef>
+          <a:fontRef idx="minor">
+            <a:schemeClr val="lt1"/>
+          </a:fontRef>
+        </p:style>
+        <p:txBody>
+          <a:bodyPr rtlCol="0" anchor="ctr"/>
+          <a:lstStyle/>
+          <a:p>
+            <a:pPr algn="ctr"/>
+            <a:r>
+              <a:rPr lang="en-US" dirty="0" smtClean="0"/>
+              <a:t>Local Storage</a:t>
+            </a:r>
+            <a:endParaRPr lang="en-US" dirty="0"/>
+          </a:p>
+        </p:txBody>
+      </p:sp>
+      <p:sp>
+        <p:nvSpPr>
+          <p:cNvPr id="11" name="Oval 10"/>
+          <p:cNvSpPr/>
+          <p:nvPr/>
+        </p:nvSpPr>
+        <p:spPr>
+          <a:xfrm>
+            <a:off x="2483431" y="3260128"/>
+            <a:ext cx="2843409" cy="1682647"/>
+          </a:xfrm>
+          <a:prstGeom prst="ellipse">
+            <a:avLst/>
+          </a:prstGeom>
+          <a:solidFill>
+            <a:schemeClr val="tx2">
+              <a:alpha val="46000"/>
+            </a:schemeClr>
+          </a:solidFill>
+        </p:spPr>
+        <p:style>
+          <a:lnRef idx="1">
+            <a:schemeClr val="accent1"/>
+          </a:lnRef>
+          <a:fillRef idx="3">
+            <a:schemeClr val="accent1"/>
+          </a:fillRef>
+          <a:effectRef idx="2">
+            <a:schemeClr val="accent1"/>
+          </a:effectRef>
+          <a:fontRef idx="minor">
+            <a:schemeClr val="lt1"/>
+          </a:fontRef>
+        </p:style>
+        <p:txBody>
+          <a:bodyPr rtlCol="0" anchor="ctr"/>
+          <a:lstStyle/>
+          <a:p>
+            <a:r>
+              <a:rPr lang="en-US" dirty="0" smtClean="0"/>
+              <a:t>jQuery</a:t>
+            </a:r>
+          </a:p>
+          <a:p>
+            <a:r>
+              <a:rPr lang="en-US" dirty="0" smtClean="0"/>
+              <a:t>Script Loaders</a:t>
+            </a:r>
+          </a:p>
+          <a:p>
+            <a:r>
+              <a:rPr lang="en-US" dirty="0" smtClean="0"/>
+              <a:t>Template Engines</a:t>
+            </a:r>
+          </a:p>
+        </p:txBody>
+      </p:sp>
+      <p:sp>
+        <p:nvSpPr>
+          <p:cNvPr id="12" name="Oval 11"/>
+          <p:cNvSpPr/>
+          <p:nvPr/>
+        </p:nvSpPr>
+        <p:spPr>
+          <a:xfrm>
+            <a:off x="3971874" y="2046672"/>
+            <a:ext cx="1925263" cy="3195411"/>
+          </a:xfrm>
+          <a:prstGeom prst="ellipse">
+            <a:avLst/>
+          </a:prstGeom>
+          <a:solidFill>
+            <a:schemeClr val="accent3">
+              <a:lumMod val="50000"/>
+              <a:alpha val="46000"/>
+            </a:schemeClr>
+          </a:solidFill>
+        </p:spPr>
+        <p:style>
+          <a:lnRef idx="1">
+            <a:schemeClr val="accent1"/>
+          </a:lnRef>
+          <a:fillRef idx="3">
+            <a:schemeClr val="accent1"/>
+          </a:fillRef>
+          <a:effectRef idx="2">
+            <a:schemeClr val="accent1"/>
+          </a:effectRef>
+          <a:fontRef idx="minor">
+            <a:schemeClr val="lt1"/>
+          </a:fontRef>
+        </p:style>
+        <p:txBody>
+          <a:bodyPr rtlCol="0" anchor="ctr"/>
+          <a:lstStyle/>
+          <a:p>
+            <a:pPr algn="ctr"/>
+            <a:r>
+              <a:rPr lang="en-US" dirty="0" smtClean="0"/>
+              <a:t>Client-side</a:t>
+            </a:r>
+          </a:p>
+          <a:p>
+            <a:pPr algn="ctr"/>
+            <a:r>
+              <a:rPr lang="en-US" dirty="0" smtClean="0"/>
+              <a:t>Application</a:t>
+            </a:r>
+          </a:p>
+          <a:p>
+            <a:pPr algn="ctr"/>
+            <a:r>
+              <a:rPr lang="en-US" dirty="0" smtClean="0"/>
+              <a:t>Frameworks</a:t>
+            </a:r>
+          </a:p>
+        </p:txBody>
+      </p:sp>
+      <p:sp>
+        <p:nvSpPr>
+          <p:cNvPr id="13" name="TextBox 12"/>
+          <p:cNvSpPr txBox="1"/>
+          <p:nvPr/>
+        </p:nvSpPr>
+        <p:spPr>
+          <a:xfrm>
+            <a:off x="457199" y="6220940"/>
+            <a:ext cx="8229601" cy="369332"/>
+          </a:xfrm>
+          <a:prstGeom prst="rect">
+            <a:avLst/>
+          </a:prstGeom>
+          <a:noFill/>
+        </p:spPr>
+        <p:txBody>
+          <a:bodyPr wrap="square" rtlCol="0">
+            <a:spAutoFit/>
+          </a:bodyPr>
+          <a:lstStyle/>
+          <a:p>
+            <a:pPr algn="ctr"/>
+            <a:r>
+              <a:rPr lang="en-US" dirty="0" smtClean="0"/>
+              <a:t>This is barely scratching the surface.  The last 5 years have been transformational!</a:t>
             </a:r>
             <a:endParaRPr lang="en-US" dirty="0"/>
           </a:p>
@@ -3659,13 +5567,20 @@
     </p:spTree>
     <p:extLst>
       <p:ext uri="{BB962C8B-B14F-4D97-AF65-F5344CB8AC3E}">
-        <p14:creationId xmlns:p14="http://schemas.microsoft.com/office/powerpoint/2010/main" val="451477600"/>
+        <p14:creationId xmlns:p14="http://schemas.microsoft.com/office/powerpoint/2010/main" val="432204872"/>
       </p:ext>
     </p:extLst>
   </p:cSld>
   <p:clrMapOvr>
     <a:masterClrMapping/>
   </p:clrMapOvr>
+  <p:timing>
+    <p:tnLst>
+      <p:par>
+        <p:cTn xmlns:p14="http://schemas.microsoft.com/office/powerpoint/2010/main" id="1" dur="indefinite" restart="never" nodeType="tmRoot"/>
+      </p:par>
+    </p:tnLst>
+  </p:timing>
 </p:sld>
 </file>
 
@@ -3703,7 +5618,7 @@
           <a:p>
             <a:r>
               <a:rPr lang="en-US" dirty="0" smtClean="0"/>
-              <a:t>Richer Environment</a:t>
+              <a:t>Recent Runtime Improvements</a:t>
             </a:r>
             <a:endParaRPr lang="en-US" dirty="0"/>
           </a:p>
@@ -3722,108 +5637,124 @@
         <p:spPr/>
         <p:txBody>
           <a:bodyPr>
-            <a:normAutofit fontScale="92500" lnSpcReduction="20000"/>
+            <a:normAutofit/>
           </a:bodyPr>
           <a:lstStyle/>
           <a:p>
             <a:r>
               <a:rPr lang="en-US" dirty="0" smtClean="0"/>
-              <a:t>IDEs</a:t>
+              <a:t>V8</a:t>
             </a:r>
           </a:p>
           <a:p>
             <a:pPr lvl="1"/>
             <a:r>
+              <a:rPr lang="en-US" sz="2400" dirty="0" smtClean="0"/>
+              <a:t>2010 Crankshaft released, 50% performance increase</a:t>
+            </a:r>
+            <a:endParaRPr lang="en-US" dirty="0" smtClean="0"/>
+          </a:p>
+          <a:p>
+            <a:r>
               <a:rPr lang="en-US" dirty="0" err="1" smtClean="0"/>
-              <a:t>JsFiddle</a:t>
+              <a:t>SpiderMonkey</a:t>
             </a:r>
             <a:endParaRPr lang="en-US" dirty="0" smtClean="0"/>
           </a:p>
           <a:p>
             <a:pPr lvl="1"/>
             <a:r>
-              <a:rPr lang="en-US" dirty="0" err="1" smtClean="0"/>
-              <a:t>WebStorm</a:t>
-            </a:r>
-            <a:r>
-              <a:rPr lang="en-US" dirty="0" smtClean="0"/>
-              <a:t> / </a:t>
-            </a:r>
-            <a:r>
-              <a:rPr lang="en-US" dirty="0" err="1" smtClean="0"/>
-              <a:t>RubyMine</a:t>
-            </a:r>
-            <a:endParaRPr lang="en-US" dirty="0" smtClean="0"/>
-          </a:p>
-          <a:p>
-            <a:r>
-              <a:rPr lang="en-US" dirty="0" smtClean="0"/>
-              <a:t>Cross-compiling / Transcoders</a:t>
+              <a:rPr lang="en-US" sz="2400" dirty="0" smtClean="0"/>
+              <a:t>2009, method-based JIT &amp; tracing JIT</a:t>
             </a:r>
           </a:p>
           <a:p>
             <a:pPr lvl="1"/>
             <a:r>
-              <a:rPr lang="en-US" dirty="0" err="1" smtClean="0"/>
-              <a:t>CoffeeScript</a:t>
-            </a:r>
-            <a:endParaRPr lang="en-US" dirty="0" smtClean="0"/>
+              <a:rPr lang="en-US" sz="2400" dirty="0" smtClean="0"/>
+              <a:t>Used in projects like </a:t>
+            </a:r>
+            <a:r>
+              <a:rPr lang="en-US" sz="2400" dirty="0" err="1" smtClean="0"/>
+              <a:t>Riak</a:t>
+            </a:r>
+            <a:r>
+              <a:rPr lang="en-US" sz="2400" dirty="0" smtClean="0"/>
+              <a:t>, </a:t>
+            </a:r>
+            <a:r>
+              <a:rPr lang="en-US" sz="2400" dirty="0" err="1" smtClean="0"/>
+              <a:t>MongoDB</a:t>
+            </a:r>
+            <a:r>
+              <a:rPr lang="en-US" sz="2400" dirty="0" smtClean="0"/>
+              <a:t>, </a:t>
+            </a:r>
+            <a:r>
+              <a:rPr lang="en-US" sz="2400" dirty="0" err="1" smtClean="0"/>
+              <a:t>CouchDB</a:t>
+            </a:r>
+            <a:endParaRPr lang="en-US" sz="2400" dirty="0" smtClean="0"/>
+          </a:p>
+          <a:p>
+            <a:r>
+              <a:rPr lang="en-US" dirty="0" smtClean="0"/>
+              <a:t>Chakra (IE9)</a:t>
+            </a:r>
           </a:p>
           <a:p>
             <a:pPr lvl="1"/>
             <a:r>
-              <a:rPr lang="en-US" dirty="0" smtClean="0"/>
-              <a:t>Script# (</a:t>
-            </a:r>
-            <a:r>
-              <a:rPr lang="en-US" dirty="0" err="1" smtClean="0"/>
-              <a:t>lulz</a:t>
-            </a:r>
-            <a:r>
-              <a:rPr lang="en-US" dirty="0" smtClean="0"/>
-              <a:t>)</a:t>
-            </a:r>
-          </a:p>
-          <a:p>
-            <a:r>
-              <a:rPr lang="en-US" dirty="0" smtClean="0"/>
-              <a:t>Unit test frameworks</a:t>
+              <a:rPr lang="en-US" sz="2400" dirty="0" smtClean="0"/>
+              <a:t>Uses separate CPU core to JIT</a:t>
             </a:r>
           </a:p>
           <a:p>
             <a:pPr lvl="1"/>
             <a:r>
-              <a:rPr lang="en-US" dirty="0" err="1" smtClean="0"/>
-              <a:t>Qunit</a:t>
-            </a:r>
-            <a:endParaRPr lang="en-US" dirty="0"/>
+              <a:rPr lang="en-US" sz="2400" i="1" dirty="0" smtClean="0"/>
+              <a:t>Claimed</a:t>
+            </a:r>
+            <a:r>
+              <a:rPr lang="en-US" sz="2400" dirty="0" smtClean="0"/>
+              <a:t> to be faster than Chrome, Firefox, Safari &amp; Opera</a:t>
+            </a:r>
           </a:p>
           <a:p>
             <a:pPr lvl="1"/>
             <a:r>
-              <a:rPr lang="en-US" dirty="0" smtClean="0"/>
-              <a:t>Jasmine</a:t>
-            </a:r>
-          </a:p>
-          <a:p>
-            <a:r>
-              <a:rPr lang="en-US" dirty="0" smtClean="0"/>
-              <a:t>Browser Debugging</a:t>
-            </a:r>
-            <a:endParaRPr lang="en-US" dirty="0"/>
+              <a:rPr lang="en-US" sz="2400" dirty="0" smtClean="0"/>
+              <a:t>It’s at least evenly matched (according to ZDNet) – </a:t>
+            </a:r>
+            <a:r>
+              <a:rPr lang="en-US" sz="2400" i="1" dirty="0" smtClean="0"/>
+              <a:t>finally</a:t>
+            </a:r>
+            <a:r>
+              <a:rPr lang="en-US" sz="2400" dirty="0" smtClean="0"/>
+              <a:t>.</a:t>
+            </a:r>
+            <a:endParaRPr lang="en-US" sz="2400" dirty="0"/>
           </a:p>
         </p:txBody>
       </p:sp>
     </p:spTree>
     <p:extLst>
       <p:ext uri="{BB962C8B-B14F-4D97-AF65-F5344CB8AC3E}">
-        <p14:creationId xmlns:p14="http://schemas.microsoft.com/office/powerpoint/2010/main" val="2938081467"/>
+        <p14:creationId xmlns:p14="http://schemas.microsoft.com/office/powerpoint/2010/main" val="451477600"/>
       </p:ext>
     </p:extLst>
   </p:cSld>
   <p:clrMapOvr>
     <a:masterClrMapping/>
   </p:clrMapOvr>
+  <p:timing>
+    <p:tnLst>
+      <p:par>
+        <p:cTn xmlns:p14="http://schemas.microsoft.com/office/powerpoint/2010/main" id="1" dur="indefinite" restart="never" nodeType="tmRoot"/>
+      </p:par>
+    </p:tnLst>
+  </p:timing>
 </p:sld>
 </file>
 
@@ -3861,7 +5792,7 @@
           <a:p>
             <a:r>
               <a:rPr lang="en-US" dirty="0" smtClean="0"/>
-              <a:t>Community!</a:t>
+              <a:t>Richer Environment</a:t>
             </a:r>
             <a:endParaRPr lang="en-US" dirty="0"/>
           </a:p>
@@ -3879,52 +5810,94 @@
         </p:nvSpPr>
         <p:spPr/>
         <p:txBody>
-          <a:bodyPr/>
-          <a:lstStyle/>
-          <a:p>
-            <a:r>
-              <a:rPr lang="en-US" dirty="0" smtClean="0"/>
-              <a:t>Proliferation of great open source tools</a:t>
+          <a:bodyPr>
+            <a:normAutofit fontScale="92500" lnSpcReduction="20000"/>
+          </a:bodyPr>
+          <a:lstStyle/>
+          <a:p>
+            <a:r>
+              <a:rPr lang="en-US" dirty="0" smtClean="0"/>
+              <a:t>IDEs</a:t>
             </a:r>
           </a:p>
           <a:p>
             <a:pPr lvl="1"/>
             <a:r>
               <a:rPr lang="en-US" dirty="0" err="1" smtClean="0"/>
-              <a:t>jQuery</a:t>
+              <a:t>JsFiddle</a:t>
             </a:r>
             <a:endParaRPr lang="en-US" dirty="0" smtClean="0"/>
           </a:p>
           <a:p>
             <a:pPr lvl="1"/>
             <a:r>
-              <a:rPr lang="en-US" dirty="0" smtClean="0"/>
-              <a:t>Knockout</a:t>
+              <a:rPr lang="en-US" dirty="0" err="1" smtClean="0"/>
+              <a:t>WebStorm</a:t>
+            </a:r>
+            <a:r>
+              <a:rPr lang="en-US" dirty="0" smtClean="0"/>
+              <a:t> / </a:t>
+            </a:r>
+            <a:r>
+              <a:rPr lang="en-US" dirty="0" err="1" smtClean="0"/>
+              <a:t>RubyMine</a:t>
+            </a:r>
+            <a:endParaRPr lang="en-US" dirty="0" smtClean="0"/>
+          </a:p>
+          <a:p>
+            <a:r>
+              <a:rPr lang="en-US" dirty="0" smtClean="0"/>
+              <a:t>Cross-compiling / Transcoders</a:t>
             </a:r>
           </a:p>
           <a:p>
             <a:pPr lvl="1"/>
             <a:r>
-              <a:rPr lang="en-US" dirty="0" smtClean="0"/>
-              <a:t>Backbone</a:t>
-            </a:r>
-          </a:p>
-          <a:p>
-            <a:r>
-              <a:rPr lang="en-US" dirty="0" smtClean="0"/>
-              <a:t>Conferences</a:t>
-            </a:r>
-          </a:p>
-          <a:p>
-            <a:r>
-              <a:rPr lang="en-US" dirty="0" smtClean="0"/>
-              <a:t>Content</a:t>
-            </a:r>
-          </a:p>
-          <a:p>
-            <a:r>
-              <a:rPr lang="en-US" dirty="0" smtClean="0"/>
-              <a:t>Openness and Enthusiasm</a:t>
+              <a:rPr lang="en-US" dirty="0" err="1" smtClean="0"/>
+              <a:t>CoffeeScript</a:t>
+            </a:r>
+            <a:endParaRPr lang="en-US" dirty="0" smtClean="0"/>
+          </a:p>
+          <a:p>
+            <a:pPr lvl="1"/>
+            <a:r>
+              <a:rPr lang="en-US" dirty="0" smtClean="0"/>
+              <a:t>Script# (</a:t>
+            </a:r>
+            <a:r>
+              <a:rPr lang="en-US" dirty="0" err="1" smtClean="0"/>
+              <a:t>lulz</a:t>
+            </a:r>
+            <a:r>
+              <a:rPr lang="en-US" dirty="0" smtClean="0"/>
+              <a:t>)</a:t>
+            </a:r>
+          </a:p>
+          <a:p>
+            <a:r>
+              <a:rPr lang="en-US" dirty="0" smtClean="0"/>
+              <a:t>Unit test frameworks</a:t>
+            </a:r>
+          </a:p>
+          <a:p>
+            <a:pPr lvl="1"/>
+            <a:r>
+              <a:rPr lang="en-US" dirty="0" err="1" smtClean="0"/>
+              <a:t>QUnit</a:t>
+            </a:r>
+            <a:endParaRPr lang="en-US" dirty="0"/>
+          </a:p>
+          <a:p>
+            <a:pPr lvl="1"/>
+            <a:r>
+              <a:rPr lang="en-US" dirty="0" smtClean="0"/>
+              <a:t>Jasmine</a:t>
+            </a:r>
+          </a:p>
+          <a:p>
+            <a:r>
+              <a:rPr lang="en-US" dirty="0" smtClean="0"/>
+              <a:t>Browser Debugging</a:t>
             </a:r>
             <a:endParaRPr lang="en-US" dirty="0"/>
           </a:p>
@@ -3933,7 +5906,7 @@
     </p:spTree>
     <p:extLst>
       <p:ext uri="{BB962C8B-B14F-4D97-AF65-F5344CB8AC3E}">
-        <p14:creationId xmlns:p14="http://schemas.microsoft.com/office/powerpoint/2010/main" val="2588365543"/>
+        <p14:creationId xmlns:p14="http://schemas.microsoft.com/office/powerpoint/2010/main" val="2938081467"/>
       </p:ext>
     </p:extLst>
   </p:cSld>
@@ -3977,7 +5950,7 @@
           <a:p>
             <a:r>
               <a:rPr lang="en-US" dirty="0" smtClean="0"/>
-              <a:t>JavaScript Progression</a:t>
+              <a:t>Community!</a:t>
             </a:r>
             <a:endParaRPr lang="en-US" dirty="0"/>
           </a:p>
@@ -3999,54 +5972,56 @@
           <a:lstStyle/>
           <a:p>
             <a:r>
-              <a:rPr lang="en-US" dirty="0" err="1" smtClean="0"/>
+              <a:rPr lang="en-US" dirty="0" smtClean="0"/>
+              <a:t>Proliferation of great open source tools</a:t>
+            </a:r>
+          </a:p>
+          <a:p>
+            <a:pPr lvl="1"/>
+            <a:r>
+              <a:rPr lang="en-US" dirty="0" smtClean="0"/>
               <a:t>jQuery</a:t>
             </a:r>
-            <a:r>
-              <a:rPr lang="en-US" dirty="0" smtClean="0"/>
-              <a:t>/Prototype/Underscore</a:t>
-            </a:r>
-          </a:p>
-          <a:p>
-            <a:r>
-              <a:rPr lang="en-US" dirty="0" smtClean="0"/>
-              <a:t>Full stack monoliths</a:t>
-            </a:r>
           </a:p>
           <a:p>
             <a:pPr lvl="1"/>
             <a:r>
-              <a:rPr lang="en-US" dirty="0" err="1" smtClean="0"/>
-              <a:t>Backbone.js</a:t>
-            </a:r>
-            <a:endParaRPr lang="en-US" dirty="0" smtClean="0"/>
-          </a:p>
-          <a:p>
-            <a:r>
-              <a:rPr lang="en-US" dirty="0" smtClean="0"/>
-              <a:t>With speed improvements and community maturity</a:t>
-            </a:r>
+              <a:rPr lang="en-US" dirty="0" smtClean="0"/>
+              <a:t>Prototype</a:t>
+            </a:r>
+            <a:endParaRPr lang="en-US" dirty="0"/>
           </a:p>
           <a:p>
             <a:pPr lvl="1"/>
             <a:r>
               <a:rPr lang="en-US" dirty="0" smtClean="0"/>
-              <a:t>Smaller module style approaches (thank </a:t>
-            </a:r>
-            <a:r>
-              <a:rPr lang="en-US" dirty="0" err="1" smtClean="0"/>
-              <a:t>CommonJS</a:t>
-            </a:r>
-            <a:r>
-              <a:rPr lang="en-US" dirty="0" smtClean="0"/>
-              <a:t>)</a:t>
+              <a:t>Underscore…&amp; more</a:t>
+            </a:r>
+          </a:p>
+          <a:p>
+            <a:r>
+              <a:rPr lang="en-US" dirty="0" smtClean="0"/>
+              <a:t>Conferences</a:t>
+            </a:r>
+          </a:p>
+          <a:p>
+            <a:r>
+              <a:rPr lang="en-US" dirty="0" smtClean="0"/>
+              <a:t>Vastly Improved Content</a:t>
             </a:r>
           </a:p>
           <a:p>
             <a:pPr lvl="1"/>
             <a:r>
-              <a:rPr lang="en-US" dirty="0" smtClean="0"/>
-              <a:t>Focus on modularity (enable pick and choose)</a:t>
+              <a:rPr lang="en-US" sz="2400" i="1" dirty="0" smtClean="0"/>
+              <a:t>W3Schools is no longer the top hit on Google</a:t>
+            </a:r>
+            <a:endParaRPr lang="en-US" i="1" dirty="0" smtClean="0"/>
+          </a:p>
+          <a:p>
+            <a:r>
+              <a:rPr lang="en-US" dirty="0" smtClean="0"/>
+              <a:t>Openness and Enthusiasm</a:t>
             </a:r>
             <a:endParaRPr lang="en-US" dirty="0"/>
           </a:p>
@@ -4055,7 +6030,7 @@
     </p:spTree>
     <p:extLst>
       <p:ext uri="{BB962C8B-B14F-4D97-AF65-F5344CB8AC3E}">
-        <p14:creationId xmlns:p14="http://schemas.microsoft.com/office/powerpoint/2010/main" val="3207288142"/>
+        <p14:creationId xmlns:p14="http://schemas.microsoft.com/office/powerpoint/2010/main" val="2588365543"/>
       </p:ext>
     </p:extLst>
   </p:cSld>
@@ -4106,126 +6081,804 @@
           <a:p>
             <a:r>
               <a:rPr lang="en-US" dirty="0" smtClean="0"/>
-              <a:t>Server Side Zeitgeist</a:t>
+              <a:t>A .slice() of the Progression</a:t>
             </a:r>
             <a:endParaRPr lang="en-US" dirty="0"/>
           </a:p>
         </p:txBody>
       </p:sp>
-      <p:sp>
-        <p:nvSpPr>
-          <p:cNvPr id="3" name="Content Placeholder 2"/>
-          <p:cNvSpPr>
-            <a:spLocks noGrp="1"/>
-          </p:cNvSpPr>
-          <p:nvPr>
-            <p:ph idx="1"/>
-          </p:nvPr>
-        </p:nvSpPr>
-        <p:spPr/>
-        <p:txBody>
-          <a:bodyPr>
-            <a:normAutofit lnSpcReduction="10000"/>
+      <p:pic>
+        <p:nvPicPr>
+          <p:cNvPr id="5" name="Picture 4"/>
+          <p:cNvPicPr>
+            <a:picLocks noChangeAspect="1"/>
+          </p:cNvPicPr>
+          <p:nvPr/>
+        </p:nvPicPr>
+        <p:blipFill>
+          <a:blip r:embed="rId3"/>
+          <a:stretch>
+            <a:fillRect/>
+          </a:stretch>
+        </p:blipFill>
+        <p:spPr>
+          <a:xfrm>
+            <a:off x="1326465" y="2689073"/>
+            <a:ext cx="1124617" cy="277406"/>
+          </a:xfrm>
+          <a:prstGeom prst="rect">
+            <a:avLst/>
+          </a:prstGeom>
+        </p:spPr>
+      </p:pic>
+      <p:pic>
+        <p:nvPicPr>
+          <p:cNvPr id="6" name="Picture 5"/>
+          <p:cNvPicPr>
+            <a:picLocks noChangeAspect="1"/>
+          </p:cNvPicPr>
+          <p:nvPr/>
+        </p:nvPicPr>
+        <p:blipFill>
+          <a:blip r:embed="rId4"/>
+          <a:stretch>
+            <a:fillRect/>
+          </a:stretch>
+        </p:blipFill>
+        <p:spPr>
+          <a:xfrm>
+            <a:off x="4400607" y="2654521"/>
+            <a:ext cx="1299822" cy="311958"/>
+          </a:xfrm>
+          <a:prstGeom prst="rect">
+            <a:avLst/>
+          </a:prstGeom>
+        </p:spPr>
+      </p:pic>
+      <p:pic>
+        <p:nvPicPr>
+          <p:cNvPr id="8" name="Picture 7"/>
+          <p:cNvPicPr>
+            <a:picLocks noChangeAspect="1"/>
+          </p:cNvPicPr>
+          <p:nvPr/>
+        </p:nvPicPr>
+        <p:blipFill>
+          <a:blip r:embed="rId5"/>
+          <a:stretch>
+            <a:fillRect/>
+          </a:stretch>
+        </p:blipFill>
+        <p:spPr>
+          <a:xfrm>
+            <a:off x="246889" y="3638310"/>
+            <a:ext cx="1015254" cy="444588"/>
+          </a:xfrm>
+          <a:prstGeom prst="rect">
+            <a:avLst/>
+          </a:prstGeom>
+        </p:spPr>
+      </p:pic>
+      <p:pic>
+        <p:nvPicPr>
+          <p:cNvPr id="9" name="Picture 8"/>
+          <p:cNvPicPr>
+            <a:picLocks noChangeAspect="1"/>
+          </p:cNvPicPr>
+          <p:nvPr/>
+        </p:nvPicPr>
+        <p:blipFill>
+          <a:blip r:embed="rId6"/>
+          <a:stretch>
+            <a:fillRect/>
+          </a:stretch>
+        </p:blipFill>
+        <p:spPr>
+          <a:xfrm>
+            <a:off x="3388100" y="3459424"/>
+            <a:ext cx="1584240" cy="892207"/>
+          </a:xfrm>
+          <a:prstGeom prst="rect">
+            <a:avLst/>
+          </a:prstGeom>
+        </p:spPr>
+      </p:pic>
+      <p:cxnSp>
+        <p:nvCxnSpPr>
+          <p:cNvPr id="11" name="Straight Arrow Connector 10"/>
+          <p:cNvCxnSpPr/>
+          <p:nvPr/>
+        </p:nvCxnSpPr>
+        <p:spPr>
+          <a:xfrm flipV="1">
+            <a:off x="97072" y="3421922"/>
+            <a:ext cx="8849750" cy="8089"/>
+          </a:xfrm>
+          <a:prstGeom prst="straightConnector1">
+            <a:avLst/>
+          </a:prstGeom>
+          <a:ln w="57150" cmpd="sng">
+            <a:tailEnd type="arrow"/>
+          </a:ln>
+        </p:spPr>
+        <p:style>
+          <a:lnRef idx="2">
+            <a:schemeClr val="accent1"/>
+          </a:lnRef>
+          <a:fillRef idx="0">
+            <a:schemeClr val="accent1"/>
+          </a:fillRef>
+          <a:effectRef idx="1">
+            <a:schemeClr val="accent1"/>
+          </a:effectRef>
+          <a:fontRef idx="minor">
+            <a:schemeClr val="tx1"/>
+          </a:fontRef>
+        </p:style>
+      </p:cxnSp>
+      <p:sp>
+        <p:nvSpPr>
+          <p:cNvPr id="12" name="TextBox 11"/>
+          <p:cNvSpPr txBox="1"/>
+          <p:nvPr/>
+        </p:nvSpPr>
+        <p:spPr>
+          <a:xfrm>
+            <a:off x="408669" y="3090092"/>
+            <a:ext cx="788560" cy="369332"/>
+          </a:xfrm>
+          <a:prstGeom prst="rect">
+            <a:avLst/>
+          </a:prstGeom>
+          <a:noFill/>
+        </p:spPr>
+        <p:txBody>
+          <a:bodyPr wrap="square" rtlCol="0">
+            <a:spAutoFit/>
           </a:bodyPr>
           <a:lstStyle/>
           <a:p>
-            <a:r>
-              <a:rPr lang="en-US" dirty="0" smtClean="0"/>
-              <a:t>Retreating to principles of HTTP and REST</a:t>
-            </a:r>
-          </a:p>
-          <a:p>
-            <a:pPr lvl="1"/>
+            <a:pPr algn="ctr"/>
+            <a:r>
+              <a:rPr lang="en-US" i="1" dirty="0" smtClean="0"/>
+              <a:t>2004</a:t>
+            </a:r>
+            <a:endParaRPr lang="en-US" i="1" dirty="0"/>
+          </a:p>
+        </p:txBody>
+      </p:sp>
+      <p:sp>
+        <p:nvSpPr>
+          <p:cNvPr id="13" name="TextBox 12"/>
+          <p:cNvSpPr txBox="1"/>
+          <p:nvPr/>
+        </p:nvSpPr>
+        <p:spPr>
+          <a:xfrm>
+            <a:off x="1577432" y="3090092"/>
+            <a:ext cx="752310" cy="369332"/>
+          </a:xfrm>
+          <a:prstGeom prst="rect">
+            <a:avLst/>
+          </a:prstGeom>
+          <a:noFill/>
+        </p:spPr>
+        <p:txBody>
+          <a:bodyPr wrap="square" rtlCol="0">
+            <a:spAutoFit/>
+          </a:bodyPr>
+          <a:lstStyle/>
+          <a:p>
+            <a:pPr algn="ctr"/>
+            <a:r>
+              <a:rPr lang="en-US" i="1" dirty="0" smtClean="0"/>
+              <a:t>2006</a:t>
+            </a:r>
+            <a:endParaRPr lang="en-US" i="1" dirty="0"/>
+          </a:p>
+        </p:txBody>
+      </p:sp>
+      <p:sp>
+        <p:nvSpPr>
+          <p:cNvPr id="14" name="TextBox 13"/>
+          <p:cNvSpPr txBox="1"/>
+          <p:nvPr/>
+        </p:nvSpPr>
+        <p:spPr>
+          <a:xfrm>
+            <a:off x="5391717" y="3090092"/>
+            <a:ext cx="752310" cy="369332"/>
+          </a:xfrm>
+          <a:prstGeom prst="rect">
+            <a:avLst/>
+          </a:prstGeom>
+          <a:noFill/>
+        </p:spPr>
+        <p:txBody>
+          <a:bodyPr wrap="square" rtlCol="0">
+            <a:spAutoFit/>
+          </a:bodyPr>
+          <a:lstStyle/>
+          <a:p>
+            <a:pPr algn="ctr"/>
+            <a:r>
+              <a:rPr lang="en-US" i="1" dirty="0" smtClean="0"/>
+              <a:t>2010</a:t>
+            </a:r>
+            <a:endParaRPr lang="en-US" i="1" dirty="0"/>
+          </a:p>
+        </p:txBody>
+      </p:sp>
+      <p:sp>
+        <p:nvSpPr>
+          <p:cNvPr id="15" name="TextBox 14"/>
+          <p:cNvSpPr txBox="1"/>
+          <p:nvPr/>
+        </p:nvSpPr>
+        <p:spPr>
+          <a:xfrm>
+            <a:off x="4090594" y="3090092"/>
+            <a:ext cx="752310" cy="369332"/>
+          </a:xfrm>
+          <a:prstGeom prst="rect">
+            <a:avLst/>
+          </a:prstGeom>
+          <a:noFill/>
+        </p:spPr>
+        <p:txBody>
+          <a:bodyPr wrap="square" rtlCol="0">
+            <a:spAutoFit/>
+          </a:bodyPr>
+          <a:lstStyle/>
+          <a:p>
+            <a:pPr algn="ctr"/>
+            <a:r>
+              <a:rPr lang="en-US" i="1" dirty="0" smtClean="0"/>
+              <a:t>2009</a:t>
+            </a:r>
+            <a:endParaRPr lang="en-US" i="1" dirty="0"/>
+          </a:p>
+        </p:txBody>
+      </p:sp>
+      <p:pic>
+        <p:nvPicPr>
+          <p:cNvPr id="16" name="Picture 15"/>
+          <p:cNvPicPr>
+            <a:picLocks noChangeAspect="1"/>
+          </p:cNvPicPr>
+          <p:nvPr/>
+        </p:nvPicPr>
+        <p:blipFill>
+          <a:blip r:embed="rId7"/>
+          <a:stretch>
+            <a:fillRect/>
+          </a:stretch>
+        </p:blipFill>
+        <p:spPr>
+          <a:xfrm>
+            <a:off x="5063935" y="3613119"/>
+            <a:ext cx="1520812" cy="442768"/>
+          </a:xfrm>
+          <a:prstGeom prst="rect">
+            <a:avLst/>
+          </a:prstGeom>
+          <a:solidFill>
+            <a:srgbClr val="800000"/>
+          </a:solidFill>
+        </p:spPr>
+      </p:pic>
+      <p:pic>
+        <p:nvPicPr>
+          <p:cNvPr id="18" name="Picture 17"/>
+          <p:cNvPicPr>
+            <a:picLocks noChangeAspect="1"/>
+          </p:cNvPicPr>
+          <p:nvPr/>
+        </p:nvPicPr>
+        <p:blipFill>
+          <a:blip r:embed="rId8"/>
+          <a:stretch>
+            <a:fillRect/>
+          </a:stretch>
+        </p:blipFill>
+        <p:spPr>
+          <a:xfrm>
+            <a:off x="5880958" y="2594819"/>
+            <a:ext cx="1360482" cy="445249"/>
+          </a:xfrm>
+          <a:prstGeom prst="rect">
+            <a:avLst/>
+          </a:prstGeom>
+        </p:spPr>
+      </p:pic>
+      <p:pic>
+        <p:nvPicPr>
+          <p:cNvPr id="19" name="Picture 18"/>
+          <p:cNvPicPr>
+            <a:picLocks noChangeAspect="1"/>
+          </p:cNvPicPr>
+          <p:nvPr/>
+        </p:nvPicPr>
+        <p:blipFill>
+          <a:blip r:embed="rId9"/>
+          <a:stretch>
+            <a:fillRect/>
+          </a:stretch>
+        </p:blipFill>
+        <p:spPr>
+          <a:xfrm>
+            <a:off x="7047304" y="3627444"/>
+            <a:ext cx="1705382" cy="371813"/>
+          </a:xfrm>
+          <a:prstGeom prst="rect">
+            <a:avLst/>
+          </a:prstGeom>
+        </p:spPr>
+      </p:pic>
+      <p:sp>
+        <p:nvSpPr>
+          <p:cNvPr id="20" name="TextBox 19"/>
+          <p:cNvSpPr txBox="1"/>
+          <p:nvPr/>
+        </p:nvSpPr>
+        <p:spPr>
+          <a:xfrm>
+            <a:off x="7331786" y="3088782"/>
+            <a:ext cx="752310" cy="369332"/>
+          </a:xfrm>
+          <a:prstGeom prst="rect">
+            <a:avLst/>
+          </a:prstGeom>
+          <a:noFill/>
+        </p:spPr>
+        <p:txBody>
+          <a:bodyPr wrap="square" rtlCol="0">
+            <a:spAutoFit/>
+          </a:bodyPr>
+          <a:lstStyle/>
+          <a:p>
+            <a:pPr algn="ctr"/>
+            <a:r>
+              <a:rPr lang="en-US" i="1" dirty="0" smtClean="0"/>
+              <a:t>2011</a:t>
+            </a:r>
+            <a:endParaRPr lang="en-US" i="1" dirty="0"/>
+          </a:p>
+        </p:txBody>
+      </p:sp>
+      <p:pic>
+        <p:nvPicPr>
+          <p:cNvPr id="22" name="Picture 21"/>
+          <p:cNvPicPr>
+            <a:picLocks noChangeAspect="1"/>
+          </p:cNvPicPr>
+          <p:nvPr/>
+        </p:nvPicPr>
+        <p:blipFill>
+          <a:blip r:embed="rId10"/>
+          <a:stretch>
+            <a:fillRect/>
+          </a:stretch>
+        </p:blipFill>
+        <p:spPr>
+          <a:xfrm>
+            <a:off x="2629039" y="2671770"/>
+            <a:ext cx="1698678" cy="278619"/>
+          </a:xfrm>
+          <a:prstGeom prst="rect">
+            <a:avLst/>
+          </a:prstGeom>
+        </p:spPr>
+      </p:pic>
+      <p:sp>
+        <p:nvSpPr>
+          <p:cNvPr id="23" name="TextBox 22"/>
+          <p:cNvSpPr txBox="1"/>
+          <p:nvPr/>
+        </p:nvSpPr>
+        <p:spPr>
+          <a:xfrm>
+            <a:off x="3113111" y="3090092"/>
+            <a:ext cx="752310" cy="369332"/>
+          </a:xfrm>
+          <a:prstGeom prst="rect">
+            <a:avLst/>
+          </a:prstGeom>
+          <a:noFill/>
+        </p:spPr>
+        <p:txBody>
+          <a:bodyPr wrap="square" rtlCol="0">
+            <a:spAutoFit/>
+          </a:bodyPr>
+          <a:lstStyle/>
+          <a:p>
+            <a:pPr algn="ctr"/>
+            <a:r>
+              <a:rPr lang="en-US" i="1" dirty="0" smtClean="0"/>
+              <a:t>2008</a:t>
+            </a:r>
+            <a:endParaRPr lang="en-US" i="1" dirty="0"/>
+          </a:p>
+        </p:txBody>
+      </p:sp>
+      <p:sp>
+        <p:nvSpPr>
+          <p:cNvPr id="25" name="Rounded Rectangle 24"/>
+          <p:cNvSpPr/>
+          <p:nvPr/>
+        </p:nvSpPr>
+        <p:spPr>
+          <a:xfrm>
+            <a:off x="2577886" y="4286911"/>
+            <a:ext cx="6174800" cy="388303"/>
+          </a:xfrm>
+          <a:prstGeom prst="roundRect">
+            <a:avLst/>
+          </a:prstGeom>
+        </p:spPr>
+        <p:style>
+          <a:lnRef idx="1">
+            <a:schemeClr val="accent1"/>
+          </a:lnRef>
+          <a:fillRef idx="3">
+            <a:schemeClr val="accent1"/>
+          </a:fillRef>
+          <a:effectRef idx="2">
+            <a:schemeClr val="accent1"/>
+          </a:effectRef>
+          <a:fontRef idx="minor">
+            <a:schemeClr val="lt1"/>
+          </a:fontRef>
+        </p:style>
+        <p:txBody>
+          <a:bodyPr rtlCol="0" anchor="ctr"/>
+          <a:lstStyle/>
+          <a:p>
+            <a:pPr algn="ctr"/>
             <a:r>
               <a:rPr lang="en-US" dirty="0" err="1" smtClean="0"/>
-              <a:t>Misultin</a:t>
-            </a:r>
-            <a:r>
-              <a:rPr lang="en-US" dirty="0" smtClean="0"/>
-              <a:t>, Cowboy, </a:t>
-            </a:r>
-            <a:r>
-              <a:rPr lang="en-US" dirty="0" err="1" smtClean="0"/>
-              <a:t>WebMachine</a:t>
-            </a:r>
-            <a:r>
-              <a:rPr lang="en-US" dirty="0" smtClean="0"/>
-              <a:t> (Erlang)</a:t>
-            </a:r>
-          </a:p>
-          <a:p>
-            <a:pPr lvl="1"/>
-            <a:r>
-              <a:rPr lang="en-US" dirty="0" smtClean="0"/>
-              <a:t>Sinatra (Ruby)</a:t>
-            </a:r>
-          </a:p>
-          <a:p>
-            <a:pPr lvl="1"/>
-            <a:r>
-              <a:rPr lang="en-US" dirty="0" smtClean="0"/>
-              <a:t>Express / Express-Resource (Node)</a:t>
-            </a:r>
-          </a:p>
-          <a:p>
-            <a:pPr lvl="1"/>
-            <a:r>
-              <a:rPr lang="en-US" dirty="0" smtClean="0"/>
-              <a:t>Nancy, Kayak, OWIN (</a:t>
-            </a:r>
-            <a:r>
-              <a:rPr lang="en-US" dirty="0" err="1" smtClean="0"/>
-              <a:t>.Net</a:t>
-            </a:r>
-            <a:r>
-              <a:rPr lang="en-US" dirty="0" smtClean="0"/>
-              <a:t>)</a:t>
-            </a:r>
-          </a:p>
-          <a:p>
-            <a:r>
-              <a:rPr lang="en-US" dirty="0" smtClean="0"/>
-              <a:t>Focus </a:t>
-            </a:r>
-          </a:p>
-          <a:p>
-            <a:pPr lvl="1"/>
-            <a:r>
-              <a:rPr lang="en-US" dirty="0" smtClean="0"/>
-              <a:t>server-side resources</a:t>
-            </a:r>
-          </a:p>
-          <a:p>
-            <a:pPr lvl="1"/>
-            <a:r>
-              <a:rPr lang="en-US" b="1" i="1" dirty="0" smtClean="0"/>
-              <a:t>any </a:t>
-            </a:r>
-            <a:r>
-              <a:rPr lang="en-US" dirty="0" smtClean="0"/>
-              <a:t>client can consume</a:t>
-            </a:r>
-          </a:p>
-          <a:p>
-            <a:pPr lvl="1"/>
-            <a:r>
-              <a:rPr lang="en-US" b="1" i="1" dirty="0" smtClean="0"/>
-              <a:t>OPEN STANDARDS!</a:t>
-            </a:r>
-            <a:endParaRPr lang="en-US" b="1" i="1" dirty="0"/>
+              <a:t>Templating</a:t>
+            </a:r>
+            <a:r>
+              <a:rPr lang="en-US" dirty="0" smtClean="0"/>
+              <a:t> Engines, DSLs for HTML and CSS</a:t>
+            </a:r>
+            <a:endParaRPr lang="en-US" dirty="0"/>
+          </a:p>
+        </p:txBody>
+      </p:sp>
+      <p:sp>
+        <p:nvSpPr>
+          <p:cNvPr id="28" name="TextBox 27"/>
+          <p:cNvSpPr txBox="1"/>
+          <p:nvPr/>
+        </p:nvSpPr>
+        <p:spPr>
+          <a:xfrm>
+            <a:off x="307395" y="5153106"/>
+            <a:ext cx="8542355" cy="338554"/>
+          </a:xfrm>
+          <a:prstGeom prst="rect">
+            <a:avLst/>
+          </a:prstGeom>
+          <a:noFill/>
+        </p:spPr>
+        <p:txBody>
+          <a:bodyPr wrap="square" rtlCol="0">
+            <a:spAutoFit/>
+          </a:bodyPr>
+          <a:lstStyle/>
+          <a:p>
+            <a:pPr marL="285750" indent="-285750">
+              <a:buFont typeface="Arial"/>
+              <a:buChar char="•"/>
+            </a:pPr>
+            <a:r>
+              <a:rPr lang="en-US" sz="1600" dirty="0" smtClean="0"/>
+              <a:t>Helper Libraries, “modularizing”, app frameworks, binding frameworks, XHR/Ajax abstractions</a:t>
+            </a:r>
+          </a:p>
+        </p:txBody>
+      </p:sp>
+      <p:sp>
+        <p:nvSpPr>
+          <p:cNvPr id="29" name="TextBox 28"/>
+          <p:cNvSpPr txBox="1"/>
+          <p:nvPr/>
+        </p:nvSpPr>
+        <p:spPr>
+          <a:xfrm>
+            <a:off x="307395" y="5549493"/>
+            <a:ext cx="8542355" cy="338554"/>
+          </a:xfrm>
+          <a:prstGeom prst="rect">
+            <a:avLst/>
+          </a:prstGeom>
+          <a:noFill/>
+        </p:spPr>
+        <p:txBody>
+          <a:bodyPr wrap="square" rtlCol="0">
+            <a:spAutoFit/>
+          </a:bodyPr>
+          <a:lstStyle/>
+          <a:p>
+            <a:pPr marL="285750" indent="-285750">
+              <a:buFont typeface="Arial"/>
+              <a:buChar char="•"/>
+            </a:pPr>
+            <a:r>
+              <a:rPr lang="en-US" sz="1600" dirty="0"/>
+              <a:t>We’ve gone from form validation &amp; alert to rendering PDFs, Linux emulation &amp; audio processing</a:t>
+            </a:r>
+          </a:p>
+        </p:txBody>
+      </p:sp>
+      <p:sp>
+        <p:nvSpPr>
+          <p:cNvPr id="30" name="TextBox 29"/>
+          <p:cNvSpPr txBox="1"/>
+          <p:nvPr/>
+        </p:nvSpPr>
+        <p:spPr>
+          <a:xfrm>
+            <a:off x="306104" y="5920323"/>
+            <a:ext cx="8542355" cy="338554"/>
+          </a:xfrm>
+          <a:prstGeom prst="rect">
+            <a:avLst/>
+          </a:prstGeom>
+          <a:noFill/>
+        </p:spPr>
+        <p:txBody>
+          <a:bodyPr wrap="square" rtlCol="0">
+            <a:spAutoFit/>
+          </a:bodyPr>
+          <a:lstStyle/>
+          <a:p>
+            <a:pPr marL="285750" indent="-285750">
+              <a:buFont typeface="Arial"/>
+              <a:buChar char="•"/>
+            </a:pPr>
+            <a:r>
+              <a:rPr lang="en-US" sz="1600" dirty="0" smtClean="0"/>
+              <a:t>HTML 5 &amp; Local Storage rounding out client capacity for rich application experience</a:t>
+            </a:r>
+            <a:endParaRPr lang="en-US" sz="1600" dirty="0"/>
+          </a:p>
+        </p:txBody>
+      </p:sp>
+      <p:sp>
+        <p:nvSpPr>
+          <p:cNvPr id="31" name="Rounded Rectangle 30"/>
+          <p:cNvSpPr/>
+          <p:nvPr/>
+        </p:nvSpPr>
+        <p:spPr>
+          <a:xfrm>
+            <a:off x="4842904" y="2062860"/>
+            <a:ext cx="3965211" cy="388303"/>
+          </a:xfrm>
+          <a:prstGeom prst="roundRect">
+            <a:avLst/>
+          </a:prstGeom>
+        </p:spPr>
+        <p:style>
+          <a:lnRef idx="2">
+            <a:schemeClr val="accent3">
+              <a:shade val="50000"/>
+            </a:schemeClr>
+          </a:lnRef>
+          <a:fillRef idx="1">
+            <a:schemeClr val="accent3"/>
+          </a:fillRef>
+          <a:effectRef idx="0">
+            <a:schemeClr val="accent3"/>
+          </a:effectRef>
+          <a:fontRef idx="minor">
+            <a:schemeClr val="lt1"/>
+          </a:fontRef>
+        </p:style>
+        <p:txBody>
+          <a:bodyPr rtlCol="0" anchor="ctr"/>
+          <a:lstStyle/>
+          <a:p>
+            <a:pPr algn="ctr"/>
+            <a:r>
+              <a:rPr lang="en-US" dirty="0" smtClean="0">
+                <a:solidFill>
+                  <a:schemeClr val="tx1"/>
+                </a:solidFill>
+              </a:rPr>
+              <a:t>Client-side pub/sub libraries increase</a:t>
+            </a:r>
+            <a:endParaRPr lang="en-US" dirty="0">
+              <a:solidFill>
+                <a:schemeClr val="tx1"/>
+              </a:solidFill>
+            </a:endParaRPr>
           </a:p>
         </p:txBody>
       </p:sp>
     </p:spTree>
     <p:extLst>
       <p:ext uri="{BB962C8B-B14F-4D97-AF65-F5344CB8AC3E}">
-        <p14:creationId xmlns:p14="http://schemas.microsoft.com/office/powerpoint/2010/main" val="316421455"/>
+        <p14:creationId xmlns:p14="http://schemas.microsoft.com/office/powerpoint/2010/main" val="3493061952"/>
       </p:ext>
     </p:extLst>
   </p:cSld>
   <p:clrMapOvr>
     <a:masterClrMapping/>
   </p:clrMapOvr>
+  <p:timing>
+    <p:tnLst>
+      <p:par>
+        <p:cTn xmlns:p14="http://schemas.microsoft.com/office/powerpoint/2010/main" id="1" dur="indefinite" restart="never" nodeType="tmRoot">
+          <p:childTnLst>
+            <p:seq concurrent="1" nextAc="seek">
+              <p:cTn id="2" dur="indefinite" nodeType="mainSeq">
+                <p:childTnLst>
+                  <p:par>
+                    <p:cTn id="3" fill="hold">
+                      <p:stCondLst>
+                        <p:cond delay="indefinite"/>
+                      </p:stCondLst>
+                      <p:childTnLst>
+                        <p:par>
+                          <p:cTn id="4" fill="hold">
+                            <p:stCondLst>
+                              <p:cond delay="0"/>
+                            </p:stCondLst>
+                            <p:childTnLst>
+                              <p:par>
+                                <p:cTn id="5" presetID="1" presetClass="entr" presetSubtype="0" fill="hold" grpId="0" nodeType="clickEffect">
+                                  <p:stCondLst>
+                                    <p:cond delay="0"/>
+                                  </p:stCondLst>
+                                  <p:childTnLst>
+                                    <p:set>
+                                      <p:cBhvr>
+                                        <p:cTn id="6" dur="1" fill="hold">
+                                          <p:stCondLst>
+                                            <p:cond delay="0"/>
+                                          </p:stCondLst>
+                                        </p:cTn>
+                                        <p:tgtEl>
+                                          <p:spTgt spid="28"/>
+                                        </p:tgtEl>
+                                        <p:attrNameLst>
+                                          <p:attrName>style.visibility</p:attrName>
+                                        </p:attrNameLst>
+                                      </p:cBhvr>
+                                      <p:to>
+                                        <p:strVal val="visible"/>
+                                      </p:to>
+                                    </p:set>
+                                  </p:childTnLst>
+                                </p:cTn>
+                              </p:par>
+                            </p:childTnLst>
+                          </p:cTn>
+                        </p:par>
+                      </p:childTnLst>
+                    </p:cTn>
+                  </p:par>
+                  <p:par>
+                    <p:cTn id="7" fill="hold">
+                      <p:stCondLst>
+                        <p:cond delay="indefinite"/>
+                      </p:stCondLst>
+                      <p:childTnLst>
+                        <p:par>
+                          <p:cTn id="8" fill="hold">
+                            <p:stCondLst>
+                              <p:cond delay="0"/>
+                            </p:stCondLst>
+                            <p:childTnLst>
+                              <p:par>
+                                <p:cTn id="9" presetID="1" presetClass="entr" presetSubtype="0" fill="hold" grpId="0" nodeType="clickEffect">
+                                  <p:stCondLst>
+                                    <p:cond delay="0"/>
+                                  </p:stCondLst>
+                                  <p:childTnLst>
+                                    <p:set>
+                                      <p:cBhvr>
+                                        <p:cTn id="10" dur="1" fill="hold">
+                                          <p:stCondLst>
+                                            <p:cond delay="0"/>
+                                          </p:stCondLst>
+                                        </p:cTn>
+                                        <p:tgtEl>
+                                          <p:spTgt spid="29"/>
+                                        </p:tgtEl>
+                                        <p:attrNameLst>
+                                          <p:attrName>style.visibility</p:attrName>
+                                        </p:attrNameLst>
+                                      </p:cBhvr>
+                                      <p:to>
+                                        <p:strVal val="visible"/>
+                                      </p:to>
+                                    </p:set>
+                                  </p:childTnLst>
+                                </p:cTn>
+                              </p:par>
+                            </p:childTnLst>
+                          </p:cTn>
+                        </p:par>
+                      </p:childTnLst>
+                    </p:cTn>
+                  </p:par>
+                  <p:par>
+                    <p:cTn id="11" fill="hold">
+                      <p:stCondLst>
+                        <p:cond delay="indefinite"/>
+                      </p:stCondLst>
+                      <p:childTnLst>
+                        <p:par>
+                          <p:cTn id="12" fill="hold">
+                            <p:stCondLst>
+                              <p:cond delay="0"/>
+                            </p:stCondLst>
+                            <p:childTnLst>
+                              <p:par>
+                                <p:cTn id="13" presetID="1" presetClass="entr" presetSubtype="0" fill="hold" grpId="0" nodeType="clickEffect">
+                                  <p:stCondLst>
+                                    <p:cond delay="0"/>
+                                  </p:stCondLst>
+                                  <p:childTnLst>
+                                    <p:set>
+                                      <p:cBhvr>
+                                        <p:cTn id="14" dur="1" fill="hold">
+                                          <p:stCondLst>
+                                            <p:cond delay="0"/>
+                                          </p:stCondLst>
+                                        </p:cTn>
+                                        <p:tgtEl>
+                                          <p:spTgt spid="30"/>
+                                        </p:tgtEl>
+                                        <p:attrNameLst>
+                                          <p:attrName>style.visibility</p:attrName>
+                                        </p:attrNameLst>
+                                      </p:cBhvr>
+                                      <p:to>
+                                        <p:strVal val="visible"/>
+                                      </p:to>
+                                    </p:set>
+                                  </p:childTnLst>
+                                </p:cTn>
+                              </p:par>
+                            </p:childTnLst>
+                          </p:cTn>
+                        </p:par>
+                      </p:childTnLst>
+                    </p:cTn>
+                  </p:par>
+                </p:childTnLst>
+              </p:cTn>
+              <p:prevCondLst>
+                <p:cond evt="onPrev" delay="0">
+                  <p:tgtEl>
+                    <p:sldTgt/>
+                  </p:tgtEl>
+                </p:cond>
+              </p:prevCondLst>
+              <p:nextCondLst>
+                <p:cond evt="onNext" delay="0">
+                  <p:tgtEl>
+                    <p:sldTgt/>
+                  </p:tgtEl>
+                </p:cond>
+              </p:nextCondLst>
+            </p:seq>
+          </p:childTnLst>
+        </p:cTn>
+      </p:par>
+    </p:tnLst>
+    <p:bldLst>
+      <p:bldP spid="28" grpId="0"/>
+      <p:bldP spid="29" grpId="0"/>
+      <p:bldP spid="30" grpId="0"/>
+    </p:bldLst>
+  </p:timing>
 </p:sld>
 </file>
 
@@ -4263,94 +6916,53 @@
           <a:p>
             <a:r>
               <a:rPr lang="en-US" dirty="0" smtClean="0"/>
-              <a:t>Where’s This Going?</a:t>
+              <a:t>SproutCore puts it this way:</a:t>
             </a:r>
             <a:endParaRPr lang="en-US" dirty="0"/>
           </a:p>
         </p:txBody>
       </p:sp>
-      <p:sp>
-        <p:nvSpPr>
-          <p:cNvPr id="3" name="Content Placeholder 2"/>
-          <p:cNvSpPr>
-            <a:spLocks noGrp="1"/>
-          </p:cNvSpPr>
-          <p:nvPr>
-            <p:ph idx="1"/>
-          </p:nvPr>
-        </p:nvSpPr>
-        <p:spPr/>
-        <p:txBody>
-          <a:bodyPr>
-            <a:normAutofit lnSpcReduction="10000"/>
-          </a:bodyPr>
-          <a:lstStyle/>
-          <a:p>
-            <a:r>
-              <a:rPr lang="en-US" dirty="0" smtClean="0"/>
-              <a:t>Proliferation of powerful clients</a:t>
-            </a:r>
-          </a:p>
-          <a:p>
-            <a:pPr lvl="1"/>
-            <a:r>
-              <a:rPr lang="en-US" dirty="0" smtClean="0"/>
-              <a:t>PC (duh)</a:t>
-            </a:r>
-          </a:p>
-          <a:p>
-            <a:pPr lvl="1"/>
-            <a:r>
-              <a:rPr lang="en-US" dirty="0" smtClean="0"/>
-              <a:t>Mobile</a:t>
-            </a:r>
-          </a:p>
-          <a:p>
-            <a:pPr lvl="1"/>
-            <a:r>
-              <a:rPr lang="en-US" dirty="0" smtClean="0"/>
-              <a:t>Web</a:t>
-            </a:r>
-          </a:p>
-          <a:p>
-            <a:r>
-              <a:rPr lang="en-US" dirty="0" smtClean="0"/>
-              <a:t>Users expectations have shifted</a:t>
-            </a:r>
-          </a:p>
-          <a:p>
-            <a:pPr lvl="1"/>
-            <a:r>
-              <a:rPr lang="en-US" dirty="0" smtClean="0"/>
-              <a:t>Consistency of experience</a:t>
-            </a:r>
-          </a:p>
-          <a:p>
-            <a:pPr lvl="1"/>
-            <a:r>
-              <a:rPr lang="en-US" dirty="0" smtClean="0"/>
-              <a:t>Fluid device transition (Continuous Client)</a:t>
-            </a:r>
-          </a:p>
-          <a:p>
-            <a:r>
-              <a:rPr lang="en-US" b="1" dirty="0" smtClean="0"/>
-              <a:t>You can’t afford to write the server-side multiple times</a:t>
-            </a:r>
-            <a:endParaRPr lang="en-US" b="1" dirty="0"/>
-          </a:p>
-        </p:txBody>
-      </p:sp>
+      <p:pic>
+        <p:nvPicPr>
+          <p:cNvPr id="4" name="Picture 3"/>
+          <p:cNvPicPr>
+            <a:picLocks noChangeAspect="1"/>
+          </p:cNvPicPr>
+          <p:nvPr/>
+        </p:nvPicPr>
+        <p:blipFill>
+          <a:blip r:embed="rId2"/>
+          <a:stretch>
+            <a:fillRect/>
+          </a:stretch>
+        </p:blipFill>
+        <p:spPr>
+          <a:xfrm>
+            <a:off x="2197100" y="1816100"/>
+            <a:ext cx="4737100" cy="3225800"/>
+          </a:xfrm>
+          <a:prstGeom prst="rect">
+            <a:avLst/>
+          </a:prstGeom>
+        </p:spPr>
+      </p:pic>
     </p:spTree>
     <p:extLst>
       <p:ext uri="{BB962C8B-B14F-4D97-AF65-F5344CB8AC3E}">
-        <p14:creationId xmlns:p14="http://schemas.microsoft.com/office/powerpoint/2010/main" val="3913763961"/>
+        <p14:creationId xmlns:p14="http://schemas.microsoft.com/office/powerpoint/2010/main" val="458374057"/>
       </p:ext>
     </p:extLst>
   </p:cSld>
   <p:clrMapOvr>
     <a:masterClrMapping/>
   </p:clrMapOvr>
+  <p:timing>
+    <p:tnLst>
+      <p:par>
+        <p:cTn xmlns:p14="http://schemas.microsoft.com/office/powerpoint/2010/main" id="1" dur="indefinite" restart="never" nodeType="tmRoot"/>
+      </p:par>
+    </p:tnLst>
+  </p:timing>
 </p:sld>
 </file>
 
@@ -4384,85 +6996,97 @@
         <p:spPr/>
         <p:txBody>
           <a:bodyPr>
-            <a:normAutofit fontScale="90000"/>
+            <a:normAutofit/>
           </a:bodyPr>
           <a:lstStyle/>
           <a:p>
             <a:r>
               <a:rPr lang="en-US" dirty="0" smtClean="0"/>
-              <a:t>Challenging The Reigning Assumption</a:t>
+              <a:t>SproutCore’s prediction: true?</a:t>
             </a:r>
             <a:endParaRPr lang="en-US" dirty="0"/>
           </a:p>
         </p:txBody>
       </p:sp>
-      <p:sp>
-        <p:nvSpPr>
-          <p:cNvPr id="3" name="Content Placeholder 2"/>
-          <p:cNvSpPr>
-            <a:spLocks noGrp="1"/>
-          </p:cNvSpPr>
-          <p:nvPr>
-            <p:ph idx="1"/>
-          </p:nvPr>
-        </p:nvSpPr>
-        <p:spPr/>
-        <p:txBody>
-          <a:bodyPr/>
-          <a:lstStyle/>
-          <a:p>
-            <a:r>
-              <a:rPr lang="en-US" dirty="0" smtClean="0"/>
-              <a:t>Server-side web frameworks are not your best friend</a:t>
-            </a:r>
-          </a:p>
-          <a:p>
-            <a:pPr lvl="1"/>
-            <a:r>
-              <a:rPr lang="en-US" dirty="0" smtClean="0"/>
-              <a:t>Adding overhead</a:t>
-            </a:r>
-          </a:p>
-          <a:p>
-            <a:pPr lvl="1"/>
-            <a:r>
-              <a:rPr lang="en-US" dirty="0" smtClean="0"/>
-              <a:t>Providing poor abstractions</a:t>
-            </a:r>
-          </a:p>
-          <a:p>
-            <a:pPr lvl="1"/>
-            <a:r>
-              <a:rPr lang="en-US" dirty="0" smtClean="0"/>
-              <a:t>Myopic world view, “Everything is a web client!”</a:t>
-            </a:r>
-          </a:p>
-          <a:p>
-            <a:pPr lvl="1"/>
-            <a:r>
-              <a:rPr lang="en-US" dirty="0" smtClean="0"/>
-              <a:t>Tight coupling of server and client</a:t>
-            </a:r>
-          </a:p>
-          <a:p>
-            <a:r>
-              <a:rPr lang="en-US" dirty="0" smtClean="0"/>
-              <a:t>What if your server just provided access to state and governed access and operations?</a:t>
-            </a:r>
-            <a:endParaRPr lang="en-US" dirty="0"/>
+      <p:pic>
+        <p:nvPicPr>
+          <p:cNvPr id="4" name="Picture 3"/>
+          <p:cNvPicPr>
+            <a:picLocks noChangeAspect="1"/>
+          </p:cNvPicPr>
+          <p:nvPr/>
+        </p:nvPicPr>
+        <p:blipFill>
+          <a:blip r:embed="rId2"/>
+          <a:stretch>
+            <a:fillRect/>
+          </a:stretch>
+        </p:blipFill>
+        <p:spPr>
+          <a:xfrm>
+            <a:off x="2197100" y="1803400"/>
+            <a:ext cx="4737100" cy="3238500"/>
+          </a:xfrm>
+          <a:prstGeom prst="rect">
+            <a:avLst/>
+          </a:prstGeom>
+        </p:spPr>
+      </p:pic>
+      <p:sp>
+        <p:nvSpPr>
+          <p:cNvPr id="5" name="TextBox 4"/>
+          <p:cNvSpPr txBox="1"/>
+          <p:nvPr/>
+        </p:nvSpPr>
+        <p:spPr>
+          <a:xfrm>
+            <a:off x="331663" y="5557589"/>
+            <a:ext cx="8355137" cy="584776"/>
+          </a:xfrm>
+          <a:prstGeom prst="rect">
+            <a:avLst/>
+          </a:prstGeom>
+          <a:noFill/>
+        </p:spPr>
+        <p:txBody>
+          <a:bodyPr wrap="square" rtlCol="0">
+            <a:spAutoFit/>
+          </a:bodyPr>
+          <a:lstStyle/>
+          <a:p>
+            <a:pPr algn="ctr"/>
+            <a:r>
+              <a:rPr lang="en-US" dirty="0" smtClean="0"/>
+              <a:t>* We’re not saying that server-focused web apps are going away…entirely</a:t>
+            </a:r>
+          </a:p>
+          <a:p>
+            <a:pPr algn="ctr"/>
+            <a:r>
+              <a:rPr lang="en-US" sz="1400" i="1" dirty="0" smtClean="0"/>
+              <a:t>** Also, no server-side apps were harmed in the making of this presentation….</a:t>
+            </a:r>
+            <a:endParaRPr lang="en-US" i="1" dirty="0"/>
           </a:p>
         </p:txBody>
       </p:sp>
     </p:spTree>
     <p:extLst>
       <p:ext uri="{BB962C8B-B14F-4D97-AF65-F5344CB8AC3E}">
-        <p14:creationId xmlns:p14="http://schemas.microsoft.com/office/powerpoint/2010/main" val="1558913479"/>
+        <p14:creationId xmlns:p14="http://schemas.microsoft.com/office/powerpoint/2010/main" val="64137391"/>
       </p:ext>
     </p:extLst>
   </p:cSld>
   <p:clrMapOvr>
     <a:masterClrMapping/>
   </p:clrMapOvr>
+  <p:timing>
+    <p:tnLst>
+      <p:par>
+        <p:cTn xmlns:p14="http://schemas.microsoft.com/office/powerpoint/2010/main" id="1" dur="indefinite" restart="never" nodeType="tmRoot"/>
+      </p:par>
+    </p:tnLst>
+  </p:timing>
 </p:sld>
 </file>
 
@@ -4784,4 +7408,324 @@
   </a:objectDefaults>
   <a:extraClrSchemeLst/>
 </a:theme>
+</file>
+
+<file path=ppt/theme/theme2.xml><?xml version="1.0" encoding="utf-8"?>
+<a:theme xmlns:a="http://schemas.openxmlformats.org/drawingml/2006/main" name="Office Theme">
+  <a:themeElements>
+    <a:clrScheme name="Office">
+      <a:dk1>
+        <a:sysClr val="windowText" lastClr="000000"/>
+      </a:dk1>
+      <a:lt1>
+        <a:sysClr val="window" lastClr="FFFFFF"/>
+      </a:lt1>
+      <a:dk2>
+        <a:srgbClr val="1F497D"/>
+      </a:dk2>
+      <a:lt2>
+        <a:srgbClr val="EEECE1"/>
+      </a:lt2>
+      <a:accent1>
+        <a:srgbClr val="4F81BD"/>
+      </a:accent1>
+      <a:accent2>
+        <a:srgbClr val="C0504D"/>
+      </a:accent2>
+      <a:accent3>
+        <a:srgbClr val="9BBB59"/>
+      </a:accent3>
+      <a:accent4>
+        <a:srgbClr val="8064A2"/>
+      </a:accent4>
+      <a:accent5>
+        <a:srgbClr val="4BACC6"/>
+      </a:accent5>
+      <a:accent6>
+        <a:srgbClr val="F79646"/>
+      </a:accent6>
+      <a:hlink>
+        <a:srgbClr val="0000FF"/>
+      </a:hlink>
+      <a:folHlink>
+        <a:srgbClr val="800080"/>
+      </a:folHlink>
+    </a:clrScheme>
+    <a:fontScheme name="Office">
+      <a:majorFont>
+        <a:latin typeface="Calibri"/>
+        <a:ea typeface=""/>
+        <a:cs typeface=""/>
+        <a:font script="Jpan" typeface="ＭＳ Ｐゴシック"/>
+        <a:font script="Hang" typeface="맑은 고딕"/>
+        <a:font script="Hans" typeface="宋体"/>
+        <a:font script="Hant" typeface="新細明體"/>
+        <a:font script="Arab" typeface="Times New Roman"/>
+        <a:font script="Hebr" typeface="Times New Roman"/>
+        <a:font script="Thai" typeface="Angsana New"/>
+        <a:font script="Ethi" typeface="Nyala"/>
+        <a:font script="Beng" typeface="Vrinda"/>
+        <a:font script="Gujr" typeface="Shruti"/>
+        <a:font script="Khmr" typeface="MoolBoran"/>
+        <a:font script="Knda" typeface="Tunga"/>
+        <a:font script="Guru" typeface="Raavi"/>
+        <a:font script="Cans" typeface="Euphemia"/>
+        <a:font script="Cher" typeface="Plantagenet Cherokee"/>
+        <a:font script="Yiii" typeface="Microsoft Yi Baiti"/>
+        <a:font script="Tibt" typeface="Microsoft Himalaya"/>
+        <a:font script="Thaa" typeface="MV Boli"/>
+        <a:font script="Deva" typeface="Mangal"/>
+        <a:font script="Telu" typeface="Gautami"/>
+        <a:font script="Taml" typeface="Latha"/>
+        <a:font script="Syrc" typeface="Estrangelo Edessa"/>
+        <a:font script="Orya" typeface="Kalinga"/>
+        <a:font script="Mlym" typeface="Kartika"/>
+        <a:font script="Laoo" typeface="DokChampa"/>
+        <a:font script="Sinh" typeface="Iskoola Pota"/>
+        <a:font script="Mong" typeface="Mongolian Baiti"/>
+        <a:font script="Viet" typeface="Times New Roman"/>
+        <a:font script="Uigh" typeface="Microsoft Uighur"/>
+        <a:font script="Geor" typeface="Sylfaen"/>
+      </a:majorFont>
+      <a:minorFont>
+        <a:latin typeface="Calibri"/>
+        <a:ea typeface=""/>
+        <a:cs typeface=""/>
+        <a:font script="Jpan" typeface="ＭＳ Ｐゴシック"/>
+        <a:font script="Hang" typeface="맑은 고딕"/>
+        <a:font script="Hans" typeface="宋体"/>
+        <a:font script="Hant" typeface="新細明體"/>
+        <a:font script="Arab" typeface="Arial"/>
+        <a:font script="Hebr" typeface="Arial"/>
+        <a:font script="Thai" typeface="Cordia New"/>
+        <a:font script="Ethi" typeface="Nyala"/>
+        <a:font script="Beng" typeface="Vrinda"/>
+        <a:font script="Gujr" typeface="Shruti"/>
+        <a:font script="Khmr" typeface="DaunPenh"/>
+        <a:font script="Knda" typeface="Tunga"/>
+        <a:font script="Guru" typeface="Raavi"/>
+        <a:font script="Cans" typeface="Euphemia"/>
+        <a:font script="Cher" typeface="Plantagenet Cherokee"/>
+        <a:font script="Yiii" typeface="Microsoft Yi Baiti"/>
+        <a:font script="Tibt" typeface="Microsoft Himalaya"/>
+        <a:font script="Thaa" typeface="MV Boli"/>
+        <a:font script="Deva" typeface="Mangal"/>
+        <a:font script="Telu" typeface="Gautami"/>
+        <a:font script="Taml" typeface="Latha"/>
+        <a:font script="Syrc" typeface="Estrangelo Edessa"/>
+        <a:font script="Orya" typeface="Kalinga"/>
+        <a:font script="Mlym" typeface="Kartika"/>
+        <a:font script="Laoo" typeface="DokChampa"/>
+        <a:font script="Sinh" typeface="Iskoola Pota"/>
+        <a:font script="Mong" typeface="Mongolian Baiti"/>
+        <a:font script="Viet" typeface="Arial"/>
+        <a:font script="Uigh" typeface="Microsoft Uighur"/>
+        <a:font script="Geor" typeface="Sylfaen"/>
+      </a:minorFont>
+    </a:fontScheme>
+    <a:fmtScheme name="Office">
+      <a:fillStyleLst>
+        <a:solidFill>
+          <a:schemeClr val="phClr"/>
+        </a:solidFill>
+        <a:gradFill rotWithShape="1">
+          <a:gsLst>
+            <a:gs pos="0">
+              <a:schemeClr val="phClr">
+                <a:tint val="50000"/>
+                <a:satMod val="300000"/>
+              </a:schemeClr>
+            </a:gs>
+            <a:gs pos="35000">
+              <a:schemeClr val="phClr">
+                <a:tint val="37000"/>
+                <a:satMod val="300000"/>
+              </a:schemeClr>
+            </a:gs>
+            <a:gs pos="100000">
+              <a:schemeClr val="phClr">
+                <a:tint val="15000"/>
+                <a:satMod val="350000"/>
+              </a:schemeClr>
+            </a:gs>
+          </a:gsLst>
+          <a:lin ang="16200000" scaled="1"/>
+        </a:gradFill>
+        <a:gradFill rotWithShape="1">
+          <a:gsLst>
+            <a:gs pos="0">
+              <a:schemeClr val="phClr">
+                <a:tint val="100000"/>
+                <a:shade val="100000"/>
+                <a:satMod val="130000"/>
+              </a:schemeClr>
+            </a:gs>
+            <a:gs pos="100000">
+              <a:schemeClr val="phClr">
+                <a:tint val="50000"/>
+                <a:shade val="100000"/>
+                <a:satMod val="350000"/>
+              </a:schemeClr>
+            </a:gs>
+          </a:gsLst>
+          <a:lin ang="16200000" scaled="0"/>
+        </a:gradFill>
+      </a:fillStyleLst>
+      <a:lnStyleLst>
+        <a:ln w="9525" cap="flat" cmpd="sng" algn="ctr">
+          <a:solidFill>
+            <a:schemeClr val="phClr">
+              <a:shade val="95000"/>
+              <a:satMod val="105000"/>
+            </a:schemeClr>
+          </a:solidFill>
+          <a:prstDash val="solid"/>
+        </a:ln>
+        <a:ln w="25400" cap="flat" cmpd="sng" algn="ctr">
+          <a:solidFill>
+            <a:schemeClr val="phClr"/>
+          </a:solidFill>
+          <a:prstDash val="solid"/>
+        </a:ln>
+        <a:ln w="38100" cap="flat" cmpd="sng" algn="ctr">
+          <a:solidFill>
+            <a:schemeClr val="phClr"/>
+          </a:solidFill>
+          <a:prstDash val="solid"/>
+        </a:ln>
+      </a:lnStyleLst>
+      <a:effectStyleLst>
+        <a:effectStyle>
+          <a:effectLst>
+            <a:outerShdw blurRad="40000" dist="20000" dir="5400000" rotWithShape="0">
+              <a:srgbClr val="000000">
+                <a:alpha val="38000"/>
+              </a:srgbClr>
+            </a:outerShdw>
+          </a:effectLst>
+        </a:effectStyle>
+        <a:effectStyle>
+          <a:effectLst>
+            <a:outerShdw blurRad="40000" dist="23000" dir="5400000" rotWithShape="0">
+              <a:srgbClr val="000000">
+                <a:alpha val="35000"/>
+              </a:srgbClr>
+            </a:outerShdw>
+          </a:effectLst>
+        </a:effectStyle>
+        <a:effectStyle>
+          <a:effectLst>
+            <a:outerShdw blurRad="40000" dist="23000" dir="5400000" rotWithShape="0">
+              <a:srgbClr val="000000">
+                <a:alpha val="35000"/>
+              </a:srgbClr>
+            </a:outerShdw>
+          </a:effectLst>
+          <a:scene3d>
+            <a:camera prst="orthographicFront">
+              <a:rot lat="0" lon="0" rev="0"/>
+            </a:camera>
+            <a:lightRig rig="threePt" dir="t">
+              <a:rot lat="0" lon="0" rev="1200000"/>
+            </a:lightRig>
+          </a:scene3d>
+          <a:sp3d>
+            <a:bevelT w="63500" h="25400"/>
+          </a:sp3d>
+        </a:effectStyle>
+      </a:effectStyleLst>
+      <a:bgFillStyleLst>
+        <a:solidFill>
+          <a:schemeClr val="phClr"/>
+        </a:solidFill>
+        <a:gradFill rotWithShape="1">
+          <a:gsLst>
+            <a:gs pos="0">
+              <a:schemeClr val="phClr">
+                <a:tint val="40000"/>
+                <a:satMod val="350000"/>
+              </a:schemeClr>
+            </a:gs>
+            <a:gs pos="40000">
+              <a:schemeClr val="phClr">
+                <a:tint val="45000"/>
+                <a:shade val="99000"/>
+                <a:satMod val="350000"/>
+              </a:schemeClr>
+            </a:gs>
+            <a:gs pos="100000">
+              <a:schemeClr val="phClr">
+                <a:shade val="20000"/>
+                <a:satMod val="255000"/>
+              </a:schemeClr>
+            </a:gs>
+          </a:gsLst>
+          <a:path path="circle">
+            <a:fillToRect l="50000" t="-80000" r="50000" b="180000"/>
+          </a:path>
+        </a:gradFill>
+        <a:gradFill rotWithShape="1">
+          <a:gsLst>
+            <a:gs pos="0">
+              <a:schemeClr val="phClr">
+                <a:tint val="80000"/>
+                <a:satMod val="300000"/>
+              </a:schemeClr>
+            </a:gs>
+            <a:gs pos="100000">
+              <a:schemeClr val="phClr">
+                <a:shade val="30000"/>
+                <a:satMod val="200000"/>
+              </a:schemeClr>
+            </a:gs>
+          </a:gsLst>
+          <a:path path="circle">
+            <a:fillToRect l="50000" t="50000" r="50000" b="50000"/>
+          </a:path>
+        </a:gradFill>
+      </a:bgFillStyleLst>
+    </a:fmtScheme>
+  </a:themeElements>
+  <a:objectDefaults>
+    <a:spDef>
+      <a:spPr/>
+      <a:bodyPr/>
+      <a:lstStyle/>
+      <a:style>
+        <a:lnRef idx="1">
+          <a:schemeClr val="accent1"/>
+        </a:lnRef>
+        <a:fillRef idx="3">
+          <a:schemeClr val="accent1"/>
+        </a:fillRef>
+        <a:effectRef idx="2">
+          <a:schemeClr val="accent1"/>
+        </a:effectRef>
+        <a:fontRef idx="minor">
+          <a:schemeClr val="lt1"/>
+        </a:fontRef>
+      </a:style>
+    </a:spDef>
+    <a:lnDef>
+      <a:spPr/>
+      <a:bodyPr/>
+      <a:lstStyle/>
+      <a:style>
+        <a:lnRef idx="2">
+          <a:schemeClr val="accent1"/>
+        </a:lnRef>
+        <a:fillRef idx="0">
+          <a:schemeClr val="accent1"/>
+        </a:fillRef>
+        <a:effectRef idx="1">
+          <a:schemeClr val="accent1"/>
+        </a:effectRef>
+        <a:fontRef idx="minor">
+          <a:schemeClr val="tx1"/>
+        </a:fontRef>
+      </a:style>
+    </a:lnDef>
+  </a:objectDefaults>
+  <a:extraClrSchemeLst/>
+</a:theme>
 </file>
</xml_diff>

<commit_message>
Updates to powerpoint slide deck, see e-mail re: notes
</commit_message>
<xml_diff>
--- a/PowerPoint/joint_talk_notes.pptx
+++ b/PowerPoint/joint_talk_notes.pptx
@@ -5,25 +5,26 @@
     <p:sldMasterId id="2147483648" r:id="rId1"/>
   </p:sldMasterIdLst>
   <p:notesMasterIdLst>
-    <p:notesMasterId r:id="rId18"/>
+    <p:notesMasterId r:id="rId19"/>
   </p:notesMasterIdLst>
   <p:sldIdLst>
     <p:sldId id="256" r:id="rId2"/>
-    <p:sldId id="257" r:id="rId3"/>
-    <p:sldId id="270" r:id="rId4"/>
-    <p:sldId id="259" r:id="rId5"/>
-    <p:sldId id="260" r:id="rId6"/>
-    <p:sldId id="261" r:id="rId7"/>
-    <p:sldId id="267" r:id="rId8"/>
-    <p:sldId id="268" r:id="rId9"/>
-    <p:sldId id="269" r:id="rId10"/>
-    <p:sldId id="262" r:id="rId11"/>
-    <p:sldId id="263" r:id="rId12"/>
-    <p:sldId id="264" r:id="rId13"/>
-    <p:sldId id="265" r:id="rId14"/>
-    <p:sldId id="266" r:id="rId15"/>
-    <p:sldId id="271" r:id="rId16"/>
-    <p:sldId id="272" r:id="rId17"/>
+    <p:sldId id="274" r:id="rId3"/>
+    <p:sldId id="277" r:id="rId4"/>
+    <p:sldId id="275" r:id="rId5"/>
+    <p:sldId id="273" r:id="rId6"/>
+    <p:sldId id="259" r:id="rId7"/>
+    <p:sldId id="260" r:id="rId8"/>
+    <p:sldId id="261" r:id="rId9"/>
+    <p:sldId id="267" r:id="rId10"/>
+    <p:sldId id="263" r:id="rId11"/>
+    <p:sldId id="264" r:id="rId12"/>
+    <p:sldId id="265" r:id="rId13"/>
+    <p:sldId id="262" r:id="rId14"/>
+    <p:sldId id="271" r:id="rId15"/>
+    <p:sldId id="272" r:id="rId16"/>
+    <p:sldId id="276" r:id="rId17"/>
+    <p:sldId id="278" r:id="rId18"/>
   </p:sldIdLst>
   <p:sldSz cx="9144000" cy="6858000" type="screen4x3"/>
   <p:notesSz cx="6858000" cy="9144000"/>
@@ -207,7 +208,8 @@
           <a:p>
             <a:fld id="{F0C7EA22-4F72-754E-8270-766357FB3B01}" type="datetimeFigureOut">
               <a:rPr lang="en-US" smtClean="0"/>
-              <a:t>8/12/11</a:t>
+              <a:pPr/>
+              <a:t>8/12/2011</a:t>
             </a:fld>
             <a:endParaRPr lang="en-US"/>
           </a:p>
@@ -366,6 +368,7 @@
           <a:p>
             <a:fld id="{2D6C2CB4-7DD0-0243-B916-C8D172714368}" type="slidenum">
               <a:rPr lang="en-US" smtClean="0"/>
+              <a:pPr/>
               <a:t>‹#›</a:t>
             </a:fld>
             <a:endParaRPr lang="en-US"/>
@@ -375,7 +378,7 @@
     </p:spTree>
     <p:extLst>
       <p:ext uri="{BB962C8B-B14F-4D97-AF65-F5344CB8AC3E}">
-        <p14:creationId xmlns:p14="http://schemas.microsoft.com/office/powerpoint/2010/main" val="2105722964"/>
+        <p14:creationId xmlns:p14="http://schemas.microsoft.com/office/powerpoint/2010/main" xmlns="" val="2105722964"/>
       </p:ext>
     </p:extLst>
   </p:cSld>
@@ -521,11 +524,7 @@
           <a:p>
             <a:r>
               <a:rPr lang="en-US" dirty="0" smtClean="0"/>
-              <a:t>Oh My GOSH there’s a lot in this diagram.  But that’s the point – a LOT has happened.</a:t>
-            </a:r>
-            <a:r>
-              <a:rPr lang="en-US" baseline="0" dirty="0" smtClean="0"/>
-              <a:t>  It’s tough to see it all in one glance…..</a:t>
+              <a:t>Of course MS claims that Chakra is faster – cause they’ve sucked so bad up to this point.  But better runtimes in each browser raises overall water level for us.</a:t>
             </a:r>
             <a:endParaRPr lang="en-US" dirty="0"/>
           </a:p>
@@ -548,7 +547,8 @@
           <a:p>
             <a:fld id="{2D6C2CB4-7DD0-0243-B916-C8D172714368}" type="slidenum">
               <a:rPr lang="en-US" smtClean="0"/>
-              <a:t>3</a:t>
+              <a:pPr/>
+              <a:t>6</a:t>
             </a:fld>
             <a:endParaRPr lang="en-US"/>
           </a:p>
@@ -557,7 +557,7 @@
     </p:spTree>
     <p:extLst>
       <p:ext uri="{BB962C8B-B14F-4D97-AF65-F5344CB8AC3E}">
-        <p14:creationId xmlns:p14="http://schemas.microsoft.com/office/powerpoint/2010/main" val="3260168071"/>
+        <p14:creationId xmlns:p14="http://schemas.microsoft.com/office/powerpoint/2010/main" xmlns="" val="3962781486"/>
       </p:ext>
     </p:extLst>
   </p:cSld>
@@ -613,7 +613,19 @@
           <a:p>
             <a:r>
               <a:rPr lang="en-US" dirty="0" smtClean="0"/>
-              <a:t>Of course MS claims that Chakra is faster – cause they’ve sucked so bad up to this point.  But better runtimes in each browser raises overall water level for us.</a:t>
+              <a:t>Five years ago – would</a:t>
+            </a:r>
+            <a:r>
+              <a:rPr lang="en-US" baseline="0" dirty="0" smtClean="0"/>
+              <a:t> any of us imagined that “</a:t>
+            </a:r>
+            <a:r>
+              <a:rPr lang="en-US" baseline="0" dirty="0" err="1" smtClean="0"/>
+              <a:t>js</a:t>
+            </a:r>
+            <a:r>
+              <a:rPr lang="en-US" baseline="0" dirty="0" smtClean="0"/>
+              <a:t>” conferences would be sell outs?</a:t>
             </a:r>
             <a:endParaRPr lang="en-US" dirty="0"/>
           </a:p>
@@ -636,7 +648,8 @@
           <a:p>
             <a:fld id="{2D6C2CB4-7DD0-0243-B916-C8D172714368}" type="slidenum">
               <a:rPr lang="en-US" smtClean="0"/>
-              <a:t>4</a:t>
+              <a:pPr/>
+              <a:t>8</a:t>
             </a:fld>
             <a:endParaRPr lang="en-US"/>
           </a:p>
@@ -645,7 +658,7 @@
     </p:spTree>
     <p:extLst>
       <p:ext uri="{BB962C8B-B14F-4D97-AF65-F5344CB8AC3E}">
-        <p14:creationId xmlns:p14="http://schemas.microsoft.com/office/powerpoint/2010/main" val="3962781486"/>
+        <p14:creationId xmlns:p14="http://schemas.microsoft.com/office/powerpoint/2010/main" xmlns="" val="2501548639"/>
       </p:ext>
     </p:extLst>
   </p:cSld>
@@ -701,19 +714,15 @@
           <a:p>
             <a:r>
               <a:rPr lang="en-US" dirty="0" smtClean="0"/>
-              <a:t>Five years ago – would</a:t>
-            </a:r>
-            <a:r>
-              <a:rPr lang="en-US" baseline="0" dirty="0" smtClean="0"/>
-              <a:t> any of us imagined that “</a:t>
-            </a:r>
-            <a:r>
-              <a:rPr lang="en-US" baseline="0" dirty="0" err="1" smtClean="0"/>
-              <a:t>js</a:t>
-            </a:r>
-            <a:r>
-              <a:rPr lang="en-US" baseline="0" dirty="0" smtClean="0"/>
-              <a:t>” conferences would be sell outs?</a:t>
+              <a:t>Might mention </a:t>
+            </a:r>
+            <a:r>
+              <a:rPr lang="en-US" dirty="0" err="1" smtClean="0"/>
+              <a:t>PouchDB</a:t>
+            </a:r>
+            <a:r>
+              <a:rPr lang="en-US" dirty="0" smtClean="0"/>
+              <a:t> and the possibilities it brings up</a:t>
             </a:r>
             <a:endParaRPr lang="en-US" dirty="0"/>
           </a:p>
@@ -736,7 +745,8 @@
           <a:p>
             <a:fld id="{2D6C2CB4-7DD0-0243-B916-C8D172714368}" type="slidenum">
               <a:rPr lang="en-US" smtClean="0"/>
-              <a:t>6</a:t>
+              <a:pPr/>
+              <a:t>9</a:t>
             </a:fld>
             <a:endParaRPr lang="en-US"/>
           </a:p>
@@ -745,103 +755,7 @@
     </p:spTree>
     <p:extLst>
       <p:ext uri="{BB962C8B-B14F-4D97-AF65-F5344CB8AC3E}">
-        <p14:creationId xmlns:p14="http://schemas.microsoft.com/office/powerpoint/2010/main" val="2501548639"/>
-      </p:ext>
-    </p:extLst>
-  </p:cSld>
-  <p:clrMapOvr>
-    <a:masterClrMapping/>
-  </p:clrMapOvr>
-</p:notes>
-</file>
-
-<file path=ppt/notesSlides/notesSlide4.xml><?xml version="1.0" encoding="utf-8"?>
-<p:notes xmlns:a="http://schemas.openxmlformats.org/drawingml/2006/main" xmlns:r="http://schemas.openxmlformats.org/officeDocument/2006/relationships" xmlns:p="http://schemas.openxmlformats.org/presentationml/2006/main">
-  <p:cSld>
-    <p:spTree>
-      <p:nvGrpSpPr>
-        <p:cNvPr id="1" name=""/>
-        <p:cNvGrpSpPr/>
-        <p:nvPr/>
-      </p:nvGrpSpPr>
-      <p:grpSpPr>
-        <a:xfrm>
-          <a:off x="0" y="0"/>
-          <a:ext cx="0" cy="0"/>
-          <a:chOff x="0" y="0"/>
-          <a:chExt cx="0" cy="0"/>
-        </a:xfrm>
-      </p:grpSpPr>
-      <p:sp>
-        <p:nvSpPr>
-          <p:cNvPr id="2" name="Slide Image Placeholder 1"/>
-          <p:cNvSpPr>
-            <a:spLocks noGrp="1" noRot="1" noChangeAspect="1"/>
-          </p:cNvSpPr>
-          <p:nvPr>
-            <p:ph type="sldImg"/>
-          </p:nvPr>
-        </p:nvSpPr>
-        <p:spPr/>
-      </p:sp>
-      <p:sp>
-        <p:nvSpPr>
-          <p:cNvPr id="3" name="Notes Placeholder 2"/>
-          <p:cNvSpPr>
-            <a:spLocks noGrp="1"/>
-          </p:cNvSpPr>
-          <p:nvPr>
-            <p:ph type="body" idx="1"/>
-          </p:nvPr>
-        </p:nvSpPr>
-        <p:spPr/>
-        <p:txBody>
-          <a:bodyPr/>
-          <a:lstStyle/>
-          <a:p>
-            <a:r>
-              <a:rPr lang="en-US" dirty="0" smtClean="0"/>
-              <a:t>Might mention </a:t>
-            </a:r>
-            <a:r>
-              <a:rPr lang="en-US" dirty="0" err="1" smtClean="0"/>
-              <a:t>PouchDB</a:t>
-            </a:r>
-            <a:r>
-              <a:rPr lang="en-US" dirty="0" smtClean="0"/>
-              <a:t> and the possibilities it brings up</a:t>
-            </a:r>
-            <a:endParaRPr lang="en-US" dirty="0"/>
-          </a:p>
-        </p:txBody>
-      </p:sp>
-      <p:sp>
-        <p:nvSpPr>
-          <p:cNvPr id="4" name="Slide Number Placeholder 3"/>
-          <p:cNvSpPr>
-            <a:spLocks noGrp="1"/>
-          </p:cNvSpPr>
-          <p:nvPr>
-            <p:ph type="sldNum" sz="quarter" idx="10"/>
-          </p:nvPr>
-        </p:nvSpPr>
-        <p:spPr/>
-        <p:txBody>
-          <a:bodyPr/>
-          <a:lstStyle/>
-          <a:p>
-            <a:fld id="{2D6C2CB4-7DD0-0243-B916-C8D172714368}" type="slidenum">
-              <a:rPr lang="en-US" smtClean="0"/>
-              <a:t>7</a:t>
-            </a:fld>
-            <a:endParaRPr lang="en-US"/>
-          </a:p>
-        </p:txBody>
-      </p:sp>
-    </p:spTree>
-    <p:extLst>
-      <p:ext uri="{BB962C8B-B14F-4D97-AF65-F5344CB8AC3E}">
-        <p14:creationId xmlns:p14="http://schemas.microsoft.com/office/powerpoint/2010/main" val="1719812803"/>
+        <p14:creationId xmlns:p14="http://schemas.microsoft.com/office/powerpoint/2010/main" xmlns="" val="1719812803"/>
       </p:ext>
     </p:extLst>
   </p:cSld>
@@ -1032,7 +946,8 @@
           <a:p>
             <a:fld id="{47A2725F-F1FC-464A-BBE8-94773344B8ED}" type="datetimeFigureOut">
               <a:rPr lang="en-US" smtClean="0"/>
-              <a:t>8/12/11</a:t>
+              <a:pPr/>
+              <a:t>8/12/2011</a:t>
             </a:fld>
             <a:endParaRPr lang="en-US"/>
           </a:p>
@@ -1074,6 +989,7 @@
           <a:p>
             <a:fld id="{9D208023-0F92-8E4D-8F88-70EC96F8A055}" type="slidenum">
               <a:rPr lang="en-US" smtClean="0"/>
+              <a:pPr/>
               <a:t>‹#›</a:t>
             </a:fld>
             <a:endParaRPr lang="en-US"/>
@@ -1083,7 +999,7 @@
     </p:spTree>
     <p:extLst>
       <p:ext uri="{BB962C8B-B14F-4D97-AF65-F5344CB8AC3E}">
-        <p14:creationId xmlns:p14="http://schemas.microsoft.com/office/powerpoint/2010/main" val="622080194"/>
+        <p14:creationId xmlns:p14="http://schemas.microsoft.com/office/powerpoint/2010/main" xmlns="" val="622080194"/>
       </p:ext>
     </p:extLst>
   </p:cSld>
@@ -1202,7 +1118,8 @@
           <a:p>
             <a:fld id="{47A2725F-F1FC-464A-BBE8-94773344B8ED}" type="datetimeFigureOut">
               <a:rPr lang="en-US" smtClean="0"/>
-              <a:t>8/12/11</a:t>
+              <a:pPr/>
+              <a:t>8/12/2011</a:t>
             </a:fld>
             <a:endParaRPr lang="en-US"/>
           </a:p>
@@ -1244,6 +1161,7 @@
           <a:p>
             <a:fld id="{9D208023-0F92-8E4D-8F88-70EC96F8A055}" type="slidenum">
               <a:rPr lang="en-US" smtClean="0"/>
+              <a:pPr/>
               <a:t>‹#›</a:t>
             </a:fld>
             <a:endParaRPr lang="en-US"/>
@@ -1253,7 +1171,7 @@
     </p:spTree>
     <p:extLst>
       <p:ext uri="{BB962C8B-B14F-4D97-AF65-F5344CB8AC3E}">
-        <p14:creationId xmlns:p14="http://schemas.microsoft.com/office/powerpoint/2010/main" val="626229182"/>
+        <p14:creationId xmlns:p14="http://schemas.microsoft.com/office/powerpoint/2010/main" xmlns="" val="626229182"/>
       </p:ext>
     </p:extLst>
   </p:cSld>
@@ -1382,7 +1300,8 @@
           <a:p>
             <a:fld id="{47A2725F-F1FC-464A-BBE8-94773344B8ED}" type="datetimeFigureOut">
               <a:rPr lang="en-US" smtClean="0"/>
-              <a:t>8/12/11</a:t>
+              <a:pPr/>
+              <a:t>8/12/2011</a:t>
             </a:fld>
             <a:endParaRPr lang="en-US"/>
           </a:p>
@@ -1424,6 +1343,7 @@
           <a:p>
             <a:fld id="{9D208023-0F92-8E4D-8F88-70EC96F8A055}" type="slidenum">
               <a:rPr lang="en-US" smtClean="0"/>
+              <a:pPr/>
               <a:t>‹#›</a:t>
             </a:fld>
             <a:endParaRPr lang="en-US"/>
@@ -1433,7 +1353,7 @@
     </p:spTree>
     <p:extLst>
       <p:ext uri="{BB962C8B-B14F-4D97-AF65-F5344CB8AC3E}">
-        <p14:creationId xmlns:p14="http://schemas.microsoft.com/office/powerpoint/2010/main" val="4255191854"/>
+        <p14:creationId xmlns:p14="http://schemas.microsoft.com/office/powerpoint/2010/main" xmlns="" val="4255191854"/>
       </p:ext>
     </p:extLst>
   </p:cSld>
@@ -1552,7 +1472,8 @@
           <a:p>
             <a:fld id="{47A2725F-F1FC-464A-BBE8-94773344B8ED}" type="datetimeFigureOut">
               <a:rPr lang="en-US" smtClean="0"/>
-              <a:t>8/12/11</a:t>
+              <a:pPr/>
+              <a:t>8/12/2011</a:t>
             </a:fld>
             <a:endParaRPr lang="en-US"/>
           </a:p>
@@ -1594,6 +1515,7 @@
           <a:p>
             <a:fld id="{9D208023-0F92-8E4D-8F88-70EC96F8A055}" type="slidenum">
               <a:rPr lang="en-US" smtClean="0"/>
+              <a:pPr/>
               <a:t>‹#›</a:t>
             </a:fld>
             <a:endParaRPr lang="en-US"/>
@@ -1603,7 +1525,7 @@
     </p:spTree>
     <p:extLst>
       <p:ext uri="{BB962C8B-B14F-4D97-AF65-F5344CB8AC3E}">
-        <p14:creationId xmlns:p14="http://schemas.microsoft.com/office/powerpoint/2010/main" val="408126883"/>
+        <p14:creationId xmlns:p14="http://schemas.microsoft.com/office/powerpoint/2010/main" xmlns="" val="408126883"/>
       </p:ext>
     </p:extLst>
   </p:cSld>
@@ -1798,7 +1720,8 @@
           <a:p>
             <a:fld id="{47A2725F-F1FC-464A-BBE8-94773344B8ED}" type="datetimeFigureOut">
               <a:rPr lang="en-US" smtClean="0"/>
-              <a:t>8/12/11</a:t>
+              <a:pPr/>
+              <a:t>8/12/2011</a:t>
             </a:fld>
             <a:endParaRPr lang="en-US"/>
           </a:p>
@@ -1840,6 +1763,7 @@
           <a:p>
             <a:fld id="{9D208023-0F92-8E4D-8F88-70EC96F8A055}" type="slidenum">
               <a:rPr lang="en-US" smtClean="0"/>
+              <a:pPr/>
               <a:t>‹#›</a:t>
             </a:fld>
             <a:endParaRPr lang="en-US"/>
@@ -1849,7 +1773,7 @@
     </p:spTree>
     <p:extLst>
       <p:ext uri="{BB962C8B-B14F-4D97-AF65-F5344CB8AC3E}">
-        <p14:creationId xmlns:p14="http://schemas.microsoft.com/office/powerpoint/2010/main" val="601511651"/>
+        <p14:creationId xmlns:p14="http://schemas.microsoft.com/office/powerpoint/2010/main" xmlns="" val="601511651"/>
       </p:ext>
     </p:extLst>
   </p:cSld>
@@ -2086,7 +2010,8 @@
           <a:p>
             <a:fld id="{47A2725F-F1FC-464A-BBE8-94773344B8ED}" type="datetimeFigureOut">
               <a:rPr lang="en-US" smtClean="0"/>
-              <a:t>8/12/11</a:t>
+              <a:pPr/>
+              <a:t>8/12/2011</a:t>
             </a:fld>
             <a:endParaRPr lang="en-US"/>
           </a:p>
@@ -2128,6 +2053,7 @@
           <a:p>
             <a:fld id="{9D208023-0F92-8E4D-8F88-70EC96F8A055}" type="slidenum">
               <a:rPr lang="en-US" smtClean="0"/>
+              <a:pPr/>
               <a:t>‹#›</a:t>
             </a:fld>
             <a:endParaRPr lang="en-US"/>
@@ -2137,7 +2063,7 @@
     </p:spTree>
     <p:extLst>
       <p:ext uri="{BB962C8B-B14F-4D97-AF65-F5344CB8AC3E}">
-        <p14:creationId xmlns:p14="http://schemas.microsoft.com/office/powerpoint/2010/main" val="3536748845"/>
+        <p14:creationId xmlns:p14="http://schemas.microsoft.com/office/powerpoint/2010/main" xmlns="" val="3536748845"/>
       </p:ext>
     </p:extLst>
   </p:cSld>
@@ -2508,7 +2434,8 @@
           <a:p>
             <a:fld id="{47A2725F-F1FC-464A-BBE8-94773344B8ED}" type="datetimeFigureOut">
               <a:rPr lang="en-US" smtClean="0"/>
-              <a:t>8/12/11</a:t>
+              <a:pPr/>
+              <a:t>8/12/2011</a:t>
             </a:fld>
             <a:endParaRPr lang="en-US"/>
           </a:p>
@@ -2550,6 +2477,7 @@
           <a:p>
             <a:fld id="{9D208023-0F92-8E4D-8F88-70EC96F8A055}" type="slidenum">
               <a:rPr lang="en-US" smtClean="0"/>
+              <a:pPr/>
               <a:t>‹#›</a:t>
             </a:fld>
             <a:endParaRPr lang="en-US"/>
@@ -2559,7 +2487,7 @@
     </p:spTree>
     <p:extLst>
       <p:ext uri="{BB962C8B-B14F-4D97-AF65-F5344CB8AC3E}">
-        <p14:creationId xmlns:p14="http://schemas.microsoft.com/office/powerpoint/2010/main" val="1213860713"/>
+        <p14:creationId xmlns:p14="http://schemas.microsoft.com/office/powerpoint/2010/main" xmlns="" val="1213860713"/>
       </p:ext>
     </p:extLst>
   </p:cSld>
@@ -2626,7 +2554,8 @@
           <a:p>
             <a:fld id="{47A2725F-F1FC-464A-BBE8-94773344B8ED}" type="datetimeFigureOut">
               <a:rPr lang="en-US" smtClean="0"/>
-              <a:t>8/12/11</a:t>
+              <a:pPr/>
+              <a:t>8/12/2011</a:t>
             </a:fld>
             <a:endParaRPr lang="en-US"/>
           </a:p>
@@ -2668,6 +2597,7 @@
           <a:p>
             <a:fld id="{9D208023-0F92-8E4D-8F88-70EC96F8A055}" type="slidenum">
               <a:rPr lang="en-US" smtClean="0"/>
+              <a:pPr/>
               <a:t>‹#›</a:t>
             </a:fld>
             <a:endParaRPr lang="en-US"/>
@@ -2677,7 +2607,7 @@
     </p:spTree>
     <p:extLst>
       <p:ext uri="{BB962C8B-B14F-4D97-AF65-F5344CB8AC3E}">
-        <p14:creationId xmlns:p14="http://schemas.microsoft.com/office/powerpoint/2010/main" val="2590215588"/>
+        <p14:creationId xmlns:p14="http://schemas.microsoft.com/office/powerpoint/2010/main" xmlns="" val="2590215588"/>
       </p:ext>
     </p:extLst>
   </p:cSld>
@@ -2721,7 +2651,8 @@
           <a:p>
             <a:fld id="{47A2725F-F1FC-464A-BBE8-94773344B8ED}" type="datetimeFigureOut">
               <a:rPr lang="en-US" smtClean="0"/>
-              <a:t>8/12/11</a:t>
+              <a:pPr/>
+              <a:t>8/12/2011</a:t>
             </a:fld>
             <a:endParaRPr lang="en-US"/>
           </a:p>
@@ -2763,6 +2694,7 @@
           <a:p>
             <a:fld id="{9D208023-0F92-8E4D-8F88-70EC96F8A055}" type="slidenum">
               <a:rPr lang="en-US" smtClean="0"/>
+              <a:pPr/>
               <a:t>‹#›</a:t>
             </a:fld>
             <a:endParaRPr lang="en-US"/>
@@ -2772,7 +2704,7 @@
     </p:spTree>
     <p:extLst>
       <p:ext uri="{BB962C8B-B14F-4D97-AF65-F5344CB8AC3E}">
-        <p14:creationId xmlns:p14="http://schemas.microsoft.com/office/powerpoint/2010/main" val="1268434713"/>
+        <p14:creationId xmlns:p14="http://schemas.microsoft.com/office/powerpoint/2010/main" xmlns="" val="1268434713"/>
       </p:ext>
     </p:extLst>
   </p:cSld>
@@ -2998,7 +2930,8 @@
           <a:p>
             <a:fld id="{47A2725F-F1FC-464A-BBE8-94773344B8ED}" type="datetimeFigureOut">
               <a:rPr lang="en-US" smtClean="0"/>
-              <a:t>8/12/11</a:t>
+              <a:pPr/>
+              <a:t>8/12/2011</a:t>
             </a:fld>
             <a:endParaRPr lang="en-US"/>
           </a:p>
@@ -3040,6 +2973,7 @@
           <a:p>
             <a:fld id="{9D208023-0F92-8E4D-8F88-70EC96F8A055}" type="slidenum">
               <a:rPr lang="en-US" smtClean="0"/>
+              <a:pPr/>
               <a:t>‹#›</a:t>
             </a:fld>
             <a:endParaRPr lang="en-US"/>
@@ -3049,7 +2983,7 @@
     </p:spTree>
     <p:extLst>
       <p:ext uri="{BB962C8B-B14F-4D97-AF65-F5344CB8AC3E}">
-        <p14:creationId xmlns:p14="http://schemas.microsoft.com/office/powerpoint/2010/main" val="318373449"/>
+        <p14:creationId xmlns:p14="http://schemas.microsoft.com/office/powerpoint/2010/main" xmlns="" val="318373449"/>
       </p:ext>
     </p:extLst>
   </p:cSld>
@@ -3251,7 +3185,8 @@
           <a:p>
             <a:fld id="{47A2725F-F1FC-464A-BBE8-94773344B8ED}" type="datetimeFigureOut">
               <a:rPr lang="en-US" smtClean="0"/>
-              <a:t>8/12/11</a:t>
+              <a:pPr/>
+              <a:t>8/12/2011</a:t>
             </a:fld>
             <a:endParaRPr lang="en-US"/>
           </a:p>
@@ -3293,6 +3228,7 @@
           <a:p>
             <a:fld id="{9D208023-0F92-8E4D-8F88-70EC96F8A055}" type="slidenum">
               <a:rPr lang="en-US" smtClean="0"/>
+              <a:pPr/>
               <a:t>‹#›</a:t>
             </a:fld>
             <a:endParaRPr lang="en-US"/>
@@ -3302,7 +3238,7 @@
     </p:spTree>
     <p:extLst>
       <p:ext uri="{BB962C8B-B14F-4D97-AF65-F5344CB8AC3E}">
-        <p14:creationId xmlns:p14="http://schemas.microsoft.com/office/powerpoint/2010/main" val="2063588562"/>
+        <p14:creationId xmlns:p14="http://schemas.microsoft.com/office/powerpoint/2010/main" xmlns="" val="2063588562"/>
       </p:ext>
     </p:extLst>
   </p:cSld>
@@ -3464,7 +3400,8 @@
           <a:p>
             <a:fld id="{47A2725F-F1FC-464A-BBE8-94773344B8ED}" type="datetimeFigureOut">
               <a:rPr lang="en-US" smtClean="0"/>
-              <a:t>8/12/11</a:t>
+              <a:pPr/>
+              <a:t>8/12/2011</a:t>
             </a:fld>
             <a:endParaRPr lang="en-US"/>
           </a:p>
@@ -3542,6 +3479,7 @@
           <a:p>
             <a:fld id="{9D208023-0F92-8E4D-8F88-70EC96F8A055}" type="slidenum">
               <a:rPr lang="en-US" smtClean="0"/>
+              <a:pPr/>
               <a:t>‹#›</a:t>
             </a:fld>
             <a:endParaRPr lang="en-US"/>
@@ -3551,7 +3489,7 @@
     </p:spTree>
     <p:extLst>
       <p:ext uri="{BB962C8B-B14F-4D97-AF65-F5344CB8AC3E}">
-        <p14:creationId xmlns:p14="http://schemas.microsoft.com/office/powerpoint/2010/main" val="1539821315"/>
+        <p14:creationId xmlns:p14="http://schemas.microsoft.com/office/powerpoint/2010/main" xmlns="" val="1539821315"/>
       </p:ext>
     </p:extLst>
   </p:cSld>
@@ -3851,36 +3789,63 @@
         </p:nvSpPr>
         <p:spPr/>
         <p:txBody>
+          <a:bodyPr>
+            <a:normAutofit/>
+          </a:bodyPr>
+          <a:lstStyle/>
+          <a:p>
+            <a:r>
+              <a:rPr lang="en-US" dirty="0" smtClean="0"/>
+              <a:t>Client Focused Web Stacks</a:t>
+            </a:r>
+            <a:br>
+              <a:rPr lang="en-US" dirty="0" smtClean="0"/>
+            </a:br>
+            <a:r>
+              <a:rPr lang="en-US" sz="2700" dirty="0" smtClean="0"/>
+              <a:t>Alternatives To Server Side Patterns</a:t>
+            </a:r>
+            <a:endParaRPr lang="en-US" sz="2700" dirty="0"/>
+          </a:p>
+        </p:txBody>
+      </p:sp>
+      <p:sp>
+        <p:nvSpPr>
+          <p:cNvPr id="3" name="Subtitle 2"/>
+          <p:cNvSpPr>
+            <a:spLocks noGrp="1"/>
+          </p:cNvSpPr>
+          <p:nvPr>
+            <p:ph type="subTitle" idx="1"/>
+          </p:nvPr>
+        </p:nvSpPr>
+        <p:spPr/>
+        <p:txBody>
           <a:bodyPr/>
           <a:lstStyle/>
           <a:p>
+            <a:r>
+              <a:rPr lang="en-US" dirty="0" smtClean="0"/>
+              <a:t>Jim Cowart and Alex Robson</a:t>
+            </a:r>
+          </a:p>
+          <a:p>
+            <a:r>
+              <a:rPr lang="en-US" dirty="0" err="1" smtClean="0"/>
+              <a:t>devLINK</a:t>
+            </a:r>
+            <a:r>
+              <a:rPr lang="en-US" dirty="0" smtClean="0"/>
+              <a:t> 2011</a:t>
+            </a:r>
             <a:endParaRPr lang="en-US" dirty="0"/>
-          </a:p>
-        </p:txBody>
-      </p:sp>
-      <p:sp>
-        <p:nvSpPr>
-          <p:cNvPr id="3" name="Subtitle 2"/>
-          <p:cNvSpPr>
-            <a:spLocks noGrp="1"/>
-          </p:cNvSpPr>
-          <p:nvPr>
-            <p:ph type="subTitle" idx="1"/>
-          </p:nvPr>
-        </p:nvSpPr>
-        <p:spPr/>
-        <p:txBody>
-          <a:bodyPr/>
-          <a:lstStyle/>
-          <a:p>
-            <a:endParaRPr lang="en-US"/>
           </a:p>
         </p:txBody>
       </p:sp>
     </p:spTree>
     <p:extLst>
       <p:ext uri="{BB962C8B-B14F-4D97-AF65-F5344CB8AC3E}">
-        <p14:creationId xmlns:p14="http://schemas.microsoft.com/office/powerpoint/2010/main" val="1692427314"/>
+        <p14:creationId xmlns:p14="http://schemas.microsoft.com/office/powerpoint/2010/main" xmlns="" val="1692427314"/>
       </p:ext>
     </p:extLst>
   </p:cSld>
@@ -3890,7 +3855,7 @@
   <p:timing>
     <p:tnLst>
       <p:par>
-        <p:cTn xmlns:p14="http://schemas.microsoft.com/office/powerpoint/2010/main" id="1" dur="indefinite" restart="never" nodeType="tmRoot"/>
+        <p:cTn id="1" dur="indefinite" restart="never" nodeType="tmRoot"/>
       </p:par>
     </p:tnLst>
   </p:timing>
@@ -3931,7 +3896,7 @@
           <a:p>
             <a:r>
               <a:rPr lang="en-US" dirty="0" smtClean="0"/>
-              <a:t>Server Side Zeitgeist</a:t>
+              <a:t>Where’s This Going?</a:t>
             </a:r>
             <a:endParaRPr lang="en-US" dirty="0"/>
           </a:p>
@@ -3956,95 +3921,63 @@
           <a:p>
             <a:r>
               <a:rPr lang="en-US" dirty="0" smtClean="0"/>
-              <a:t>Retreating to principles of HTTP and REST</a:t>
+              <a:t>Proliferation of powerful clients</a:t>
             </a:r>
           </a:p>
           <a:p>
             <a:pPr lvl="1"/>
             <a:r>
-              <a:rPr lang="en-US" dirty="0" err="1" smtClean="0"/>
-              <a:t>Misultin</a:t>
-            </a:r>
-            <a:r>
-              <a:rPr lang="en-US" dirty="0" smtClean="0"/>
-              <a:t>, Cowboy, </a:t>
-            </a:r>
-            <a:r>
-              <a:rPr lang="en-US" dirty="0" err="1" smtClean="0"/>
-              <a:t>WebMachine</a:t>
-            </a:r>
-            <a:r>
-              <a:rPr lang="en-US" dirty="0" smtClean="0"/>
-              <a:t> (Erlang)</a:t>
+              <a:rPr lang="en-US" dirty="0" smtClean="0"/>
+              <a:t>PC (duh)</a:t>
             </a:r>
           </a:p>
           <a:p>
             <a:pPr lvl="1"/>
             <a:r>
               <a:rPr lang="en-US" dirty="0" smtClean="0"/>
-              <a:t>Sinatra (Ruby)</a:t>
+              <a:t>Mobile</a:t>
             </a:r>
           </a:p>
           <a:p>
             <a:pPr lvl="1"/>
             <a:r>
               <a:rPr lang="en-US" dirty="0" smtClean="0"/>
-              <a:t>Express / Express-Resource (Node)</a:t>
+              <a:t>Web</a:t>
+            </a:r>
+          </a:p>
+          <a:p>
+            <a:r>
+              <a:rPr lang="en-US" dirty="0" smtClean="0"/>
+              <a:t>Users expectations have shifted</a:t>
             </a:r>
           </a:p>
           <a:p>
             <a:pPr lvl="1"/>
             <a:r>
               <a:rPr lang="en-US" dirty="0" smtClean="0"/>
-              <a:t>Nancy, Kayak, OWIN (</a:t>
-            </a:r>
-            <a:r>
-              <a:rPr lang="en-US" dirty="0" err="1" smtClean="0"/>
-              <a:t>.Net</a:t>
-            </a:r>
-            <a:r>
-              <a:rPr lang="en-US" dirty="0" smtClean="0"/>
-              <a:t>)</a:t>
-            </a:r>
-          </a:p>
-          <a:p>
-            <a:r>
-              <a:rPr lang="en-US" dirty="0" smtClean="0"/>
-              <a:t>Focus </a:t>
+              <a:t>Consistency of experience</a:t>
             </a:r>
           </a:p>
           <a:p>
             <a:pPr lvl="1"/>
             <a:r>
               <a:rPr lang="en-US" dirty="0" smtClean="0"/>
-              <a:t>server-side resources</a:t>
-            </a:r>
-          </a:p>
-          <a:p>
-            <a:pPr lvl="1"/>
-            <a:r>
-              <a:rPr lang="en-US" b="1" i="1" dirty="0" smtClean="0"/>
-              <a:t>any </a:t>
-            </a:r>
-            <a:r>
-              <a:rPr lang="en-US" dirty="0" smtClean="0"/>
-              <a:t>client can consume</a:t>
-            </a:r>
-          </a:p>
-          <a:p>
-            <a:pPr lvl="1"/>
-            <a:r>
-              <a:rPr lang="en-US" b="1" i="1" dirty="0" smtClean="0"/>
-              <a:t>OPEN STANDARDS!</a:t>
-            </a:r>
-            <a:endParaRPr lang="en-US" b="1" i="1" dirty="0"/>
+              <a:t>Fluid device transition (Continuous Client)</a:t>
+            </a:r>
+          </a:p>
+          <a:p>
+            <a:r>
+              <a:rPr lang="en-US" b="1" dirty="0" smtClean="0"/>
+              <a:t>You can’t afford to write the server-side multiple times</a:t>
+            </a:r>
+            <a:endParaRPr lang="en-US" b="1" dirty="0"/>
           </a:p>
         </p:txBody>
       </p:sp>
     </p:spTree>
     <p:extLst>
       <p:ext uri="{BB962C8B-B14F-4D97-AF65-F5344CB8AC3E}">
-        <p14:creationId xmlns:p14="http://schemas.microsoft.com/office/powerpoint/2010/main" val="316421455"/>
+        <p14:creationId xmlns:p14="http://schemas.microsoft.com/office/powerpoint/2010/main" xmlns="" val="3913763961"/>
       </p:ext>
     </p:extLst>
   </p:cSld>
@@ -4083,12 +4016,18 @@
         </p:nvSpPr>
         <p:spPr/>
         <p:txBody>
-          <a:bodyPr/>
-          <a:lstStyle/>
-          <a:p>
-            <a:r>
-              <a:rPr lang="en-US" dirty="0" smtClean="0"/>
-              <a:t>Where’s This Going?</a:t>
+          <a:bodyPr>
+            <a:normAutofit fontScale="90000"/>
+          </a:bodyPr>
+          <a:lstStyle/>
+          <a:p>
+            <a:r>
+              <a:rPr lang="en-US" dirty="0" smtClean="0"/>
+              <a:t>Challenge </a:t>
+            </a:r>
+            <a:r>
+              <a:rPr lang="en-US" dirty="0" smtClean="0"/>
+              <a:t>The Reigning Assumption</a:t>
             </a:r>
             <a:endParaRPr lang="en-US" dirty="0"/>
           </a:p>
@@ -4113,63 +4052,115 @@
           <a:p>
             <a:r>
               <a:rPr lang="en-US" dirty="0" smtClean="0"/>
-              <a:t>Proliferation of powerful clients</a:t>
-            </a:r>
+              <a:t>Server-side web </a:t>
+            </a:r>
+            <a:r>
+              <a:rPr lang="en-US" dirty="0" smtClean="0"/>
+              <a:t>frameworks</a:t>
+            </a:r>
+            <a:endParaRPr lang="en-US" dirty="0" smtClean="0"/>
           </a:p>
           <a:p>
             <a:pPr lvl="1"/>
             <a:r>
               <a:rPr lang="en-US" dirty="0" smtClean="0"/>
-              <a:t>PC (duh)</a:t>
+              <a:t>Add </a:t>
+            </a:r>
+            <a:r>
+              <a:rPr lang="en-US" dirty="0" smtClean="0"/>
+              <a:t>overhead</a:t>
             </a:r>
           </a:p>
           <a:p>
             <a:pPr lvl="1"/>
             <a:r>
               <a:rPr lang="en-US" dirty="0" smtClean="0"/>
-              <a:t>Mobile</a:t>
+              <a:t>Provide poor/leaky </a:t>
+            </a:r>
+            <a:r>
+              <a:rPr lang="en-US" dirty="0" smtClean="0"/>
+              <a:t>abstractions</a:t>
             </a:r>
           </a:p>
           <a:p>
             <a:pPr lvl="1"/>
             <a:r>
               <a:rPr lang="en-US" dirty="0" smtClean="0"/>
-              <a:t>Web</a:t>
-            </a:r>
-          </a:p>
-          <a:p>
-            <a:r>
-              <a:rPr lang="en-US" dirty="0" smtClean="0"/>
-              <a:t>Users expectations have shifted</a:t>
-            </a:r>
+              <a:t>Myopic -“</a:t>
+            </a:r>
+            <a:r>
+              <a:rPr lang="en-US" dirty="0" smtClean="0"/>
+              <a:t>Everything is </a:t>
+            </a:r>
+            <a:r>
+              <a:rPr lang="en-US" dirty="0" smtClean="0"/>
+              <a:t>a desktop browser!”</a:t>
+            </a:r>
+            <a:endParaRPr lang="en-US" dirty="0" smtClean="0"/>
           </a:p>
           <a:p>
             <a:pPr lvl="1"/>
             <a:r>
               <a:rPr lang="en-US" dirty="0" smtClean="0"/>
-              <a:t>Consistency of experience</a:t>
+              <a:t>Encourage tight </a:t>
+            </a:r>
+            <a:r>
+              <a:rPr lang="en-US" dirty="0" smtClean="0"/>
+              <a:t>coupling </a:t>
+            </a:r>
+            <a:r>
+              <a:rPr lang="en-US" dirty="0" smtClean="0"/>
+              <a:t>to client</a:t>
+            </a:r>
+            <a:endParaRPr lang="en-US" dirty="0" smtClean="0"/>
+          </a:p>
+          <a:p>
+            <a:r>
+              <a:rPr lang="en-US" dirty="0" smtClean="0"/>
+              <a:t>What if your server </a:t>
+            </a:r>
+            <a:r>
+              <a:rPr lang="en-US" dirty="0" smtClean="0"/>
+              <a:t>only</a:t>
             </a:r>
           </a:p>
           <a:p>
             <a:pPr lvl="1"/>
             <a:r>
               <a:rPr lang="en-US" dirty="0" smtClean="0"/>
-              <a:t>Fluid device transition (Continuous Client)</a:t>
-            </a:r>
-          </a:p>
-          <a:p>
-            <a:r>
-              <a:rPr lang="en-US" b="1" dirty="0" smtClean="0"/>
-              <a:t>You can’t afford to write the server-side multiple times</a:t>
-            </a:r>
-            <a:endParaRPr lang="en-US" b="1" dirty="0"/>
+              <a:t>Provides server state / resources</a:t>
+            </a:r>
+          </a:p>
+          <a:p>
+            <a:pPr lvl="1"/>
+            <a:r>
+              <a:rPr lang="en-US" dirty="0" smtClean="0"/>
+              <a:t>Governs </a:t>
+            </a:r>
+            <a:r>
+              <a:rPr lang="en-US" dirty="0" smtClean="0"/>
+              <a:t>access </a:t>
+            </a:r>
+            <a:endParaRPr lang="en-US" dirty="0" smtClean="0"/>
+          </a:p>
+          <a:p>
+            <a:pPr lvl="1"/>
+            <a:r>
+              <a:rPr lang="en-US" dirty="0" smtClean="0"/>
+              <a:t>Validates </a:t>
+            </a:r>
+            <a:r>
+              <a:rPr lang="en-US" dirty="0" smtClean="0"/>
+              <a:t>operations</a:t>
+            </a:r>
+            <a:endParaRPr lang="en-US" dirty="0"/>
           </a:p>
         </p:txBody>
       </p:sp>
     </p:spTree>
     <p:extLst>
       <p:ext uri="{BB962C8B-B14F-4D97-AF65-F5344CB8AC3E}">
-        <p14:creationId xmlns:p14="http://schemas.microsoft.com/office/powerpoint/2010/main" val="3913763961"/>
+        <p14:creationId xmlns:p14="http://schemas.microsoft.com/office/powerpoint/2010/main" xmlns="" val="1558913479"/>
       </p:ext>
     </p:extLst>
   </p:cSld>
@@ -4208,72 +4199,75 @@
         </p:nvSpPr>
         <p:spPr/>
         <p:txBody>
+          <a:bodyPr/>
+          <a:lstStyle/>
+          <a:p>
+            <a:r>
+              <a:rPr lang="en-US" dirty="0" smtClean="0"/>
+              <a:t>REST: More than just a pretty URL</a:t>
+            </a:r>
+            <a:endParaRPr lang="en-US" dirty="0"/>
+          </a:p>
+        </p:txBody>
+      </p:sp>
+      <p:sp>
+        <p:nvSpPr>
+          <p:cNvPr id="3" name="Content Placeholder 2"/>
+          <p:cNvSpPr>
+            <a:spLocks noGrp="1"/>
+          </p:cNvSpPr>
+          <p:nvPr>
+            <p:ph idx="1"/>
+          </p:nvPr>
+        </p:nvSpPr>
+        <p:spPr/>
+        <p:txBody>
           <a:bodyPr>
-            <a:normAutofit fontScale="90000"/>
+            <a:normAutofit/>
           </a:bodyPr>
           <a:lstStyle/>
           <a:p>
             <a:r>
               <a:rPr lang="en-US" dirty="0" smtClean="0"/>
-              <a:t>Challenging The Reigning Assumption</a:t>
-            </a:r>
-            <a:endParaRPr lang="en-US" dirty="0"/>
-          </a:p>
-        </p:txBody>
-      </p:sp>
-      <p:sp>
-        <p:nvSpPr>
-          <p:cNvPr id="3" name="Content Placeholder 2"/>
-          <p:cNvSpPr>
-            <a:spLocks noGrp="1"/>
-          </p:cNvSpPr>
-          <p:nvPr>
-            <p:ph idx="1"/>
-          </p:nvPr>
-        </p:nvSpPr>
-        <p:spPr/>
-        <p:txBody>
-          <a:bodyPr/>
-          <a:lstStyle/>
-          <a:p>
-            <a:r>
-              <a:rPr lang="en-US" dirty="0" smtClean="0"/>
-              <a:t>Server-side web frameworks are not your best friend</a:t>
+              <a:t>Uniform access patterns to server-side state</a:t>
+            </a:r>
+          </a:p>
+          <a:p>
+            <a:r>
+              <a:rPr lang="en-US" dirty="0" smtClean="0"/>
+              <a:t>Taking full advantage of HTTP</a:t>
             </a:r>
           </a:p>
           <a:p>
             <a:pPr lvl="1"/>
             <a:r>
               <a:rPr lang="en-US" dirty="0" smtClean="0"/>
-              <a:t>Adding overhead</a:t>
+              <a:t>Responses communicate API</a:t>
             </a:r>
           </a:p>
           <a:p>
             <a:pPr lvl="1"/>
             <a:r>
               <a:rPr lang="en-US" dirty="0" smtClean="0"/>
-              <a:t>Providing poor abstractions</a:t>
+              <a:t>Use content negotiation</a:t>
             </a:r>
           </a:p>
           <a:p>
             <a:pPr lvl="1"/>
             <a:r>
               <a:rPr lang="en-US" dirty="0" smtClean="0"/>
-              <a:t>Myopic world view, “Everything is a web client!”</a:t>
-            </a:r>
-          </a:p>
-          <a:p>
-            <a:pPr lvl="1"/>
-            <a:r>
-              <a:rPr lang="en-US" dirty="0" smtClean="0"/>
-              <a:t>Tight coupling of server and client</a:t>
-            </a:r>
-          </a:p>
-          <a:p>
-            <a:r>
-              <a:rPr lang="en-US" dirty="0" smtClean="0"/>
-              <a:t>What if your server just provided access to state and governed access and operations?</a:t>
-            </a:r>
+              <a:t>Leverage all the verbs</a:t>
+            </a:r>
+            <a:endParaRPr lang="en-US" dirty="0" smtClean="0"/>
+          </a:p>
+          <a:p>
+            <a:r>
+              <a:rPr lang="en-US" dirty="0" smtClean="0"/>
+              <a:t>Hypertext As The Engine Of Application State</a:t>
+            </a:r>
+            <a:endParaRPr lang="en-US" dirty="0" smtClean="0"/>
+          </a:p>
+          <a:p>
             <a:endParaRPr lang="en-US" dirty="0"/>
           </a:p>
         </p:txBody>
@@ -4281,7 +4275,7 @@
     </p:spTree>
     <p:extLst>
       <p:ext uri="{BB962C8B-B14F-4D97-AF65-F5344CB8AC3E}">
-        <p14:creationId xmlns:p14="http://schemas.microsoft.com/office/powerpoint/2010/main" val="1558913479"/>
+        <p14:creationId xmlns:p14="http://schemas.microsoft.com/office/powerpoint/2010/main" xmlns="" val="2027851767"/>
       </p:ext>
     </p:extLst>
   </p:cSld>
@@ -4325,7 +4319,7 @@
           <a:p>
             <a:r>
               <a:rPr lang="en-US" dirty="0" smtClean="0"/>
-              <a:t>REST: More than just a pretty URL</a:t>
+              <a:t>Server Side Zeitgeist</a:t>
             </a:r>
             <a:endParaRPr lang="en-US" dirty="0"/>
           </a:p>
@@ -4344,87 +4338,133 @@
         <p:spPr/>
         <p:txBody>
           <a:bodyPr>
-            <a:normAutofit fontScale="92500" lnSpcReduction="20000"/>
+            <a:normAutofit fontScale="92500" lnSpcReduction="10000"/>
           </a:bodyPr>
           <a:lstStyle/>
           <a:p>
             <a:r>
               <a:rPr lang="en-US" dirty="0" smtClean="0"/>
-              <a:t>Uniform access patterns to server-side state</a:t>
-            </a:r>
-          </a:p>
-          <a:p>
-            <a:r>
-              <a:rPr lang="en-US" dirty="0" smtClean="0"/>
-              <a:t>Taking full advantage of HTTP</a:t>
+              <a:t>Retreating to </a:t>
+            </a:r>
+            <a:r>
+              <a:rPr lang="en-US" dirty="0" smtClean="0"/>
+              <a:t>th</a:t>
+            </a:r>
+            <a:r>
+              <a:rPr lang="en-US" dirty="0" smtClean="0"/>
+              <a:t>e </a:t>
+            </a:r>
+            <a:r>
+              <a:rPr lang="en-US" dirty="0" smtClean="0"/>
+              <a:t>principles </a:t>
+            </a:r>
+            <a:r>
+              <a:rPr lang="en-US" dirty="0" smtClean="0"/>
+              <a:t>of HTTP and REST</a:t>
             </a:r>
           </a:p>
           <a:p>
             <a:pPr lvl="1"/>
             <a:r>
-              <a:rPr lang="en-US" dirty="0" smtClean="0"/>
-              <a:t>Responses communicate API</a:t>
+              <a:rPr lang="en-US" dirty="0" err="1" smtClean="0"/>
+              <a:t>Misultin</a:t>
+            </a:r>
+            <a:r>
+              <a:rPr lang="en-US" dirty="0" smtClean="0"/>
+              <a:t>, Cowboy, </a:t>
+            </a:r>
+            <a:r>
+              <a:rPr lang="en-US" dirty="0" err="1" smtClean="0"/>
+              <a:t>WebMachine</a:t>
+            </a:r>
+            <a:r>
+              <a:rPr lang="en-US" dirty="0" smtClean="0"/>
+              <a:t> (Erlang)</a:t>
             </a:r>
           </a:p>
           <a:p>
             <a:pPr lvl="1"/>
             <a:r>
               <a:rPr lang="en-US" dirty="0" smtClean="0"/>
-              <a:t>Use content negotiation</a:t>
+              <a:t>Sinatra (Ruby)</a:t>
             </a:r>
           </a:p>
           <a:p>
             <a:pPr lvl="1"/>
             <a:r>
               <a:rPr lang="en-US" dirty="0" smtClean="0"/>
-              <a:t>There’s more than GET / POST</a:t>
-            </a:r>
-          </a:p>
-          <a:p>
-            <a:r>
-              <a:rPr lang="en-US" dirty="0" smtClean="0"/>
-              <a:t>HTTP is device agnostic!</a:t>
-            </a:r>
-          </a:p>
-          <a:p>
-            <a:r>
-              <a:rPr lang="en-US" dirty="0" smtClean="0"/>
-              <a:t>HTTP is much, much simpler than</a:t>
+              <a:t>Express / Express-Resource (Node)</a:t>
             </a:r>
           </a:p>
           <a:p>
             <a:pPr lvl="1"/>
             <a:r>
               <a:rPr lang="en-US" dirty="0" smtClean="0"/>
-              <a:t>SOAP</a:t>
+              <a:t>OWIN Servers </a:t>
+            </a:r>
+            <a:r>
+              <a:rPr lang="en-US" dirty="0" smtClean="0"/>
+              <a:t>(</a:t>
+            </a:r>
+            <a:r>
+              <a:rPr lang="en-US" dirty="0" err="1" smtClean="0"/>
+              <a:t>.Net</a:t>
+            </a:r>
+            <a:r>
+              <a:rPr lang="en-US" dirty="0" smtClean="0"/>
+              <a:t>)</a:t>
+            </a:r>
+          </a:p>
+          <a:p>
+            <a:r>
+              <a:rPr lang="en-US" dirty="0" smtClean="0"/>
+              <a:t>Focus </a:t>
             </a:r>
           </a:p>
           <a:p>
             <a:pPr lvl="1"/>
             <a:r>
               <a:rPr lang="en-US" dirty="0" smtClean="0"/>
-              <a:t>WS-*</a:t>
-            </a:r>
-          </a:p>
-          <a:p>
-            <a:r>
-              <a:rPr lang="en-US" dirty="0" smtClean="0"/>
-              <a:t>HTTP lets you transfer in *any* data format</a:t>
+              <a:t>server-side </a:t>
+            </a:r>
+            <a:r>
+              <a:rPr lang="en-US" dirty="0" smtClean="0"/>
+              <a:t>resources</a:t>
             </a:r>
           </a:p>
           <a:p>
             <a:pPr lvl="1"/>
+            <a:r>
+              <a:rPr lang="en-US" dirty="0" smtClean="0"/>
+              <a:t>Performance</a:t>
+            </a:r>
             <a:endParaRPr lang="en-US" dirty="0" smtClean="0"/>
           </a:p>
           <a:p>
-            <a:endParaRPr lang="en-US" dirty="0"/>
+            <a:pPr lvl="1"/>
+            <a:r>
+              <a:rPr lang="en-US" b="1" i="1" dirty="0" smtClean="0"/>
+              <a:t>any </a:t>
+            </a:r>
+            <a:r>
+              <a:rPr lang="en-US" dirty="0" smtClean="0"/>
+              <a:t>client can consume</a:t>
+            </a:r>
+          </a:p>
+          <a:p>
+            <a:pPr lvl="1"/>
+            <a:r>
+              <a:rPr lang="en-US" b="1" i="1" dirty="0" smtClean="0"/>
+              <a:t>OPEN STANDARDS!</a:t>
+            </a:r>
+            <a:endParaRPr lang="en-US" b="1" i="1" dirty="0"/>
           </a:p>
         </p:txBody>
       </p:sp>
     </p:spTree>
     <p:extLst>
       <p:ext uri="{BB962C8B-B14F-4D97-AF65-F5344CB8AC3E}">
-        <p14:creationId xmlns:p14="http://schemas.microsoft.com/office/powerpoint/2010/main" val="2027851767"/>
+        <p14:creationId xmlns:p14="http://schemas.microsoft.com/office/powerpoint/2010/main" xmlns="" val="316421455"/>
       </p:ext>
     </p:extLst>
   </p:cSld>
@@ -4468,7 +4508,7 @@
           <a:p>
             <a:r>
               <a:rPr lang="en-US" dirty="0" smtClean="0"/>
-              <a:t>Throughput</a:t>
+              <a:t>Putting it Together</a:t>
             </a:r>
             <a:endParaRPr lang="en-US" dirty="0"/>
           </a:p>
@@ -4486,64 +4526,97 @@
         </p:nvSpPr>
         <p:spPr/>
         <p:txBody>
-          <a:bodyPr>
-            <a:normAutofit/>
-          </a:bodyPr>
-          <a:lstStyle/>
-          <a:p>
-            <a:r>
-              <a:rPr lang="en-US" dirty="0" smtClean="0"/>
-              <a:t>Newer HTTP servers provide surprising throughput</a:t>
-            </a:r>
+          <a:bodyPr/>
+          <a:lstStyle/>
+          <a:p>
+            <a:r>
+              <a:rPr lang="en-US" dirty="0" smtClean="0"/>
+              <a:t>Libraries like jQuery, jQuery UI, </a:t>
+            </a:r>
+            <a:r>
+              <a:rPr lang="en-US" dirty="0" err="1" smtClean="0"/>
+              <a:t>Amplify.js</a:t>
+            </a:r>
+            <a:endParaRPr lang="en-US" dirty="0" smtClean="0"/>
           </a:p>
           <a:p>
             <a:pPr lvl="1"/>
             <a:r>
+              <a:rPr lang="en-US" dirty="0" smtClean="0"/>
+              <a:t>Abstracting common pain points</a:t>
+            </a:r>
+          </a:p>
+          <a:p>
+            <a:pPr lvl="1"/>
+            <a:r>
+              <a:rPr lang="en-US" dirty="0" smtClean="0"/>
+              <a:t>Providing foundation for meta-frameworks</a:t>
+            </a:r>
+          </a:p>
+          <a:p>
+            <a:pPr lvl="2"/>
+            <a:r>
               <a:rPr lang="en-US" dirty="0" err="1" smtClean="0"/>
-              <a:t>Node.js</a:t>
+              <a:t>Backbone.js</a:t>
             </a:r>
             <a:endParaRPr lang="en-US" dirty="0" smtClean="0"/>
           </a:p>
           <a:p>
+            <a:pPr lvl="2"/>
+            <a:r>
+              <a:rPr lang="en-US" dirty="0" err="1" smtClean="0"/>
+              <a:t>Knockout.js</a:t>
+            </a:r>
+            <a:endParaRPr lang="en-US" dirty="0" smtClean="0"/>
+          </a:p>
+          <a:p>
+            <a:r>
+              <a:rPr lang="en-US" dirty="0" smtClean="0"/>
+              <a:t>jQuery UI, </a:t>
+            </a:r>
+            <a:r>
+              <a:rPr lang="en-US" dirty="0" err="1" smtClean="0"/>
+              <a:t>ExtJS</a:t>
+            </a:r>
+            <a:r>
+              <a:rPr lang="en-US" dirty="0" smtClean="0"/>
+              <a:t>, Dojo Toolkit</a:t>
+            </a:r>
+          </a:p>
+          <a:p>
             <a:pPr lvl="1"/>
             <a:r>
-              <a:rPr lang="en-US" dirty="0" err="1" smtClean="0"/>
-              <a:t>Misultin</a:t>
-            </a:r>
-            <a:endParaRPr lang="en-US" dirty="0" smtClean="0"/>
+              <a:rPr lang="en-US" dirty="0" smtClean="0"/>
+              <a:t>Making complex UI development accessible</a:t>
+            </a:r>
           </a:p>
           <a:p>
             <a:pPr lvl="1"/>
             <a:r>
               <a:rPr lang="en-US" dirty="0" smtClean="0"/>
-              <a:t>Sinatra</a:t>
-            </a:r>
-          </a:p>
-          <a:p>
-            <a:pPr lvl="1"/>
-            <a:r>
-              <a:rPr lang="en-US" dirty="0" smtClean="0"/>
-              <a:t>Kayak</a:t>
-            </a:r>
-          </a:p>
-          <a:p>
-            <a:r>
-              <a:rPr lang="en-US" dirty="0" smtClean="0"/>
-              <a:t>Best part: all of these are embedded into the application itself!</a:t>
-            </a:r>
+              <a:t>Community-tested approaches (distilled wisdom)</a:t>
+            </a:r>
+            <a:endParaRPr lang="en-US" dirty="0"/>
           </a:p>
         </p:txBody>
       </p:sp>
     </p:spTree>
     <p:extLst>
       <p:ext uri="{BB962C8B-B14F-4D97-AF65-F5344CB8AC3E}">
-        <p14:creationId xmlns:p14="http://schemas.microsoft.com/office/powerpoint/2010/main" val="524352432"/>
+        <p14:creationId xmlns:p14="http://schemas.microsoft.com/office/powerpoint/2010/main" xmlns="" val="1642859947"/>
       </p:ext>
     </p:extLst>
   </p:cSld>
   <p:clrMapOvr>
     <a:masterClrMapping/>
   </p:clrMapOvr>
+  <p:timing>
+    <p:tnLst>
+      <p:par>
+        <p:cTn id="1" dur="indefinite" restart="never" nodeType="tmRoot"/>
+      </p:par>
+    </p:tnLst>
+  </p:timing>
 </p:sld>
 </file>
 
@@ -4604,71 +4677,65 @@
           <a:p>
             <a:r>
               <a:rPr lang="en-US" dirty="0" smtClean="0"/>
-              <a:t>Libraries like jQuery, jQuery UI, </a:t>
+              <a:t>Look for:</a:t>
+            </a:r>
+          </a:p>
+          <a:p>
+            <a:pPr lvl="1"/>
+            <a:r>
+              <a:rPr lang="en-US" dirty="0" smtClean="0"/>
+              <a:t>Push towards more interoperability</a:t>
+            </a:r>
+          </a:p>
+          <a:p>
+            <a:pPr lvl="1"/>
+            <a:r>
+              <a:rPr lang="en-US" dirty="0" smtClean="0"/>
+              <a:t>Better organization of code (</a:t>
             </a:r>
             <a:r>
               <a:rPr lang="en-US" dirty="0" err="1" smtClean="0"/>
-              <a:t>Amplify.js</a:t>
-            </a:r>
+              <a:t>CommonJS</a:t>
+            </a:r>
+            <a:r>
+              <a:rPr lang="en-US" dirty="0" smtClean="0"/>
+              <a:t>)</a:t>
+            </a:r>
+          </a:p>
+          <a:p>
+            <a:pPr lvl="1"/>
+            <a:r>
+              <a:rPr lang="en-US" dirty="0" smtClean="0"/>
+              <a:t>Patterns/Approaches to emerge:</a:t>
+            </a:r>
+          </a:p>
+          <a:p>
+            <a:pPr lvl="2"/>
+            <a:r>
+              <a:rPr lang="en-US" dirty="0" smtClean="0"/>
+              <a:t>Client side messaging</a:t>
+            </a:r>
+          </a:p>
+          <a:p>
+            <a:pPr lvl="2"/>
+            <a:r>
+              <a:rPr lang="en-US" dirty="0" smtClean="0"/>
+              <a:t>Local storage w/remote sync</a:t>
+            </a:r>
+          </a:p>
+          <a:p>
+            <a:pPr lvl="2"/>
+            <a:r>
+              <a:rPr lang="en-US" dirty="0" smtClean="0"/>
+              <a:t>Command-style HTTP interaction w/ server</a:t>
+            </a:r>
+          </a:p>
+          <a:p>
+            <a:pPr lvl="2"/>
             <a:endParaRPr lang="en-US" dirty="0" smtClean="0"/>
           </a:p>
           <a:p>
-            <a:pPr lvl="1"/>
-            <a:r>
-              <a:rPr lang="en-US" dirty="0" smtClean="0"/>
-              <a:t>Abstracting common pain points</a:t>
-            </a:r>
-          </a:p>
-          <a:p>
-            <a:pPr lvl="1"/>
-            <a:r>
-              <a:rPr lang="en-US" dirty="0" smtClean="0"/>
-              <a:t>Providing foundation for meta-frameworks</a:t>
-            </a:r>
-          </a:p>
-          <a:p>
             <a:pPr lvl="2"/>
-            <a:r>
-              <a:rPr lang="en-US" dirty="0" err="1" smtClean="0"/>
-              <a:t>Backbone.js</a:t>
-            </a:r>
-            <a:endParaRPr lang="en-US" dirty="0" smtClean="0"/>
-          </a:p>
-          <a:p>
-            <a:pPr lvl="2"/>
-            <a:r>
-              <a:rPr lang="en-US" dirty="0" err="1" smtClean="0"/>
-              <a:t>Knockout.js</a:t>
-            </a:r>
-            <a:endParaRPr lang="en-US" dirty="0" smtClean="0"/>
-          </a:p>
-          <a:p>
-            <a:r>
-              <a:rPr lang="en-US" dirty="0" smtClean="0"/>
-              <a:t>jQuery UI, </a:t>
-            </a:r>
-            <a:r>
-              <a:rPr lang="en-US" dirty="0" err="1" smtClean="0"/>
-              <a:t>ExtJS</a:t>
-            </a:r>
-            <a:r>
-              <a:rPr lang="en-US" dirty="0" smtClean="0"/>
-              <a:t>, Dojo Toolkit</a:t>
-            </a:r>
-          </a:p>
-          <a:p>
-            <a:pPr lvl="1"/>
-            <a:r>
-              <a:rPr lang="en-US" dirty="0" smtClean="0"/>
-              <a:t>Making complex UI development accessible</a:t>
-            </a:r>
-          </a:p>
-          <a:p>
-            <a:pPr lvl="1"/>
-            <a:r>
-              <a:rPr lang="en-US" dirty="0" smtClean="0"/>
-              <a:t>Community-tested approaches (distilled wisdom)</a:t>
-            </a:r>
             <a:endParaRPr lang="en-US" dirty="0"/>
           </a:p>
         </p:txBody>
@@ -4676,7 +4743,7 @@
     </p:spTree>
     <p:extLst>
       <p:ext uri="{BB962C8B-B14F-4D97-AF65-F5344CB8AC3E}">
-        <p14:creationId xmlns:p14="http://schemas.microsoft.com/office/powerpoint/2010/main" val="1642859947"/>
+        <p14:creationId xmlns:p14="http://schemas.microsoft.com/office/powerpoint/2010/main" xmlns="" val="1472304662"/>
       </p:ext>
     </p:extLst>
   </p:cSld>
@@ -4686,7 +4753,7 @@
   <p:timing>
     <p:tnLst>
       <p:par>
-        <p:cTn xmlns:p14="http://schemas.microsoft.com/office/powerpoint/2010/main" id="1" dur="indefinite" restart="never" nodeType="tmRoot"/>
+        <p:cTn id="1" dur="indefinite" restart="never" nodeType="tmRoot"/>
       </p:par>
     </p:tnLst>
   </p:timing>
@@ -4727,7 +4794,7 @@
           <a:p>
             <a:r>
               <a:rPr lang="en-US" dirty="0" smtClean="0"/>
-              <a:t>Putting it Together</a:t>
+              <a:t>I See Skies Of Blue…</a:t>
             </a:r>
             <a:endParaRPr lang="en-US" dirty="0"/>
           </a:p>
@@ -4748,88 +4815,211 @@
           <a:bodyPr/>
           <a:lstStyle/>
           <a:p>
-            <a:r>
-              <a:rPr lang="en-US" dirty="0" smtClean="0"/>
-              <a:t>Look for:</a:t>
-            </a:r>
-          </a:p>
-          <a:p>
-            <a:pPr lvl="1"/>
-            <a:r>
-              <a:rPr lang="en-US" dirty="0" smtClean="0"/>
-              <a:t>Push towards more interoperability</a:t>
-            </a:r>
-          </a:p>
-          <a:p>
-            <a:pPr lvl="1"/>
-            <a:r>
-              <a:rPr lang="en-US" dirty="0" smtClean="0"/>
-              <a:t>Better organization of code (</a:t>
-            </a:r>
-            <a:r>
-              <a:rPr lang="en-US" dirty="0" err="1" smtClean="0"/>
-              <a:t>CommonJS</a:t>
-            </a:r>
-            <a:r>
-              <a:rPr lang="en-US" dirty="0" smtClean="0"/>
-              <a:t>)</a:t>
-            </a:r>
-          </a:p>
-          <a:p>
-            <a:pPr lvl="1"/>
-            <a:r>
-              <a:rPr lang="en-US" dirty="0" smtClean="0"/>
-              <a:t>Patterns/Approaches to emerge:</a:t>
-            </a:r>
-          </a:p>
-          <a:p>
-            <a:pPr lvl="2"/>
-            <a:r>
-              <a:rPr lang="en-US" dirty="0" smtClean="0"/>
-              <a:t>Client side messaging</a:t>
-            </a:r>
-          </a:p>
-          <a:p>
-            <a:pPr lvl="2"/>
-            <a:r>
-              <a:rPr lang="en-US" dirty="0" smtClean="0"/>
-              <a:t>Local storage w/remote sync</a:t>
-            </a:r>
-          </a:p>
-          <a:p>
-            <a:pPr lvl="2"/>
-            <a:r>
-              <a:rPr lang="en-US" dirty="0" smtClean="0"/>
-              <a:t>Command-style HTTP interaction w/ server</a:t>
-            </a:r>
-          </a:p>
-          <a:p>
-            <a:pPr lvl="2"/>
-            <a:endParaRPr lang="en-US" dirty="0" smtClean="0"/>
-          </a:p>
-          <a:p>
-            <a:pPr lvl="2"/>
+            <a:pPr>
+              <a:buNone/>
+            </a:pPr>
+            <a:r>
+              <a:rPr lang="en-US" dirty="0" smtClean="0"/>
+              <a:t>This is the part where we show you some lovely code Jim wrote.</a:t>
+            </a:r>
             <a:endParaRPr lang="en-US" dirty="0"/>
           </a:p>
         </p:txBody>
       </p:sp>
     </p:spTree>
-    <p:extLst>
-      <p:ext uri="{BB962C8B-B14F-4D97-AF65-F5344CB8AC3E}">
-        <p14:creationId xmlns:p14="http://schemas.microsoft.com/office/powerpoint/2010/main" val="1472304662"/>
-      </p:ext>
-    </p:extLst>
   </p:cSld>
   <p:clrMapOvr>
     <a:masterClrMapping/>
   </p:clrMapOvr>
-  <p:timing>
-    <p:tnLst>
-      <p:par>
-        <p:cTn xmlns:p14="http://schemas.microsoft.com/office/powerpoint/2010/main" id="1" dur="indefinite" restart="never" nodeType="tmRoot"/>
-      </p:par>
-    </p:tnLst>
-  </p:timing>
+</p:sld>
+</file>
+
+<file path=ppt/slides/slide17.xml><?xml version="1.0" encoding="utf-8"?>
+<p:sld xmlns:a="http://schemas.openxmlformats.org/drawingml/2006/main" xmlns:r="http://schemas.openxmlformats.org/officeDocument/2006/relationships" xmlns:p="http://schemas.openxmlformats.org/presentationml/2006/main">
+  <p:cSld>
+    <p:spTree>
+      <p:nvGrpSpPr>
+        <p:cNvPr id="1" name=""/>
+        <p:cNvGrpSpPr/>
+        <p:nvPr/>
+      </p:nvGrpSpPr>
+      <p:grpSpPr>
+        <a:xfrm>
+          <a:off x="0" y="0"/>
+          <a:ext cx="0" cy="0"/>
+          <a:chOff x="0" y="0"/>
+          <a:chExt cx="0" cy="0"/>
+        </a:xfrm>
+      </p:grpSpPr>
+      <p:sp>
+        <p:nvSpPr>
+          <p:cNvPr id="2" name="Title 1"/>
+          <p:cNvSpPr>
+            <a:spLocks noGrp="1"/>
+          </p:cNvSpPr>
+          <p:nvPr>
+            <p:ph type="title"/>
+          </p:nvPr>
+        </p:nvSpPr>
+        <p:spPr/>
+        <p:txBody>
+          <a:bodyPr/>
+          <a:lstStyle/>
+          <a:p>
+            <a:r>
+              <a:rPr lang="en-US" dirty="0" smtClean="0"/>
+              <a:t>Questions?</a:t>
+            </a:r>
+            <a:endParaRPr lang="en-US" dirty="0"/>
+          </a:p>
+        </p:txBody>
+      </p:sp>
+      <p:sp>
+        <p:nvSpPr>
+          <p:cNvPr id="4" name="Text Placeholder 3"/>
+          <p:cNvSpPr>
+            <a:spLocks noGrp="1"/>
+          </p:cNvSpPr>
+          <p:nvPr>
+            <p:ph type="body" idx="1"/>
+          </p:nvPr>
+        </p:nvSpPr>
+        <p:spPr/>
+        <p:txBody>
+          <a:bodyPr/>
+          <a:lstStyle/>
+          <a:p>
+            <a:r>
+              <a:rPr lang="en-US" dirty="0" smtClean="0"/>
+              <a:t>Jim’s Contact Info</a:t>
+            </a:r>
+            <a:endParaRPr lang="en-US" dirty="0"/>
+          </a:p>
+        </p:txBody>
+      </p:sp>
+      <p:sp>
+        <p:nvSpPr>
+          <p:cNvPr id="5" name="Content Placeholder 4"/>
+          <p:cNvSpPr>
+            <a:spLocks noGrp="1"/>
+          </p:cNvSpPr>
+          <p:nvPr>
+            <p:ph sz="half" idx="2"/>
+          </p:nvPr>
+        </p:nvSpPr>
+        <p:spPr/>
+        <p:txBody>
+          <a:bodyPr/>
+          <a:lstStyle/>
+          <a:p>
+            <a:endParaRPr lang="en-US"/>
+          </a:p>
+        </p:txBody>
+      </p:sp>
+      <p:sp>
+        <p:nvSpPr>
+          <p:cNvPr id="6" name="Text Placeholder 5"/>
+          <p:cNvSpPr>
+            <a:spLocks noGrp="1"/>
+          </p:cNvSpPr>
+          <p:nvPr>
+            <p:ph type="body" sz="quarter" idx="3"/>
+          </p:nvPr>
+        </p:nvSpPr>
+        <p:spPr/>
+        <p:txBody>
+          <a:bodyPr/>
+          <a:lstStyle/>
+          <a:p>
+            <a:r>
+              <a:rPr lang="en-US" dirty="0" smtClean="0"/>
+              <a:t>Alex’s Contact Info</a:t>
+            </a:r>
+            <a:endParaRPr lang="en-US" dirty="0"/>
+          </a:p>
+        </p:txBody>
+      </p:sp>
+      <p:sp>
+        <p:nvSpPr>
+          <p:cNvPr id="7" name="Content Placeholder 6"/>
+          <p:cNvSpPr>
+            <a:spLocks noGrp="1"/>
+          </p:cNvSpPr>
+          <p:nvPr>
+            <p:ph sz="quarter" idx="4"/>
+          </p:nvPr>
+        </p:nvSpPr>
+        <p:spPr/>
+        <p:txBody>
+          <a:bodyPr>
+            <a:normAutofit/>
+          </a:bodyPr>
+          <a:lstStyle/>
+          <a:p>
+            <a:r>
+              <a:rPr lang="en-US" sz="2000" dirty="0" smtClean="0"/>
+              <a:t>@</a:t>
+            </a:r>
+            <a:r>
+              <a:rPr lang="en-US" sz="2000" dirty="0" err="1" smtClean="0"/>
+              <a:t>A_Robson</a:t>
+            </a:r>
+            <a:endParaRPr lang="en-US" sz="2000" dirty="0" smtClean="0"/>
+          </a:p>
+          <a:p>
+            <a:r>
+              <a:rPr lang="en-US" sz="2000" dirty="0" smtClean="0">
+                <a:hlinkClick r:id="rId2"/>
+              </a:rPr>
+              <a:t>alex@sharplearningcurve.com</a:t>
+            </a:r>
+            <a:endParaRPr lang="en-US" sz="2000" dirty="0" smtClean="0"/>
+          </a:p>
+          <a:p>
+            <a:r>
+              <a:rPr lang="en-US" sz="2000" dirty="0" smtClean="0"/>
+              <a:t>http://github.com/arobson</a:t>
+            </a:r>
+            <a:endParaRPr lang="en-US" sz="2000" dirty="0"/>
+          </a:p>
+        </p:txBody>
+      </p:sp>
+      <p:sp>
+        <p:nvSpPr>
+          <p:cNvPr id="8" name="TextBox 7"/>
+          <p:cNvSpPr txBox="1"/>
+          <p:nvPr/>
+        </p:nvSpPr>
+        <p:spPr>
+          <a:xfrm>
+            <a:off x="439249" y="6126163"/>
+            <a:ext cx="8247551" cy="400110"/>
+          </a:xfrm>
+          <a:prstGeom prst="rect">
+            <a:avLst/>
+          </a:prstGeom>
+          <a:noFill/>
+        </p:spPr>
+        <p:txBody>
+          <a:bodyPr wrap="square" rtlCol="0">
+            <a:spAutoFit/>
+          </a:bodyPr>
+          <a:lstStyle/>
+          <a:p>
+            <a:pPr algn="ctr"/>
+            <a:r>
+              <a:rPr lang="en-US" sz="2000" b="1" dirty="0" smtClean="0"/>
+              <a:t>Want to talk more? Talk to us after and we’ll create an Open Spaces slot!</a:t>
+            </a:r>
+            <a:endParaRPr lang="en-US" sz="2000" b="1" dirty="0"/>
+          </a:p>
+        </p:txBody>
+      </p:sp>
+    </p:spTree>
+  </p:cSld>
+  <p:clrMapOvr>
+    <a:masterClrMapping/>
+  </p:clrMapOvr>
 </p:sld>
 </file>
 
@@ -4852,7 +5042,7 @@
       </p:grpSpPr>
       <p:sp>
         <p:nvSpPr>
-          <p:cNvPr id="2" name="Title 1"/>
+          <p:cNvPr id="4" name="Title 3"/>
           <p:cNvSpPr>
             <a:spLocks noGrp="1"/>
           </p:cNvSpPr>
@@ -4867,7 +5057,7 @@
           <a:p>
             <a:r>
               <a:rPr lang="en-US" dirty="0" smtClean="0"/>
-              <a:t>Recent Developments</a:t>
+              <a:t>About Us</a:t>
             </a:r>
             <a:endParaRPr lang="en-US" dirty="0"/>
           </a:p>
@@ -4875,122 +5065,206 @@
       </p:sp>
       <p:sp>
         <p:nvSpPr>
-          <p:cNvPr id="3" name="Content Placeholder 2"/>
-          <p:cNvSpPr>
-            <a:spLocks noGrp="1"/>
-          </p:cNvSpPr>
-          <p:nvPr>
-            <p:ph idx="1"/>
+          <p:cNvPr id="5" name="Content Placeholder 4"/>
+          <p:cNvSpPr>
+            <a:spLocks noGrp="1"/>
+          </p:cNvSpPr>
+          <p:nvPr>
+            <p:ph sz="half" idx="1"/>
           </p:nvPr>
         </p:nvSpPr>
         <p:spPr/>
         <p:txBody>
           <a:bodyPr>
-            <a:normAutofit fontScale="77500" lnSpcReduction="20000"/>
+            <a:normAutofit lnSpcReduction="10000"/>
           </a:bodyPr>
           <a:lstStyle/>
           <a:p>
             <a:r>
               <a:rPr lang="en-US" dirty="0" smtClean="0"/>
-              <a:t>Explosion of client side frameworks/toolsets</a:t>
-            </a:r>
-          </a:p>
-          <a:p>
-            <a:r>
-              <a:rPr lang="en-US" dirty="0" smtClean="0"/>
-              <a:t>Improvements of JS runtimes</a:t>
-            </a:r>
-          </a:p>
-          <a:p>
-            <a:r>
-              <a:rPr lang="en-US" dirty="0" smtClean="0"/>
-              <a:t>Unit testing frameworks</a:t>
-            </a:r>
-          </a:p>
-          <a:p>
-            <a:r>
-              <a:rPr lang="en-US" dirty="0" smtClean="0"/>
-              <a:t>Cross/</a:t>
-            </a:r>
+              <a:t>Jim Cowart</a:t>
+            </a:r>
+          </a:p>
+          <a:p>
+            <a:r>
+              <a:rPr lang="en-US" dirty="0" smtClean="0"/>
+              <a:t>Architect / Developer</a:t>
+            </a:r>
+          </a:p>
+          <a:p>
+            <a:r>
+              <a:rPr lang="en-US" dirty="0" smtClean="0"/>
+              <a:t>Focus</a:t>
+            </a:r>
+          </a:p>
+          <a:p>
+            <a:pPr lvl="1"/>
+            <a:r>
+              <a:rPr lang="en-US" dirty="0" smtClean="0"/>
+              <a:t>Client-side magic</a:t>
+            </a:r>
+          </a:p>
+          <a:p>
+            <a:pPr lvl="1"/>
+            <a:r>
+              <a:rPr lang="en-US" dirty="0" smtClean="0"/>
+              <a:t>Your mothers</a:t>
+            </a:r>
+          </a:p>
+          <a:p>
+            <a:pPr lvl="1"/>
+            <a:r>
+              <a:rPr lang="en-US" dirty="0" smtClean="0"/>
+              <a:t>Ponies</a:t>
+            </a:r>
+          </a:p>
+          <a:p>
+            <a:r>
+              <a:rPr lang="en-US" dirty="0" smtClean="0"/>
+              <a:t>Technologies I &lt;3</a:t>
+            </a:r>
+          </a:p>
+          <a:p>
+            <a:pPr lvl="1"/>
             <a:r>
               <a:rPr lang="en-US" dirty="0" err="1" smtClean="0"/>
-              <a:t>Transpiling</a:t>
+              <a:t>Javascript</a:t>
             </a:r>
             <a:endParaRPr lang="en-US" dirty="0" smtClean="0"/>
           </a:p>
           <a:p>
-            <a:r>
-              <a:rPr lang="en-US" dirty="0" smtClean="0"/>
-              <a:t>More attention to REST</a:t>
-            </a:r>
-          </a:p>
-          <a:p>
-            <a:r>
-              <a:rPr lang="en-US" dirty="0" smtClean="0"/>
-              <a:t>Server REST API Frameworks</a:t>
-            </a:r>
-          </a:p>
-          <a:p>
             <a:pPr lvl="1"/>
             <a:r>
-              <a:rPr lang="en-US" dirty="0" smtClean="0"/>
-              <a:t>Ruby’s Rack</a:t>
-            </a:r>
+              <a:rPr lang="en-US" dirty="0" err="1" smtClean="0"/>
+              <a:t>Javascript</a:t>
+            </a:r>
+            <a:endParaRPr lang="en-US" dirty="0" smtClean="0"/>
           </a:p>
           <a:p>
             <a:pPr lvl="1"/>
             <a:r>
-              <a:rPr lang="en-US" dirty="0" smtClean="0"/>
-              <a:t>Node’s Express, etc.</a:t>
-            </a:r>
-          </a:p>
-          <a:p>
-            <a:r>
-              <a:rPr lang="en-US" dirty="0" smtClean="0"/>
-              <a:t>Push towards simple/r frameworks</a:t>
+              <a:rPr lang="en-US" dirty="0" err="1" smtClean="0"/>
+              <a:t>Javascript</a:t>
+            </a:r>
+            <a:endParaRPr lang="en-US" dirty="0" smtClean="0"/>
+          </a:p>
+          <a:p>
+            <a:pPr lvl="2"/>
+            <a:endParaRPr lang="en-US" dirty="0"/>
+          </a:p>
+        </p:txBody>
+      </p:sp>
+      <p:sp>
+        <p:nvSpPr>
+          <p:cNvPr id="6" name="Content Placeholder 5"/>
+          <p:cNvSpPr>
+            <a:spLocks noGrp="1"/>
+          </p:cNvSpPr>
+          <p:nvPr>
+            <p:ph sz="half" idx="2"/>
+          </p:nvPr>
+        </p:nvSpPr>
+        <p:spPr/>
+        <p:txBody>
+          <a:bodyPr>
+            <a:normAutofit lnSpcReduction="10000"/>
+          </a:bodyPr>
+          <a:lstStyle/>
+          <a:p>
+            <a:pPr>
+              <a:buNone/>
+            </a:pPr>
+            <a:r>
+              <a:rPr lang="en-US" dirty="0" smtClean="0"/>
+              <a:t>Alex Robson</a:t>
+            </a:r>
+          </a:p>
+          <a:p>
+            <a:r>
+              <a:rPr lang="en-US" dirty="0" smtClean="0"/>
+              <a:t>Architect / Developer</a:t>
+            </a:r>
+          </a:p>
+          <a:p>
+            <a:r>
+              <a:rPr lang="en-US" dirty="0" smtClean="0"/>
+              <a:t>Focus</a:t>
             </a:r>
           </a:p>
           <a:p>
             <a:pPr lvl="1"/>
             <a:r>
               <a:rPr lang="en-US" dirty="0" smtClean="0"/>
-              <a:t>Node</a:t>
+              <a:t>Distributed architecture</a:t>
             </a:r>
           </a:p>
           <a:p>
             <a:pPr lvl="1"/>
             <a:r>
               <a:rPr lang="en-US" dirty="0" smtClean="0"/>
-              <a:t>Nancy &amp; Kayak in .NET</a:t>
+              <a:t>REST</a:t>
             </a:r>
           </a:p>
           <a:p>
             <a:pPr lvl="1"/>
             <a:r>
               <a:rPr lang="en-US" dirty="0" smtClean="0"/>
-              <a:t>Sinatra</a:t>
-            </a:r>
+              <a:t>Messaging</a:t>
+            </a:r>
+          </a:p>
+          <a:p>
+            <a:r>
+              <a:rPr lang="en-US" dirty="0" smtClean="0"/>
+              <a:t>Technologies I &lt;3</a:t>
+            </a:r>
+          </a:p>
+          <a:p>
+            <a:pPr lvl="1"/>
+            <a:r>
+              <a:rPr lang="en-US" dirty="0" err="1" smtClean="0"/>
+              <a:t>Erlang</a:t>
+            </a:r>
+            <a:endParaRPr lang="en-US" dirty="0" smtClean="0"/>
+          </a:p>
+          <a:p>
+            <a:pPr lvl="1"/>
+            <a:r>
+              <a:rPr lang="en-US" dirty="0" err="1" smtClean="0"/>
+              <a:t>RabbitMQ</a:t>
+            </a:r>
+            <a:endParaRPr lang="en-US" dirty="0" smtClean="0"/>
+          </a:p>
+          <a:p>
+            <a:pPr lvl="1"/>
+            <a:r>
+              <a:rPr lang="en-US" dirty="0" err="1" smtClean="0"/>
+              <a:t>CoffeeScript</a:t>
+            </a:r>
+            <a:r>
+              <a:rPr lang="en-US" dirty="0" smtClean="0"/>
+              <a:t> / Node.js</a:t>
+            </a:r>
+          </a:p>
+          <a:p>
+            <a:pPr lvl="1">
+              <a:buNone/>
+            </a:pPr>
+            <a:endParaRPr lang="en-US" dirty="0" smtClean="0"/>
+          </a:p>
+          <a:p>
+            <a:pPr lvl="1"/>
+            <a:endParaRPr lang="en-US" dirty="0" smtClean="0"/>
+          </a:p>
+          <a:p>
             <a:endParaRPr lang="en-US" dirty="0"/>
           </a:p>
         </p:txBody>
       </p:sp>
     </p:spTree>
-    <p:extLst>
-      <p:ext uri="{BB962C8B-B14F-4D97-AF65-F5344CB8AC3E}">
-        <p14:creationId xmlns:p14="http://schemas.microsoft.com/office/powerpoint/2010/main" val="443154862"/>
-      </p:ext>
-    </p:extLst>
   </p:cSld>
   <p:clrMapOvr>
     <a:masterClrMapping/>
   </p:clrMapOvr>
-  <p:timing>
-    <p:tnLst>
-      <p:par>
-        <p:cTn xmlns:p14="http://schemas.microsoft.com/office/powerpoint/2010/main" id="1" dur="indefinite" restart="never" nodeType="tmRoot"/>
-      </p:par>
-    </p:tnLst>
-  </p:timing>
 </p:sld>
 </file>
 
@@ -5013,55 +5287,22 @@
       </p:grpSpPr>
       <p:sp>
         <p:nvSpPr>
-          <p:cNvPr id="10" name="Oval 9"/>
-          <p:cNvSpPr/>
-          <p:nvPr/>
-        </p:nvSpPr>
-        <p:spPr>
-          <a:xfrm>
-            <a:off x="2652009" y="1123154"/>
-            <a:ext cx="3826265" cy="1682647"/>
-          </a:xfrm>
-          <a:prstGeom prst="ellipse">
-            <a:avLst/>
-          </a:prstGeom>
-          <a:solidFill>
-            <a:schemeClr val="accent6">
-              <a:lumMod val="75000"/>
-              <a:alpha val="46000"/>
-            </a:schemeClr>
-          </a:solidFill>
-        </p:spPr>
-        <p:style>
-          <a:lnRef idx="1">
-            <a:schemeClr val="accent1"/>
-          </a:lnRef>
-          <a:fillRef idx="3">
-            <a:schemeClr val="accent1"/>
-          </a:fillRef>
-          <a:effectRef idx="2">
-            <a:schemeClr val="accent1"/>
-          </a:effectRef>
-          <a:fontRef idx="minor">
-            <a:schemeClr val="lt1"/>
-          </a:fontRef>
-        </p:style>
-        <p:txBody>
-          <a:bodyPr rtlCol="0" anchor="t"/>
-          <a:lstStyle/>
-          <a:p>
-            <a:pPr algn="ctr"/>
-            <a:r>
-              <a:rPr lang="en-US" dirty="0" err="1" smtClean="0"/>
-              <a:t>NoSQL</a:t>
-            </a:r>
-            <a:r>
-              <a:rPr lang="en-US" dirty="0" smtClean="0"/>
-              <a:t> </a:t>
-            </a:r>
-            <a:r>
-              <a:rPr lang="en-US" dirty="0" smtClean="0"/>
-              <a:t>w/HTTP</a:t>
+          <p:cNvPr id="2" name="Title 1"/>
+          <p:cNvSpPr>
+            <a:spLocks noGrp="1"/>
+          </p:cNvSpPr>
+          <p:nvPr>
+            <p:ph type="title"/>
+          </p:nvPr>
+        </p:nvSpPr>
+        <p:spPr/>
+        <p:txBody>
+          <a:bodyPr/>
+          <a:lstStyle/>
+          <a:p>
+            <a:r>
+              <a:rPr lang="en-US" dirty="0" smtClean="0"/>
+              <a:t>Disclaimer</a:t>
             </a:r>
             <a:endParaRPr lang="en-US" dirty="0"/>
           </a:p>
@@ -5069,518 +5310,64 @@
       </p:sp>
       <p:sp>
         <p:nvSpPr>
-          <p:cNvPr id="2" name="Title 1"/>
-          <p:cNvSpPr>
-            <a:spLocks noGrp="1"/>
-          </p:cNvSpPr>
-          <p:nvPr>
-            <p:ph type="title"/>
-          </p:nvPr>
-        </p:nvSpPr>
-        <p:spPr/>
-        <p:txBody>
-          <a:bodyPr anchor="t"/>
-          <a:lstStyle/>
-          <a:p>
-            <a:r>
-              <a:rPr lang="en-US" dirty="0" smtClean="0"/>
-              <a:t>Convergence</a:t>
-            </a:r>
-            <a:endParaRPr lang="en-US" dirty="0"/>
-          </a:p>
-        </p:txBody>
-      </p:sp>
-      <p:sp>
-        <p:nvSpPr>
-          <p:cNvPr id="5" name="Oval 4"/>
-          <p:cNvSpPr/>
-          <p:nvPr/>
-        </p:nvSpPr>
-        <p:spPr>
-          <a:xfrm>
-            <a:off x="2847453" y="1689439"/>
-            <a:ext cx="5839348" cy="4224099"/>
-          </a:xfrm>
-          <a:prstGeom prst="ellipse">
-            <a:avLst/>
-          </a:prstGeom>
-          <a:solidFill>
-            <a:schemeClr val="tx1">
-              <a:lumMod val="75000"/>
-              <a:lumOff val="25000"/>
-              <a:alpha val="28000"/>
-            </a:schemeClr>
-          </a:solidFill>
-        </p:spPr>
-        <p:style>
-          <a:lnRef idx="1">
-            <a:schemeClr val="accent1"/>
-          </a:lnRef>
-          <a:fillRef idx="3">
-            <a:schemeClr val="accent1"/>
-          </a:fillRef>
-          <a:effectRef idx="2">
-            <a:schemeClr val="accent1"/>
-          </a:effectRef>
-          <a:fontRef idx="minor">
-            <a:schemeClr val="lt1"/>
-          </a:fontRef>
-        </p:style>
-        <p:txBody>
-          <a:bodyPr rtlCol="0" anchor="ctr"/>
-          <a:lstStyle/>
-          <a:p>
-            <a:pPr algn="r"/>
-            <a:r>
-              <a:rPr lang="en-US" dirty="0" smtClean="0"/>
-              <a:t>Server-Side</a:t>
-            </a:r>
-          </a:p>
-          <a:p>
-            <a:pPr algn="r"/>
-            <a:r>
-              <a:rPr lang="en-US" dirty="0" smtClean="0"/>
-              <a:t>Performance</a:t>
-            </a:r>
-          </a:p>
-          <a:p>
-            <a:pPr algn="r"/>
-            <a:r>
-              <a:rPr lang="en-US" dirty="0" smtClean="0"/>
-              <a:t>Boosts</a:t>
-            </a:r>
-          </a:p>
-          <a:p>
-            <a:pPr algn="r"/>
-            <a:r>
-              <a:rPr lang="en-US" dirty="0" smtClean="0"/>
-              <a:t>w/</a:t>
-            </a:r>
-            <a:r>
-              <a:rPr lang="en-US" dirty="0" err="1" smtClean="0"/>
-              <a:t>Node.js</a:t>
-            </a:r>
-            <a:r>
-              <a:rPr lang="en-US" dirty="0" smtClean="0"/>
-              <a:t>,</a:t>
-            </a:r>
-          </a:p>
-          <a:p>
-            <a:pPr algn="r"/>
-            <a:r>
-              <a:rPr lang="en-US" dirty="0" err="1" smtClean="0"/>
-              <a:t>Nginx</a:t>
-            </a:r>
-            <a:r>
-              <a:rPr lang="en-US" dirty="0" smtClean="0"/>
-              <a:t>,</a:t>
-            </a:r>
-          </a:p>
-          <a:p>
-            <a:pPr algn="r"/>
-            <a:r>
-              <a:rPr lang="en-US" dirty="0" err="1" smtClean="0"/>
-              <a:t>Misultin</a:t>
-            </a:r>
-            <a:r>
-              <a:rPr lang="en-US" dirty="0" smtClean="0"/>
-              <a:t>,</a:t>
-            </a:r>
-          </a:p>
-          <a:p>
-            <a:pPr algn="r"/>
-            <a:r>
-              <a:rPr lang="en-US" dirty="0" err="1" smtClean="0"/>
-              <a:t>WebMachine</a:t>
+          <p:cNvPr id="3" name="Content Placeholder 2"/>
+          <p:cNvSpPr>
+            <a:spLocks noGrp="1"/>
+          </p:cNvSpPr>
+          <p:nvPr>
+            <p:ph idx="1"/>
+          </p:nvPr>
+        </p:nvSpPr>
+        <p:spPr/>
+        <p:txBody>
+          <a:bodyPr/>
+          <a:lstStyle/>
+          <a:p>
+            <a:pPr>
+              <a:buNone/>
+            </a:pPr>
+            <a:r>
+              <a:rPr lang="en-US" dirty="0" smtClean="0"/>
+              <a:t>We are not taking credit for the wonderful innovations or changes in mindshare amongst the industry at large.</a:t>
+            </a:r>
+          </a:p>
+          <a:p>
+            <a:pPr>
+              <a:buNone/>
+            </a:pPr>
+            <a:r>
+              <a:rPr lang="en-US" dirty="0" smtClean="0"/>
+              <a:t>We are eager participants in what we believe is an opportunity </a:t>
+            </a:r>
+            <a:r>
+              <a:rPr lang="en-US" dirty="0" smtClean="0"/>
+              <a:t>to revolutionize </a:t>
+            </a:r>
+            <a:r>
+              <a:rPr lang="en-US" dirty="0" smtClean="0"/>
+              <a:t>how </a:t>
+            </a:r>
+            <a:r>
+              <a:rPr lang="en-US" dirty="0" smtClean="0"/>
+              <a:t>mainstream application </a:t>
+            </a:r>
+            <a:r>
+              <a:rPr lang="en-US" dirty="0" smtClean="0"/>
+              <a:t>development has traditionally taken place in our experience</a:t>
+            </a:r>
+            <a:r>
+              <a:rPr lang="en-US" dirty="0" smtClean="0"/>
+              <a:t>.</a:t>
             </a:r>
             <a:endParaRPr lang="en-US" dirty="0" smtClean="0"/>
           </a:p>
-          <a:p>
-            <a:pPr algn="r"/>
-            <a:endParaRPr lang="en-US" dirty="0" smtClean="0"/>
-          </a:p>
-          <a:p>
-            <a:pPr algn="r"/>
-            <a:r>
-              <a:rPr lang="en-US" dirty="0" err="1" smtClean="0"/>
-              <a:t>RESTful</a:t>
-            </a:r>
-            <a:r>
-              <a:rPr lang="en-US" dirty="0" smtClean="0"/>
-              <a:t> APIs</a:t>
-            </a:r>
-            <a:endParaRPr lang="en-US" dirty="0"/>
-          </a:p>
-        </p:txBody>
-      </p:sp>
-      <p:sp>
-        <p:nvSpPr>
-          <p:cNvPr id="7" name="Oval 6"/>
-          <p:cNvSpPr/>
-          <p:nvPr/>
-        </p:nvSpPr>
-        <p:spPr>
-          <a:xfrm>
-            <a:off x="457200" y="1689439"/>
-            <a:ext cx="5658349" cy="4224099"/>
-          </a:xfrm>
-          <a:prstGeom prst="ellipse">
-            <a:avLst/>
-          </a:prstGeom>
-          <a:gradFill flip="none" rotWithShape="1">
-            <a:gsLst>
-              <a:gs pos="0">
-                <a:schemeClr val="accent1">
-                  <a:tint val="100000"/>
-                  <a:shade val="100000"/>
-                  <a:satMod val="130000"/>
-                  <a:alpha val="39000"/>
-                </a:schemeClr>
-              </a:gs>
-              <a:gs pos="100000">
-                <a:schemeClr val="accent1">
-                  <a:tint val="50000"/>
-                  <a:shade val="100000"/>
-                  <a:satMod val="350000"/>
-                  <a:alpha val="39000"/>
-                </a:schemeClr>
-              </a:gs>
-            </a:gsLst>
-            <a:lin ang="16200000" scaled="0"/>
-            <a:tileRect/>
-          </a:gradFill>
-        </p:spPr>
-        <p:style>
-          <a:lnRef idx="1">
-            <a:schemeClr val="accent1"/>
-          </a:lnRef>
-          <a:fillRef idx="3">
-            <a:schemeClr val="accent1"/>
-          </a:fillRef>
-          <a:effectRef idx="2">
-            <a:schemeClr val="accent1"/>
-          </a:effectRef>
-          <a:fontRef idx="minor">
-            <a:schemeClr val="lt1"/>
-          </a:fontRef>
-        </p:style>
-        <p:txBody>
-          <a:bodyPr rtlCol="0" anchor="ctr"/>
-          <a:lstStyle/>
-          <a:p>
-            <a:r>
-              <a:rPr lang="en-US" dirty="0" smtClean="0"/>
-              <a:t>JavaScript</a:t>
-            </a:r>
-          </a:p>
-          <a:p>
-            <a:r>
-              <a:rPr lang="en-US" dirty="0" smtClean="0"/>
-              <a:t>run-time</a:t>
-            </a:r>
-          </a:p>
-          <a:p>
-            <a:r>
-              <a:rPr lang="en-US" dirty="0" smtClean="0"/>
-              <a:t>Improvements,</a:t>
-            </a:r>
-          </a:p>
-          <a:p>
-            <a:endParaRPr lang="en-US" dirty="0" smtClean="0"/>
-          </a:p>
-          <a:p>
-            <a:r>
-              <a:rPr lang="en-US" dirty="0" smtClean="0"/>
-              <a:t>Language</a:t>
-            </a:r>
-          </a:p>
-          <a:p>
-            <a:r>
-              <a:rPr lang="en-US" dirty="0" smtClean="0"/>
-              <a:t>Growth</a:t>
-            </a:r>
-          </a:p>
-          <a:p>
-            <a:r>
-              <a:rPr lang="en-US" dirty="0" smtClean="0"/>
-              <a:t>(ES5)</a:t>
-            </a:r>
-          </a:p>
-          <a:p>
-            <a:endParaRPr lang="en-US" dirty="0" smtClean="0"/>
-          </a:p>
-          <a:p>
-            <a:r>
-              <a:rPr lang="en-US" dirty="0" err="1" smtClean="0"/>
-              <a:t>CoffeeScript</a:t>
-            </a:r>
-            <a:endParaRPr lang="en-US" dirty="0"/>
-          </a:p>
-        </p:txBody>
-      </p:sp>
-      <p:sp>
-        <p:nvSpPr>
-          <p:cNvPr id="8" name="Oval 7"/>
-          <p:cNvSpPr/>
-          <p:nvPr/>
-        </p:nvSpPr>
-        <p:spPr>
-          <a:xfrm>
-            <a:off x="2483431" y="2111400"/>
-            <a:ext cx="1953578" cy="1407598"/>
-          </a:xfrm>
-          <a:prstGeom prst="ellipse">
-            <a:avLst/>
-          </a:prstGeom>
-          <a:solidFill>
-            <a:schemeClr val="accent3">
-              <a:lumMod val="60000"/>
-              <a:lumOff val="40000"/>
-              <a:alpha val="46000"/>
-            </a:schemeClr>
-          </a:solidFill>
-        </p:spPr>
-        <p:style>
-          <a:lnRef idx="1">
-            <a:schemeClr val="accent1"/>
-          </a:lnRef>
-          <a:fillRef idx="3">
-            <a:schemeClr val="accent1"/>
-          </a:fillRef>
-          <a:effectRef idx="2">
-            <a:schemeClr val="accent1"/>
-          </a:effectRef>
-          <a:fontRef idx="minor">
-            <a:schemeClr val="lt1"/>
-          </a:fontRef>
-        </p:style>
-        <p:txBody>
-          <a:bodyPr rtlCol="0" anchor="ctr"/>
-          <a:lstStyle/>
-          <a:p>
-            <a:pPr algn="ctr"/>
-            <a:r>
-              <a:rPr lang="en-US" dirty="0" smtClean="0"/>
-              <a:t>HTML5 Features</a:t>
-            </a:r>
-            <a:endParaRPr lang="en-US" dirty="0"/>
-          </a:p>
-        </p:txBody>
-      </p:sp>
-      <p:sp>
-        <p:nvSpPr>
-          <p:cNvPr id="9" name="Oval 8"/>
-          <p:cNvSpPr/>
-          <p:nvPr/>
-        </p:nvSpPr>
-        <p:spPr>
-          <a:xfrm>
-            <a:off x="2750379" y="4522100"/>
-            <a:ext cx="2176038" cy="1310537"/>
-          </a:xfrm>
-          <a:prstGeom prst="ellipse">
-            <a:avLst/>
-          </a:prstGeom>
-          <a:solidFill>
-            <a:schemeClr val="accent6">
-              <a:lumMod val="75000"/>
-              <a:alpha val="46000"/>
-            </a:schemeClr>
-          </a:solidFill>
-        </p:spPr>
-        <p:style>
-          <a:lnRef idx="1">
-            <a:schemeClr val="accent1"/>
-          </a:lnRef>
-          <a:fillRef idx="3">
-            <a:schemeClr val="accent1"/>
-          </a:fillRef>
-          <a:effectRef idx="2">
-            <a:schemeClr val="accent1"/>
-          </a:effectRef>
-          <a:fontRef idx="minor">
-            <a:schemeClr val="lt1"/>
-          </a:fontRef>
-        </p:style>
-        <p:txBody>
-          <a:bodyPr rtlCol="0" anchor="ctr"/>
-          <a:lstStyle/>
-          <a:p>
-            <a:pPr algn="ctr"/>
-            <a:r>
-              <a:rPr lang="en-US" dirty="0" smtClean="0"/>
-              <a:t>Local Storage</a:t>
-            </a:r>
-            <a:endParaRPr lang="en-US" dirty="0"/>
-          </a:p>
-        </p:txBody>
-      </p:sp>
-      <p:sp>
-        <p:nvSpPr>
-          <p:cNvPr id="11" name="Oval 10"/>
-          <p:cNvSpPr/>
-          <p:nvPr/>
-        </p:nvSpPr>
-        <p:spPr>
-          <a:xfrm>
-            <a:off x="2483431" y="3260128"/>
-            <a:ext cx="2843409" cy="1682647"/>
-          </a:xfrm>
-          <a:prstGeom prst="ellipse">
-            <a:avLst/>
-          </a:prstGeom>
-          <a:solidFill>
-            <a:schemeClr val="tx2">
-              <a:alpha val="46000"/>
-            </a:schemeClr>
-          </a:solidFill>
-        </p:spPr>
-        <p:style>
-          <a:lnRef idx="1">
-            <a:schemeClr val="accent1"/>
-          </a:lnRef>
-          <a:fillRef idx="3">
-            <a:schemeClr val="accent1"/>
-          </a:fillRef>
-          <a:effectRef idx="2">
-            <a:schemeClr val="accent1"/>
-          </a:effectRef>
-          <a:fontRef idx="minor">
-            <a:schemeClr val="lt1"/>
-          </a:fontRef>
-        </p:style>
-        <p:txBody>
-          <a:bodyPr rtlCol="0" anchor="ctr"/>
-          <a:lstStyle/>
-          <a:p>
-            <a:r>
-              <a:rPr lang="en-US" dirty="0" smtClean="0"/>
-              <a:t>jQuery</a:t>
-            </a:r>
-          </a:p>
-          <a:p>
-            <a:r>
-              <a:rPr lang="en-US" dirty="0" smtClean="0"/>
-              <a:t>Script Loaders</a:t>
-            </a:r>
-          </a:p>
-          <a:p>
-            <a:r>
-              <a:rPr lang="en-US" dirty="0" smtClean="0"/>
-              <a:t>Template Engines</a:t>
-            </a:r>
-          </a:p>
-        </p:txBody>
-      </p:sp>
-      <p:sp>
-        <p:nvSpPr>
-          <p:cNvPr id="12" name="Oval 11"/>
-          <p:cNvSpPr/>
-          <p:nvPr/>
-        </p:nvSpPr>
-        <p:spPr>
-          <a:xfrm>
-            <a:off x="3971874" y="2046672"/>
-            <a:ext cx="1925263" cy="3195411"/>
-          </a:xfrm>
-          <a:prstGeom prst="ellipse">
-            <a:avLst/>
-          </a:prstGeom>
-          <a:solidFill>
-            <a:schemeClr val="accent3">
-              <a:lumMod val="50000"/>
-              <a:alpha val="46000"/>
-            </a:schemeClr>
-          </a:solidFill>
-        </p:spPr>
-        <p:style>
-          <a:lnRef idx="1">
-            <a:schemeClr val="accent1"/>
-          </a:lnRef>
-          <a:fillRef idx="3">
-            <a:schemeClr val="accent1"/>
-          </a:fillRef>
-          <a:effectRef idx="2">
-            <a:schemeClr val="accent1"/>
-          </a:effectRef>
-          <a:fontRef idx="minor">
-            <a:schemeClr val="lt1"/>
-          </a:fontRef>
-        </p:style>
-        <p:txBody>
-          <a:bodyPr rtlCol="0" anchor="ctr"/>
-          <a:lstStyle/>
-          <a:p>
-            <a:pPr algn="ctr"/>
-            <a:r>
-              <a:rPr lang="en-US" dirty="0" smtClean="0"/>
-              <a:t>Client-side</a:t>
-            </a:r>
-          </a:p>
-          <a:p>
-            <a:pPr algn="ctr"/>
-            <a:r>
-              <a:rPr lang="en-US" dirty="0" smtClean="0"/>
-              <a:t>Application</a:t>
-            </a:r>
-          </a:p>
-          <a:p>
-            <a:pPr algn="ctr"/>
-            <a:r>
-              <a:rPr lang="en-US" dirty="0" smtClean="0"/>
-              <a:t>Frameworks</a:t>
-            </a:r>
-          </a:p>
-        </p:txBody>
-      </p:sp>
-      <p:sp>
-        <p:nvSpPr>
-          <p:cNvPr id="13" name="TextBox 12"/>
-          <p:cNvSpPr txBox="1"/>
-          <p:nvPr/>
-        </p:nvSpPr>
-        <p:spPr>
-          <a:xfrm>
-            <a:off x="457199" y="6220940"/>
-            <a:ext cx="8229601" cy="369332"/>
-          </a:xfrm>
-          <a:prstGeom prst="rect">
-            <a:avLst/>
-          </a:prstGeom>
-          <a:noFill/>
-        </p:spPr>
-        <p:txBody>
-          <a:bodyPr wrap="square" rtlCol="0">
-            <a:spAutoFit/>
-          </a:bodyPr>
-          <a:lstStyle/>
-          <a:p>
-            <a:pPr algn="ctr"/>
-            <a:r>
-              <a:rPr lang="en-US" dirty="0" smtClean="0"/>
-              <a:t>This is barely scratching the surface.  The last 5 years have been transformational!</a:t>
-            </a:r>
-            <a:endParaRPr lang="en-US" dirty="0"/>
-          </a:p>
         </p:txBody>
       </p:sp>
     </p:spTree>
-    <p:extLst>
-      <p:ext uri="{BB962C8B-B14F-4D97-AF65-F5344CB8AC3E}">
-        <p14:creationId xmlns:p14="http://schemas.microsoft.com/office/powerpoint/2010/main" val="432204872"/>
-      </p:ext>
-    </p:extLst>
   </p:cSld>
   <p:clrMapOvr>
     <a:masterClrMapping/>
   </p:clrMapOvr>
-  <p:timing>
-    <p:tnLst>
-      <p:par>
-        <p:cTn xmlns:p14="http://schemas.microsoft.com/office/powerpoint/2010/main" id="1" dur="indefinite" restart="never" nodeType="tmRoot"/>
-      </p:par>
-    </p:tnLst>
-  </p:timing>
 </p:sld>
 </file>
 
@@ -5603,7 +5390,7 @@
       </p:grpSpPr>
       <p:sp>
         <p:nvSpPr>
-          <p:cNvPr id="2" name="Title 1"/>
+          <p:cNvPr id="5" name="Title 4"/>
           <p:cNvSpPr>
             <a:spLocks noGrp="1"/>
           </p:cNvSpPr>
@@ -5613,148 +5400,80 @@
         </p:nvSpPr>
         <p:spPr/>
         <p:txBody>
+          <a:bodyPr>
+            <a:normAutofit fontScale="90000"/>
+          </a:bodyPr>
+          <a:lstStyle/>
+          <a:p>
+            <a:r>
+              <a:rPr lang="en-US" dirty="0" smtClean="0"/>
+              <a:t>And Now For Something Completely Different…</a:t>
+            </a:r>
+            <a:endParaRPr lang="en-US" dirty="0"/>
+          </a:p>
+        </p:txBody>
+      </p:sp>
+      <p:sp>
+        <p:nvSpPr>
+          <p:cNvPr id="6" name="Content Placeholder 5"/>
+          <p:cNvSpPr>
+            <a:spLocks noGrp="1"/>
+          </p:cNvSpPr>
+          <p:nvPr>
+            <p:ph idx="1"/>
+          </p:nvPr>
+        </p:nvSpPr>
+        <p:spPr/>
+        <p:txBody>
           <a:bodyPr/>
           <a:lstStyle/>
           <a:p>
             <a:r>
               <a:rPr lang="en-US" dirty="0" smtClean="0"/>
-              <a:t>Recent Runtime Improvements</a:t>
-            </a:r>
-            <a:endParaRPr lang="en-US" dirty="0"/>
-          </a:p>
-        </p:txBody>
-      </p:sp>
-      <p:sp>
-        <p:nvSpPr>
-          <p:cNvPr id="3" name="Content Placeholder 2"/>
-          <p:cNvSpPr>
-            <a:spLocks noGrp="1"/>
-          </p:cNvSpPr>
-          <p:nvPr>
-            <p:ph idx="1"/>
-          </p:nvPr>
-        </p:nvSpPr>
-        <p:spPr/>
-        <p:txBody>
-          <a:bodyPr>
-            <a:normAutofit/>
-          </a:bodyPr>
-          <a:lstStyle/>
-          <a:p>
-            <a:r>
-              <a:rPr lang="en-US" dirty="0" smtClean="0"/>
-              <a:t>V8</a:t>
+              <a:t>Taking stock of recent developments</a:t>
             </a:r>
           </a:p>
           <a:p>
             <a:pPr lvl="1"/>
             <a:r>
-              <a:rPr lang="en-US" sz="2400" dirty="0" smtClean="0"/>
-              <a:t>2010 Crankshaft released, 50% performance increase</a:t>
-            </a:r>
+              <a:rPr lang="en-US" dirty="0" smtClean="0"/>
+              <a:t>New innovation</a:t>
+            </a:r>
+          </a:p>
+          <a:p>
+            <a:pPr lvl="1"/>
+            <a:r>
+              <a:rPr lang="en-US" dirty="0" smtClean="0"/>
+              <a:t>Shift in direction</a:t>
+            </a:r>
+          </a:p>
+          <a:p>
+            <a:pPr lvl="1"/>
+            <a:r>
+              <a:rPr lang="en-US" dirty="0" smtClean="0"/>
+              <a:t>Community evolution</a:t>
+            </a:r>
+          </a:p>
+          <a:p>
+            <a:r>
+              <a:rPr lang="en-US" dirty="0" smtClean="0"/>
+              <a:t>And applying them in wonderful ways</a:t>
+            </a:r>
+          </a:p>
+          <a:p>
+            <a:pPr lvl="1"/>
             <a:endParaRPr lang="en-US" dirty="0" smtClean="0"/>
           </a:p>
           <a:p>
-            <a:r>
-              <a:rPr lang="en-US" dirty="0" err="1" smtClean="0"/>
-              <a:t>SpiderMonkey</a:t>
-            </a:r>
             <a:endParaRPr lang="en-US" dirty="0" smtClean="0"/>
           </a:p>
-          <a:p>
-            <a:pPr lvl="1"/>
-            <a:r>
-              <a:rPr lang="en-US" sz="2400" dirty="0" smtClean="0"/>
-              <a:t>2009, method-based JIT &amp; tracing JIT</a:t>
-            </a:r>
-          </a:p>
-          <a:p>
-            <a:pPr lvl="1"/>
-            <a:r>
-              <a:rPr lang="en-US" sz="2400" dirty="0" smtClean="0"/>
-              <a:t>Used in projects like </a:t>
-            </a:r>
-            <a:r>
-              <a:rPr lang="en-US" sz="2400" dirty="0" err="1" smtClean="0"/>
-              <a:t>Riak</a:t>
-            </a:r>
-            <a:r>
-              <a:rPr lang="en-US" sz="2400" dirty="0" smtClean="0"/>
-              <a:t>, </a:t>
-            </a:r>
-            <a:r>
-              <a:rPr lang="en-US" sz="2400" dirty="0" err="1" smtClean="0"/>
-              <a:t>MongoDB</a:t>
-            </a:r>
-            <a:r>
-              <a:rPr lang="en-US" sz="2400" dirty="0" smtClean="0"/>
-              <a:t>, </a:t>
-            </a:r>
-            <a:r>
-              <a:rPr lang="en-US" sz="2400" dirty="0" err="1" smtClean="0"/>
-              <a:t>CouchDB</a:t>
-            </a:r>
-            <a:endParaRPr lang="en-US" sz="2400" dirty="0" smtClean="0"/>
-          </a:p>
-          <a:p>
-            <a:r>
-              <a:rPr lang="en-US" dirty="0" smtClean="0"/>
-              <a:t>Chakra (IE9)</a:t>
-            </a:r>
-          </a:p>
-          <a:p>
-            <a:pPr lvl="1"/>
-            <a:r>
-              <a:rPr lang="en-US" sz="2400" dirty="0" smtClean="0"/>
-              <a:t>Uses separate CPU core to JIT</a:t>
-            </a:r>
-          </a:p>
-          <a:p>
-            <a:pPr lvl="1"/>
-            <a:r>
-              <a:rPr lang="en-US" sz="2400" i="1" dirty="0" smtClean="0"/>
-              <a:t>Claimed</a:t>
-            </a:r>
-            <a:r>
-              <a:rPr lang="en-US" sz="2400" dirty="0" smtClean="0"/>
-              <a:t> to be faster than Chrome, Firefox, Safari &amp; Opera</a:t>
-            </a:r>
-          </a:p>
-          <a:p>
-            <a:pPr lvl="1"/>
-            <a:r>
-              <a:rPr lang="en-US" sz="2400" dirty="0" smtClean="0"/>
-              <a:t>It’s at least evenly matched (according to ZDNet) – </a:t>
-            </a:r>
-            <a:r>
-              <a:rPr lang="en-US" sz="2400" i="1" dirty="0" smtClean="0"/>
-              <a:t>finally</a:t>
-            </a:r>
-            <a:r>
-              <a:rPr lang="en-US" sz="2400" dirty="0" smtClean="0"/>
-              <a:t>.</a:t>
-            </a:r>
-            <a:endParaRPr lang="en-US" sz="2400" dirty="0"/>
-          </a:p>
         </p:txBody>
       </p:sp>
     </p:spTree>
-    <p:extLst>
-      <p:ext uri="{BB962C8B-B14F-4D97-AF65-F5344CB8AC3E}">
-        <p14:creationId xmlns:p14="http://schemas.microsoft.com/office/powerpoint/2010/main" val="451477600"/>
-      </p:ext>
-    </p:extLst>
   </p:cSld>
   <p:clrMapOvr>
     <a:masterClrMapping/>
   </p:clrMapOvr>
-  <p:timing>
-    <p:tnLst>
-      <p:par>
-        <p:cTn xmlns:p14="http://schemas.microsoft.com/office/powerpoint/2010/main" id="1" dur="indefinite" restart="never" nodeType="tmRoot"/>
-      </p:par>
-    </p:tnLst>
-  </p:timing>
 </p:sld>
 </file>
 
@@ -5777,6 +5496,120 @@
       </p:grpSpPr>
       <p:sp>
         <p:nvSpPr>
+          <p:cNvPr id="18" name="Right Arrow 17"/>
+          <p:cNvSpPr/>
+          <p:nvPr/>
+        </p:nvSpPr>
+        <p:spPr>
+          <a:xfrm flipH="1">
+            <a:off x="5401658" y="1549687"/>
+            <a:ext cx="3413720" cy="4024923"/>
+          </a:xfrm>
+          <a:prstGeom prst="rightArrow">
+            <a:avLst>
+              <a:gd name="adj1" fmla="val 100000"/>
+              <a:gd name="adj2" fmla="val 19838"/>
+            </a:avLst>
+          </a:prstGeom>
+        </p:spPr>
+        <p:style>
+          <a:lnRef idx="2">
+            <a:schemeClr val="dk1"/>
+          </a:lnRef>
+          <a:fillRef idx="1">
+            <a:schemeClr val="lt1"/>
+          </a:fillRef>
+          <a:effectRef idx="0">
+            <a:schemeClr val="dk1"/>
+          </a:effectRef>
+          <a:fontRef idx="minor">
+            <a:schemeClr val="dk1"/>
+          </a:fontRef>
+        </p:style>
+        <p:txBody>
+          <a:bodyPr rtlCol="0" anchor="t"/>
+          <a:lstStyle/>
+          <a:p>
+            <a:pPr algn="ctr"/>
+            <a:r>
+              <a:rPr lang="en-US" sz="2400" dirty="0" smtClean="0">
+                <a:solidFill>
+                  <a:schemeClr val="bg1">
+                    <a:lumMod val="65000"/>
+                  </a:schemeClr>
+                </a:solidFill>
+              </a:rPr>
+              <a:t>Server-Side</a:t>
+            </a:r>
+            <a:endParaRPr lang="en-US" dirty="0">
+              <a:solidFill>
+                <a:schemeClr val="bg1">
+                  <a:lumMod val="65000"/>
+                </a:schemeClr>
+              </a:solidFill>
+            </a:endParaRPr>
+          </a:p>
+        </p:txBody>
+      </p:sp>
+      <p:sp>
+        <p:nvSpPr>
+          <p:cNvPr id="17" name="Right Arrow 16"/>
+          <p:cNvSpPr/>
+          <p:nvPr/>
+        </p:nvSpPr>
+        <p:spPr>
+          <a:xfrm>
+            <a:off x="326779" y="1561178"/>
+            <a:ext cx="3368431" cy="4024923"/>
+          </a:xfrm>
+          <a:prstGeom prst="rightArrow">
+            <a:avLst>
+              <a:gd name="adj1" fmla="val 100000"/>
+              <a:gd name="adj2" fmla="val 19838"/>
+            </a:avLst>
+          </a:prstGeom>
+        </p:spPr>
+        <p:style>
+          <a:lnRef idx="2">
+            <a:schemeClr val="dk1"/>
+          </a:lnRef>
+          <a:fillRef idx="1">
+            <a:schemeClr val="lt1"/>
+          </a:fillRef>
+          <a:effectRef idx="0">
+            <a:schemeClr val="dk1"/>
+          </a:effectRef>
+          <a:fontRef idx="minor">
+            <a:schemeClr val="dk1"/>
+          </a:fontRef>
+        </p:style>
+        <p:txBody>
+          <a:bodyPr rtlCol="0" anchor="t"/>
+          <a:lstStyle/>
+          <a:p>
+            <a:pPr algn="ctr"/>
+            <a:r>
+              <a:rPr lang="en-US" sz="2400" dirty="0" smtClean="0">
+                <a:solidFill>
+                  <a:schemeClr val="bg1">
+                    <a:lumMod val="65000"/>
+                  </a:schemeClr>
+                </a:solidFill>
+              </a:rPr>
+              <a:t>Client-Side</a:t>
+            </a:r>
+            <a:endParaRPr lang="en-US" dirty="0">
+              <a:solidFill>
+                <a:schemeClr val="bg1">
+                  <a:lumMod val="65000"/>
+                </a:schemeClr>
+              </a:solidFill>
+            </a:endParaRPr>
+          </a:p>
+        </p:txBody>
+      </p:sp>
+      <p:sp>
+        <p:nvSpPr>
           <p:cNvPr id="2" name="Title 1"/>
           <p:cNvSpPr>
             <a:spLocks noGrp="1"/>
@@ -5792,7 +5625,7 @@
           <a:p>
             <a:r>
               <a:rPr lang="en-US" dirty="0" smtClean="0"/>
-              <a:t>Richer Environment</a:t>
+              <a:t>Convergence of Innovation</a:t>
             </a:r>
             <a:endParaRPr lang="en-US" dirty="0"/>
           </a:p>
@@ -5800,115 +5633,639 @@
       </p:sp>
       <p:sp>
         <p:nvSpPr>
-          <p:cNvPr id="3" name="Content Placeholder 2"/>
-          <p:cNvSpPr>
-            <a:spLocks noGrp="1"/>
-          </p:cNvSpPr>
-          <p:nvPr>
-            <p:ph idx="1"/>
-          </p:nvPr>
-        </p:nvSpPr>
-        <p:spPr/>
-        <p:txBody>
-          <a:bodyPr>
-            <a:normAutofit fontScale="92500" lnSpcReduction="20000"/>
+          <p:cNvPr id="4" name="Rectangle 3"/>
+          <p:cNvSpPr/>
+          <p:nvPr/>
+        </p:nvSpPr>
+        <p:spPr>
+          <a:xfrm>
+            <a:off x="3767016" y="1561178"/>
+            <a:ext cx="1563076" cy="4024923"/>
+          </a:xfrm>
+          <a:prstGeom prst="rect">
+            <a:avLst/>
+          </a:prstGeom>
+        </p:spPr>
+        <p:style>
+          <a:lnRef idx="2">
+            <a:schemeClr val="dk1"/>
+          </a:lnRef>
+          <a:fillRef idx="1">
+            <a:schemeClr val="lt1"/>
+          </a:fillRef>
+          <a:effectRef idx="0">
+            <a:schemeClr val="dk1"/>
+          </a:effectRef>
+          <a:fontRef idx="minor">
+            <a:schemeClr val="dk1"/>
+          </a:fontRef>
+        </p:style>
+        <p:txBody>
+          <a:bodyPr rtlCol="0" anchor="ctr"/>
+          <a:lstStyle/>
+          <a:p>
+            <a:pPr algn="ctr"/>
+            <a:r>
+              <a:rPr lang="en-US" dirty="0" smtClean="0"/>
+              <a:t>Client-side</a:t>
+            </a:r>
+          </a:p>
+          <a:p>
+            <a:pPr algn="ctr"/>
+            <a:r>
+              <a:rPr lang="en-US" dirty="0" smtClean="0"/>
+              <a:t>Application</a:t>
+            </a:r>
+          </a:p>
+          <a:p>
+            <a:pPr algn="ctr"/>
+            <a:r>
+              <a:rPr lang="en-US" dirty="0" smtClean="0"/>
+              <a:t>Stacks</a:t>
+            </a:r>
+            <a:endParaRPr lang="en-US" dirty="0"/>
+          </a:p>
+        </p:txBody>
+      </p:sp>
+      <p:sp>
+        <p:nvSpPr>
+          <p:cNvPr id="6" name="TextBox 5"/>
+          <p:cNvSpPr txBox="1"/>
+          <p:nvPr/>
+        </p:nvSpPr>
+        <p:spPr>
+          <a:xfrm>
+            <a:off x="2010995" y="5057655"/>
+            <a:ext cx="906017" cy="369332"/>
+          </a:xfrm>
+          <a:prstGeom prst="rect">
+            <a:avLst/>
+          </a:prstGeom>
+          <a:noFill/>
+        </p:spPr>
+        <p:txBody>
+          <a:bodyPr wrap="none" rtlCol="0">
+            <a:spAutoFit/>
           </a:bodyPr>
           <a:lstStyle/>
           <a:p>
             <a:r>
               <a:rPr lang="en-US" dirty="0" smtClean="0"/>
-              <a:t>IDEs</a:t>
-            </a:r>
-          </a:p>
-          <a:p>
-            <a:pPr lvl="1"/>
+              <a:t>HTML 5</a:t>
+            </a:r>
+            <a:endParaRPr lang="en-US" dirty="0"/>
+          </a:p>
+        </p:txBody>
+      </p:sp>
+      <p:sp>
+        <p:nvSpPr>
+          <p:cNvPr id="7" name="TextBox 6"/>
+          <p:cNvSpPr txBox="1"/>
+          <p:nvPr/>
+        </p:nvSpPr>
+        <p:spPr>
+          <a:xfrm>
+            <a:off x="604469" y="3184866"/>
+            <a:ext cx="2309094" cy="369332"/>
+          </a:xfrm>
+          <a:prstGeom prst="rect">
+            <a:avLst/>
+          </a:prstGeom>
+          <a:noFill/>
+        </p:spPr>
+        <p:txBody>
+          <a:bodyPr wrap="none" rtlCol="0">
+            <a:spAutoFit/>
+          </a:bodyPr>
+          <a:lstStyle/>
+          <a:p>
+            <a:r>
+              <a:rPr lang="en-US" i="1" dirty="0" smtClean="0"/>
+              <a:t>Fast </a:t>
+            </a:r>
             <a:r>
               <a:rPr lang="en-US" dirty="0" err="1" smtClean="0"/>
-              <a:t>JsFiddle</a:t>
-            </a:r>
-            <a:endParaRPr lang="en-US" dirty="0" smtClean="0"/>
-          </a:p>
-          <a:p>
-            <a:pPr lvl="1"/>
+              <a:t>Javascript</a:t>
+            </a:r>
+            <a:r>
+              <a:rPr lang="en-US" dirty="0" smtClean="0"/>
+              <a:t> Engines</a:t>
+            </a:r>
+            <a:endParaRPr lang="en-US" i="1" dirty="0"/>
+          </a:p>
+        </p:txBody>
+      </p:sp>
+      <p:sp>
+        <p:nvSpPr>
+          <p:cNvPr id="8" name="TextBox 7"/>
+          <p:cNvSpPr txBox="1"/>
+          <p:nvPr/>
+        </p:nvSpPr>
+        <p:spPr>
+          <a:xfrm>
+            <a:off x="2092711" y="2076870"/>
+            <a:ext cx="817403" cy="369332"/>
+          </a:xfrm>
+          <a:prstGeom prst="rect">
+            <a:avLst/>
+          </a:prstGeom>
+          <a:noFill/>
+        </p:spPr>
+        <p:txBody>
+          <a:bodyPr wrap="none" rtlCol="0">
+            <a:spAutoFit/>
+          </a:bodyPr>
+          <a:lstStyle/>
+          <a:p>
             <a:r>
               <a:rPr lang="en-US" dirty="0" err="1" smtClean="0"/>
-              <a:t>WebStorm</a:t>
-            </a:r>
-            <a:r>
-              <a:rPr lang="en-US" dirty="0" smtClean="0"/>
-              <a:t> / </a:t>
-            </a:r>
-            <a:r>
-              <a:rPr lang="en-US" dirty="0" err="1" smtClean="0"/>
-              <a:t>RubyMine</a:t>
-            </a:r>
-            <a:endParaRPr lang="en-US" dirty="0" smtClean="0"/>
-          </a:p>
-          <a:p>
-            <a:r>
-              <a:rPr lang="en-US" dirty="0" smtClean="0"/>
-              <a:t>Cross-compiling / Transcoders</a:t>
-            </a:r>
-          </a:p>
-          <a:p>
-            <a:pPr lvl="1"/>
+              <a:t>jQuery</a:t>
+            </a:r>
+            <a:endParaRPr lang="en-US" dirty="0"/>
+          </a:p>
+        </p:txBody>
+      </p:sp>
+      <p:sp>
+        <p:nvSpPr>
+          <p:cNvPr id="9" name="TextBox 8"/>
+          <p:cNvSpPr txBox="1"/>
+          <p:nvPr/>
+        </p:nvSpPr>
+        <p:spPr>
+          <a:xfrm>
+            <a:off x="457200" y="3554198"/>
+            <a:ext cx="2469266" cy="369332"/>
+          </a:xfrm>
+          <a:prstGeom prst="rect">
+            <a:avLst/>
+          </a:prstGeom>
+          <a:noFill/>
+        </p:spPr>
+        <p:txBody>
+          <a:bodyPr wrap="none" rtlCol="0">
+            <a:spAutoFit/>
+          </a:bodyPr>
+          <a:lstStyle/>
+          <a:p>
+            <a:r>
+              <a:rPr lang="en-US" dirty="0" smtClean="0"/>
+              <a:t>Evolving Standards (ES5)</a:t>
+            </a:r>
+            <a:endParaRPr lang="en-US" dirty="0"/>
+          </a:p>
+        </p:txBody>
+      </p:sp>
+      <p:sp>
+        <p:nvSpPr>
+          <p:cNvPr id="10" name="TextBox 9"/>
+          <p:cNvSpPr txBox="1"/>
+          <p:nvPr/>
+        </p:nvSpPr>
+        <p:spPr>
+          <a:xfrm>
+            <a:off x="1588828" y="4688323"/>
+            <a:ext cx="1328184" cy="369332"/>
+          </a:xfrm>
+          <a:prstGeom prst="rect">
+            <a:avLst/>
+          </a:prstGeom>
+          <a:noFill/>
+        </p:spPr>
+        <p:txBody>
+          <a:bodyPr wrap="none" rtlCol="0">
+            <a:spAutoFit/>
+          </a:bodyPr>
+          <a:lstStyle/>
+          <a:p>
             <a:r>
               <a:rPr lang="en-US" dirty="0" err="1" smtClean="0"/>
               <a:t>CoffeeScript</a:t>
             </a:r>
-            <a:endParaRPr lang="en-US" dirty="0" smtClean="0"/>
-          </a:p>
-          <a:p>
-            <a:pPr lvl="1"/>
-            <a:r>
-              <a:rPr lang="en-US" dirty="0" smtClean="0"/>
-              <a:t>Script# (</a:t>
-            </a:r>
+            <a:endParaRPr lang="en-US" dirty="0"/>
+          </a:p>
+        </p:txBody>
+      </p:sp>
+      <p:sp>
+        <p:nvSpPr>
+          <p:cNvPr id="11" name="TextBox 10"/>
+          <p:cNvSpPr txBox="1"/>
+          <p:nvPr/>
+        </p:nvSpPr>
+        <p:spPr>
+          <a:xfrm>
+            <a:off x="1690100" y="2446202"/>
+            <a:ext cx="1220014" cy="369332"/>
+          </a:xfrm>
+          <a:prstGeom prst="rect">
+            <a:avLst/>
+          </a:prstGeom>
+          <a:noFill/>
+        </p:spPr>
+        <p:txBody>
+          <a:bodyPr wrap="none" rtlCol="0">
+            <a:spAutoFit/>
+          </a:bodyPr>
+          <a:lstStyle/>
+          <a:p>
             <a:r>
               <a:rPr lang="en-US" dirty="0" err="1" smtClean="0"/>
-              <a:t>lulz</a:t>
-            </a:r>
-            <a:r>
-              <a:rPr lang="en-US" dirty="0" smtClean="0"/>
-              <a:t>)</a:t>
-            </a:r>
-          </a:p>
-          <a:p>
-            <a:r>
-              <a:rPr lang="en-US" dirty="0" smtClean="0"/>
-              <a:t>Unit test frameworks</a:t>
-            </a:r>
-          </a:p>
-          <a:p>
-            <a:pPr lvl="1"/>
+              <a:t>Templating</a:t>
+            </a:r>
+            <a:endParaRPr lang="en-US" dirty="0"/>
+          </a:p>
+        </p:txBody>
+      </p:sp>
+      <p:sp>
+        <p:nvSpPr>
+          <p:cNvPr id="12" name="TextBox 11"/>
+          <p:cNvSpPr txBox="1"/>
+          <p:nvPr/>
+        </p:nvSpPr>
+        <p:spPr>
+          <a:xfrm>
+            <a:off x="1404766" y="2815534"/>
+            <a:ext cx="1505348" cy="369332"/>
+          </a:xfrm>
+          <a:prstGeom prst="rect">
+            <a:avLst/>
+          </a:prstGeom>
+          <a:noFill/>
+        </p:spPr>
+        <p:txBody>
+          <a:bodyPr wrap="none" rtlCol="0">
+            <a:spAutoFit/>
+          </a:bodyPr>
+          <a:lstStyle/>
+          <a:p>
+            <a:r>
+              <a:rPr lang="en-US" dirty="0" smtClean="0"/>
+              <a:t>Script Loaders</a:t>
+            </a:r>
+            <a:endParaRPr lang="en-US" dirty="0"/>
+          </a:p>
+        </p:txBody>
+      </p:sp>
+      <p:sp>
+        <p:nvSpPr>
+          <p:cNvPr id="13" name="TextBox 12"/>
+          <p:cNvSpPr txBox="1"/>
+          <p:nvPr/>
+        </p:nvSpPr>
+        <p:spPr>
+          <a:xfrm>
+            <a:off x="1542405" y="4292862"/>
+            <a:ext cx="1374607" cy="369332"/>
+          </a:xfrm>
+          <a:prstGeom prst="rect">
+            <a:avLst/>
+          </a:prstGeom>
+          <a:noFill/>
+        </p:spPr>
+        <p:txBody>
+          <a:bodyPr wrap="none" rtlCol="0">
+            <a:spAutoFit/>
+          </a:bodyPr>
+          <a:lstStyle/>
+          <a:p>
+            <a:r>
+              <a:rPr lang="en-US" dirty="0" smtClean="0"/>
+              <a:t>Web Sockets</a:t>
+            </a:r>
+            <a:endParaRPr lang="en-US" dirty="0"/>
+          </a:p>
+        </p:txBody>
+      </p:sp>
+      <p:sp>
+        <p:nvSpPr>
+          <p:cNvPr id="14" name="TextBox 13"/>
+          <p:cNvSpPr txBox="1"/>
+          <p:nvPr/>
+        </p:nvSpPr>
+        <p:spPr>
+          <a:xfrm>
+            <a:off x="1489634" y="3923530"/>
+            <a:ext cx="1427378" cy="369332"/>
+          </a:xfrm>
+          <a:prstGeom prst="rect">
+            <a:avLst/>
+          </a:prstGeom>
+          <a:noFill/>
+        </p:spPr>
+        <p:txBody>
+          <a:bodyPr wrap="none" rtlCol="0">
+            <a:spAutoFit/>
+          </a:bodyPr>
+          <a:lstStyle/>
+          <a:p>
+            <a:r>
+              <a:rPr lang="en-US" dirty="0" smtClean="0"/>
+              <a:t>Local Storage</a:t>
+            </a:r>
+            <a:endParaRPr lang="en-US" dirty="0"/>
+          </a:p>
+        </p:txBody>
+      </p:sp>
+      <p:sp>
+        <p:nvSpPr>
+          <p:cNvPr id="19" name="TextBox 18"/>
+          <p:cNvSpPr txBox="1"/>
+          <p:nvPr/>
+        </p:nvSpPr>
+        <p:spPr>
+          <a:xfrm>
+            <a:off x="6213225" y="3923530"/>
+            <a:ext cx="982757" cy="369332"/>
+          </a:xfrm>
+          <a:prstGeom prst="rect">
+            <a:avLst/>
+          </a:prstGeom>
+          <a:noFill/>
+        </p:spPr>
+        <p:txBody>
+          <a:bodyPr wrap="square" rtlCol="0">
+            <a:spAutoFit/>
+          </a:bodyPr>
+          <a:lstStyle/>
+          <a:p>
             <a:r>
               <a:rPr lang="en-US" dirty="0" err="1" smtClean="0"/>
-              <a:t>QUnit</a:t>
+              <a:t>NoSQL</a:t>
             </a:r>
             <a:endParaRPr lang="en-US" dirty="0"/>
           </a:p>
-          <a:p>
-            <a:pPr lvl="1"/>
-            <a:r>
-              <a:rPr lang="en-US" dirty="0" smtClean="0"/>
-              <a:t>Jasmine</a:t>
-            </a:r>
-          </a:p>
-          <a:p>
-            <a:r>
-              <a:rPr lang="en-US" dirty="0" smtClean="0"/>
-              <a:t>Browser Debugging</a:t>
+        </p:txBody>
+      </p:sp>
+      <p:sp>
+        <p:nvSpPr>
+          <p:cNvPr id="20" name="TextBox 19"/>
+          <p:cNvSpPr txBox="1"/>
+          <p:nvPr/>
+        </p:nvSpPr>
+        <p:spPr>
+          <a:xfrm>
+            <a:off x="6213225" y="2815534"/>
+            <a:ext cx="1135157" cy="369332"/>
+          </a:xfrm>
+          <a:prstGeom prst="rect">
+            <a:avLst/>
+          </a:prstGeom>
+          <a:noFill/>
+        </p:spPr>
+        <p:txBody>
+          <a:bodyPr wrap="square" rtlCol="0">
+            <a:spAutoFit/>
+          </a:bodyPr>
+          <a:lstStyle/>
+          <a:p>
+            <a:r>
+              <a:rPr lang="en-US" dirty="0" smtClean="0"/>
+              <a:t>REST APIs</a:t>
             </a:r>
             <a:endParaRPr lang="en-US" dirty="0"/>
           </a:p>
         </p:txBody>
       </p:sp>
+      <p:sp>
+        <p:nvSpPr>
+          <p:cNvPr id="21" name="TextBox 20"/>
+          <p:cNvSpPr txBox="1"/>
+          <p:nvPr/>
+        </p:nvSpPr>
+        <p:spPr>
+          <a:xfrm>
+            <a:off x="6213225" y="3184866"/>
+            <a:ext cx="1165959" cy="369332"/>
+          </a:xfrm>
+          <a:prstGeom prst="rect">
+            <a:avLst/>
+          </a:prstGeom>
+          <a:noFill/>
+        </p:spPr>
+        <p:txBody>
+          <a:bodyPr wrap="square" rtlCol="0">
+            <a:spAutoFit/>
+          </a:bodyPr>
+          <a:lstStyle/>
+          <a:p>
+            <a:r>
+              <a:rPr lang="en-US" dirty="0" smtClean="0"/>
+              <a:t>HATEOAS</a:t>
+            </a:r>
+            <a:endParaRPr lang="en-US" dirty="0"/>
+          </a:p>
+        </p:txBody>
+      </p:sp>
+      <p:sp>
+        <p:nvSpPr>
+          <p:cNvPr id="22" name="TextBox 21"/>
+          <p:cNvSpPr txBox="1"/>
+          <p:nvPr/>
+        </p:nvSpPr>
+        <p:spPr>
+          <a:xfrm>
+            <a:off x="6213225" y="5031526"/>
+            <a:ext cx="982757" cy="369332"/>
+          </a:xfrm>
+          <a:prstGeom prst="rect">
+            <a:avLst/>
+          </a:prstGeom>
+          <a:noFill/>
+        </p:spPr>
+        <p:txBody>
+          <a:bodyPr wrap="square" rtlCol="0">
+            <a:spAutoFit/>
+          </a:bodyPr>
+          <a:lstStyle/>
+          <a:p>
+            <a:r>
+              <a:rPr lang="en-US" dirty="0" smtClean="0"/>
+              <a:t>Node.js</a:t>
+            </a:r>
+            <a:endParaRPr lang="en-US" dirty="0"/>
+          </a:p>
+        </p:txBody>
+      </p:sp>
+      <p:sp>
+        <p:nvSpPr>
+          <p:cNvPr id="23" name="TextBox 22"/>
+          <p:cNvSpPr txBox="1"/>
+          <p:nvPr/>
+        </p:nvSpPr>
+        <p:spPr>
+          <a:xfrm>
+            <a:off x="6213225" y="4292862"/>
+            <a:ext cx="982757" cy="369332"/>
+          </a:xfrm>
+          <a:prstGeom prst="rect">
+            <a:avLst/>
+          </a:prstGeom>
+          <a:noFill/>
+        </p:spPr>
+        <p:txBody>
+          <a:bodyPr wrap="square" rtlCol="0">
+            <a:spAutoFit/>
+          </a:bodyPr>
+          <a:lstStyle/>
+          <a:p>
+            <a:r>
+              <a:rPr lang="en-US" dirty="0" err="1" smtClean="0"/>
+              <a:t>Misultin</a:t>
+            </a:r>
+            <a:endParaRPr lang="en-US" dirty="0"/>
+          </a:p>
+        </p:txBody>
+      </p:sp>
+      <p:sp>
+        <p:nvSpPr>
+          <p:cNvPr id="24" name="TextBox 23"/>
+          <p:cNvSpPr txBox="1"/>
+          <p:nvPr/>
+        </p:nvSpPr>
+        <p:spPr>
+          <a:xfrm>
+            <a:off x="6213225" y="3554198"/>
+            <a:ext cx="1374607" cy="369332"/>
+          </a:xfrm>
+          <a:prstGeom prst="rect">
+            <a:avLst/>
+          </a:prstGeom>
+          <a:noFill/>
+        </p:spPr>
+        <p:txBody>
+          <a:bodyPr wrap="none" rtlCol="0">
+            <a:spAutoFit/>
+          </a:bodyPr>
+          <a:lstStyle/>
+          <a:p>
+            <a:r>
+              <a:rPr lang="en-US" dirty="0" smtClean="0"/>
+              <a:t>Web Sockets</a:t>
+            </a:r>
+            <a:endParaRPr lang="en-US" dirty="0"/>
+          </a:p>
+        </p:txBody>
+      </p:sp>
+      <p:sp>
+        <p:nvSpPr>
+          <p:cNvPr id="25" name="TextBox 24"/>
+          <p:cNvSpPr txBox="1"/>
+          <p:nvPr/>
+        </p:nvSpPr>
+        <p:spPr>
+          <a:xfrm>
+            <a:off x="6213225" y="2076870"/>
+            <a:ext cx="685572" cy="369332"/>
+          </a:xfrm>
+          <a:prstGeom prst="rect">
+            <a:avLst/>
+          </a:prstGeom>
+          <a:noFill/>
+        </p:spPr>
+        <p:txBody>
+          <a:bodyPr wrap="none" rtlCol="0">
+            <a:spAutoFit/>
+          </a:bodyPr>
+          <a:lstStyle/>
+          <a:p>
+            <a:r>
+              <a:rPr lang="en-US" dirty="0" err="1" smtClean="0"/>
+              <a:t>Redis</a:t>
+            </a:r>
+            <a:endParaRPr lang="en-US" dirty="0"/>
+          </a:p>
+        </p:txBody>
+      </p:sp>
+      <p:sp>
+        <p:nvSpPr>
+          <p:cNvPr id="26" name="TextBox 25"/>
+          <p:cNvSpPr txBox="1"/>
+          <p:nvPr/>
+        </p:nvSpPr>
+        <p:spPr>
+          <a:xfrm>
+            <a:off x="6213225" y="4662194"/>
+            <a:ext cx="836639" cy="369332"/>
+          </a:xfrm>
+          <a:prstGeom prst="rect">
+            <a:avLst/>
+          </a:prstGeom>
+          <a:noFill/>
+        </p:spPr>
+        <p:txBody>
+          <a:bodyPr wrap="none" rtlCol="0">
+            <a:spAutoFit/>
+          </a:bodyPr>
+          <a:lstStyle/>
+          <a:p>
+            <a:r>
+              <a:rPr lang="en-US" dirty="0" smtClean="0"/>
+              <a:t>Sinatra</a:t>
+            </a:r>
+            <a:endParaRPr lang="en-US" dirty="0"/>
+          </a:p>
+        </p:txBody>
+      </p:sp>
+      <p:sp>
+        <p:nvSpPr>
+          <p:cNvPr id="27" name="TextBox 26"/>
+          <p:cNvSpPr txBox="1"/>
+          <p:nvPr/>
+        </p:nvSpPr>
+        <p:spPr>
+          <a:xfrm>
+            <a:off x="6213225" y="2446202"/>
+            <a:ext cx="933938" cy="369332"/>
+          </a:xfrm>
+          <a:prstGeom prst="rect">
+            <a:avLst/>
+          </a:prstGeom>
+          <a:noFill/>
+        </p:spPr>
+        <p:txBody>
+          <a:bodyPr wrap="square" rtlCol="0">
+            <a:spAutoFit/>
+          </a:bodyPr>
+          <a:lstStyle/>
+          <a:p>
+            <a:r>
+              <a:rPr lang="en-US" dirty="0" smtClean="0"/>
+              <a:t>OWIN</a:t>
+            </a:r>
+            <a:endParaRPr lang="en-US" dirty="0"/>
+          </a:p>
+        </p:txBody>
+      </p:sp>
+      <p:sp>
+        <p:nvSpPr>
+          <p:cNvPr id="29" name="TextBox 28"/>
+          <p:cNvSpPr txBox="1"/>
+          <p:nvPr/>
+        </p:nvSpPr>
+        <p:spPr>
+          <a:xfrm>
+            <a:off x="1118772" y="6166338"/>
+            <a:ext cx="6845104" cy="369332"/>
+          </a:xfrm>
+          <a:prstGeom prst="rect">
+            <a:avLst/>
+          </a:prstGeom>
+          <a:noFill/>
+        </p:spPr>
+        <p:txBody>
+          <a:bodyPr wrap="square" rtlCol="0">
+            <a:spAutoFit/>
+          </a:bodyPr>
+          <a:lstStyle/>
+          <a:p>
+            <a:r>
+              <a:rPr lang="en-US" dirty="0" smtClean="0"/>
+              <a:t>The past 5 years have been amazing; this only scratches the surface.</a:t>
+            </a:r>
+            <a:endParaRPr lang="en-US" dirty="0"/>
+          </a:p>
+        </p:txBody>
+      </p:sp>
     </p:spTree>
-    <p:extLst>
-      <p:ext uri="{BB962C8B-B14F-4D97-AF65-F5344CB8AC3E}">
-        <p14:creationId xmlns:p14="http://schemas.microsoft.com/office/powerpoint/2010/main" val="2938081467"/>
-      </p:ext>
-    </p:extLst>
   </p:cSld>
   <p:clrMapOvr>
     <a:masterClrMapping/>
@@ -5950,7 +6307,7 @@
           <a:p>
             <a:r>
               <a:rPr lang="en-US" dirty="0" smtClean="0"/>
-              <a:t>Community!</a:t>
+              <a:t>Recent Runtime Improvements</a:t>
             </a:r>
             <a:endParaRPr lang="en-US" dirty="0"/>
           </a:p>
@@ -5968,69 +6325,112 @@
         </p:nvSpPr>
         <p:spPr/>
         <p:txBody>
-          <a:bodyPr/>
-          <a:lstStyle/>
-          <a:p>
-            <a:r>
-              <a:rPr lang="en-US" dirty="0" smtClean="0"/>
-              <a:t>Proliferation of great open source tools</a:t>
+          <a:bodyPr>
+            <a:normAutofit/>
+          </a:bodyPr>
+          <a:lstStyle/>
+          <a:p>
+            <a:r>
+              <a:rPr lang="en-US" dirty="0" smtClean="0"/>
+              <a:t>V8</a:t>
             </a:r>
           </a:p>
           <a:p>
             <a:pPr lvl="1"/>
             <a:r>
-              <a:rPr lang="en-US" dirty="0" smtClean="0"/>
-              <a:t>jQuery</a:t>
-            </a:r>
+              <a:rPr lang="en-US" sz="2400" dirty="0" smtClean="0"/>
+              <a:t>2010 Crankshaft released, 50% performance increase</a:t>
+            </a:r>
+            <a:endParaRPr lang="en-US" dirty="0" smtClean="0"/>
+          </a:p>
+          <a:p>
+            <a:r>
+              <a:rPr lang="en-US" dirty="0" err="1" smtClean="0"/>
+              <a:t>SpiderMonkey</a:t>
+            </a:r>
+            <a:endParaRPr lang="en-US" dirty="0" smtClean="0"/>
           </a:p>
           <a:p>
             <a:pPr lvl="1"/>
             <a:r>
-              <a:rPr lang="en-US" dirty="0" smtClean="0"/>
-              <a:t>Prototype</a:t>
-            </a:r>
-            <a:endParaRPr lang="en-US" dirty="0"/>
+              <a:rPr lang="en-US" sz="2400" dirty="0" smtClean="0"/>
+              <a:t>2009, method-based JIT &amp; tracing JIT</a:t>
+            </a:r>
           </a:p>
           <a:p>
             <a:pPr lvl="1"/>
             <a:r>
-              <a:rPr lang="en-US" dirty="0" smtClean="0"/>
-              <a:t>Underscore…&amp; more</a:t>
-            </a:r>
-          </a:p>
-          <a:p>
-            <a:r>
-              <a:rPr lang="en-US" dirty="0" smtClean="0"/>
-              <a:t>Conferences</a:t>
-            </a:r>
-          </a:p>
-          <a:p>
-            <a:r>
-              <a:rPr lang="en-US" dirty="0" smtClean="0"/>
-              <a:t>Vastly Improved Content</a:t>
+              <a:rPr lang="en-US" sz="2400" dirty="0" smtClean="0"/>
+              <a:t>Used in projects like </a:t>
+            </a:r>
+            <a:r>
+              <a:rPr lang="en-US" sz="2400" dirty="0" err="1" smtClean="0"/>
+              <a:t>Riak</a:t>
+            </a:r>
+            <a:r>
+              <a:rPr lang="en-US" sz="2400" dirty="0" smtClean="0"/>
+              <a:t>, </a:t>
+            </a:r>
+            <a:r>
+              <a:rPr lang="en-US" sz="2400" dirty="0" err="1" smtClean="0"/>
+              <a:t>MongoDB</a:t>
+            </a:r>
+            <a:r>
+              <a:rPr lang="en-US" sz="2400" dirty="0" smtClean="0"/>
+              <a:t>, </a:t>
+            </a:r>
+            <a:r>
+              <a:rPr lang="en-US" sz="2400" dirty="0" err="1" smtClean="0"/>
+              <a:t>CouchDB</a:t>
+            </a:r>
+            <a:endParaRPr lang="en-US" sz="2400" dirty="0" smtClean="0"/>
+          </a:p>
+          <a:p>
+            <a:r>
+              <a:rPr lang="en-US" dirty="0" smtClean="0"/>
+              <a:t>Chakra (IE9)</a:t>
             </a:r>
           </a:p>
           <a:p>
             <a:pPr lvl="1"/>
             <a:r>
+              <a:rPr lang="en-US" sz="2400" dirty="0" smtClean="0"/>
+              <a:t>Uses separate CPU core to JIT</a:t>
+            </a:r>
+          </a:p>
+          <a:p>
+            <a:pPr lvl="1"/>
+            <a:r>
               <a:rPr lang="en-US" sz="2400" i="1" dirty="0" smtClean="0"/>
-              <a:t>W3Schools is no longer the top hit on Google</a:t>
-            </a:r>
-            <a:endParaRPr lang="en-US" i="1" dirty="0" smtClean="0"/>
-          </a:p>
-          <a:p>
-            <a:r>
-              <a:rPr lang="en-US" dirty="0" smtClean="0"/>
-              <a:t>Openness and Enthusiasm</a:t>
-            </a:r>
-            <a:endParaRPr lang="en-US" dirty="0"/>
+              <a:t>Claimed</a:t>
+            </a:r>
+            <a:r>
+              <a:rPr lang="en-US" sz="2400" dirty="0" smtClean="0"/>
+              <a:t> to be faster than Chrome, Firefox, Safari &amp; Opera</a:t>
+            </a:r>
+          </a:p>
+          <a:p>
+            <a:pPr lvl="1"/>
+            <a:r>
+              <a:rPr lang="en-US" sz="2400" dirty="0" smtClean="0"/>
+              <a:t>It’s at least evenly matched (according to ZDNet) – </a:t>
+            </a:r>
+            <a:r>
+              <a:rPr lang="en-US" sz="2400" i="1" dirty="0" smtClean="0"/>
+              <a:t>finally</a:t>
+            </a:r>
+            <a:r>
+              <a:rPr lang="en-US" sz="2400" dirty="0" smtClean="0"/>
+              <a:t>.</a:t>
+            </a:r>
+            <a:endParaRPr lang="en-US" sz="2400" dirty="0"/>
           </a:p>
         </p:txBody>
       </p:sp>
     </p:spTree>
     <p:extLst>
       <p:ext uri="{BB962C8B-B14F-4D97-AF65-F5344CB8AC3E}">
-        <p14:creationId xmlns:p14="http://schemas.microsoft.com/office/powerpoint/2010/main" val="2588365543"/>
+        <p14:creationId xmlns:p14="http://schemas.microsoft.com/office/powerpoint/2010/main" xmlns="" val="451477600"/>
       </p:ext>
     </p:extLst>
   </p:cSld>
@@ -6040,7 +6440,7 @@
   <p:timing>
     <p:tnLst>
       <p:par>
-        <p:cTn xmlns:p14="http://schemas.microsoft.com/office/powerpoint/2010/main" id="1" dur="indefinite" restart="never" nodeType="tmRoot"/>
+        <p:cTn id="1" dur="indefinite" restart="never" nodeType="tmRoot"/>
       </p:par>
     </p:tnLst>
   </p:timing>
@@ -6048,6 +6448,295 @@
 </file>
 
 <file path=ppt/slides/slide7.xml><?xml version="1.0" encoding="utf-8"?>
+<p:sld xmlns:a="http://schemas.openxmlformats.org/drawingml/2006/main" xmlns:r="http://schemas.openxmlformats.org/officeDocument/2006/relationships" xmlns:p="http://schemas.openxmlformats.org/presentationml/2006/main">
+  <p:cSld>
+    <p:spTree>
+      <p:nvGrpSpPr>
+        <p:cNvPr id="1" name=""/>
+        <p:cNvGrpSpPr/>
+        <p:nvPr/>
+      </p:nvGrpSpPr>
+      <p:grpSpPr>
+        <a:xfrm>
+          <a:off x="0" y="0"/>
+          <a:ext cx="0" cy="0"/>
+          <a:chOff x="0" y="0"/>
+          <a:chExt cx="0" cy="0"/>
+        </a:xfrm>
+      </p:grpSpPr>
+      <p:sp>
+        <p:nvSpPr>
+          <p:cNvPr id="2" name="Title 1"/>
+          <p:cNvSpPr>
+            <a:spLocks noGrp="1"/>
+          </p:cNvSpPr>
+          <p:nvPr>
+            <p:ph type="title"/>
+          </p:nvPr>
+        </p:nvSpPr>
+        <p:spPr/>
+        <p:txBody>
+          <a:bodyPr/>
+          <a:lstStyle/>
+          <a:p>
+            <a:r>
+              <a:rPr lang="en-US" dirty="0" smtClean="0"/>
+              <a:t>Richer Environment</a:t>
+            </a:r>
+            <a:endParaRPr lang="en-US" dirty="0"/>
+          </a:p>
+        </p:txBody>
+      </p:sp>
+      <p:sp>
+        <p:nvSpPr>
+          <p:cNvPr id="3" name="Content Placeholder 2"/>
+          <p:cNvSpPr>
+            <a:spLocks noGrp="1"/>
+          </p:cNvSpPr>
+          <p:nvPr>
+            <p:ph idx="1"/>
+          </p:nvPr>
+        </p:nvSpPr>
+        <p:spPr/>
+        <p:txBody>
+          <a:bodyPr>
+            <a:normAutofit fontScale="92500" lnSpcReduction="20000"/>
+          </a:bodyPr>
+          <a:lstStyle/>
+          <a:p>
+            <a:r>
+              <a:rPr lang="en-US" dirty="0" smtClean="0"/>
+              <a:t>IDEs</a:t>
+            </a:r>
+          </a:p>
+          <a:p>
+            <a:pPr lvl="1"/>
+            <a:r>
+              <a:rPr lang="en-US" dirty="0" err="1" smtClean="0"/>
+              <a:t>JsFiddle</a:t>
+            </a:r>
+            <a:endParaRPr lang="en-US" dirty="0" smtClean="0"/>
+          </a:p>
+          <a:p>
+            <a:pPr lvl="1"/>
+            <a:r>
+              <a:rPr lang="en-US" dirty="0" err="1" smtClean="0"/>
+              <a:t>WebStorm</a:t>
+            </a:r>
+            <a:r>
+              <a:rPr lang="en-US" dirty="0" smtClean="0"/>
+              <a:t> / </a:t>
+            </a:r>
+            <a:r>
+              <a:rPr lang="en-US" dirty="0" err="1" smtClean="0"/>
+              <a:t>RubyMine</a:t>
+            </a:r>
+            <a:endParaRPr lang="en-US" dirty="0" smtClean="0"/>
+          </a:p>
+          <a:p>
+            <a:r>
+              <a:rPr lang="en-US" dirty="0" smtClean="0"/>
+              <a:t>Cross-compiling / Transcoders</a:t>
+            </a:r>
+          </a:p>
+          <a:p>
+            <a:pPr lvl="1"/>
+            <a:r>
+              <a:rPr lang="en-US" dirty="0" err="1" smtClean="0"/>
+              <a:t>CoffeeScript</a:t>
+            </a:r>
+            <a:endParaRPr lang="en-US" dirty="0" smtClean="0"/>
+          </a:p>
+          <a:p>
+            <a:pPr lvl="1"/>
+            <a:r>
+              <a:rPr lang="en-US" dirty="0" smtClean="0"/>
+              <a:t>Script# (</a:t>
+            </a:r>
+            <a:r>
+              <a:rPr lang="en-US" dirty="0" err="1" smtClean="0"/>
+              <a:t>lulz</a:t>
+            </a:r>
+            <a:r>
+              <a:rPr lang="en-US" dirty="0" smtClean="0"/>
+              <a:t>)</a:t>
+            </a:r>
+          </a:p>
+          <a:p>
+            <a:r>
+              <a:rPr lang="en-US" dirty="0" smtClean="0"/>
+              <a:t>Unit test frameworks</a:t>
+            </a:r>
+          </a:p>
+          <a:p>
+            <a:pPr lvl="1"/>
+            <a:r>
+              <a:rPr lang="en-US" dirty="0" err="1" smtClean="0"/>
+              <a:t>QUnit</a:t>
+            </a:r>
+            <a:endParaRPr lang="en-US" dirty="0"/>
+          </a:p>
+          <a:p>
+            <a:pPr lvl="1"/>
+            <a:r>
+              <a:rPr lang="en-US" dirty="0" smtClean="0"/>
+              <a:t>Jasmine</a:t>
+            </a:r>
+          </a:p>
+          <a:p>
+            <a:r>
+              <a:rPr lang="en-US" dirty="0" smtClean="0"/>
+              <a:t>Browser Debugging</a:t>
+            </a:r>
+            <a:endParaRPr lang="en-US" dirty="0"/>
+          </a:p>
+        </p:txBody>
+      </p:sp>
+    </p:spTree>
+    <p:extLst>
+      <p:ext uri="{BB962C8B-B14F-4D97-AF65-F5344CB8AC3E}">
+        <p14:creationId xmlns:p14="http://schemas.microsoft.com/office/powerpoint/2010/main" xmlns="" val="2938081467"/>
+      </p:ext>
+    </p:extLst>
+  </p:cSld>
+  <p:clrMapOvr>
+    <a:masterClrMapping/>
+  </p:clrMapOvr>
+</p:sld>
+</file>
+
+<file path=ppt/slides/slide8.xml><?xml version="1.0" encoding="utf-8"?>
+<p:sld xmlns:a="http://schemas.openxmlformats.org/drawingml/2006/main" xmlns:r="http://schemas.openxmlformats.org/officeDocument/2006/relationships" xmlns:p="http://schemas.openxmlformats.org/presentationml/2006/main">
+  <p:cSld>
+    <p:spTree>
+      <p:nvGrpSpPr>
+        <p:cNvPr id="1" name=""/>
+        <p:cNvGrpSpPr/>
+        <p:nvPr/>
+      </p:nvGrpSpPr>
+      <p:grpSpPr>
+        <a:xfrm>
+          <a:off x="0" y="0"/>
+          <a:ext cx="0" cy="0"/>
+          <a:chOff x="0" y="0"/>
+          <a:chExt cx="0" cy="0"/>
+        </a:xfrm>
+      </p:grpSpPr>
+      <p:sp>
+        <p:nvSpPr>
+          <p:cNvPr id="2" name="Title 1"/>
+          <p:cNvSpPr>
+            <a:spLocks noGrp="1"/>
+          </p:cNvSpPr>
+          <p:nvPr>
+            <p:ph type="title"/>
+          </p:nvPr>
+        </p:nvSpPr>
+        <p:spPr/>
+        <p:txBody>
+          <a:bodyPr/>
+          <a:lstStyle/>
+          <a:p>
+            <a:r>
+              <a:rPr lang="en-US" dirty="0" smtClean="0"/>
+              <a:t>Community!</a:t>
+            </a:r>
+            <a:endParaRPr lang="en-US" dirty="0"/>
+          </a:p>
+        </p:txBody>
+      </p:sp>
+      <p:sp>
+        <p:nvSpPr>
+          <p:cNvPr id="3" name="Content Placeholder 2"/>
+          <p:cNvSpPr>
+            <a:spLocks noGrp="1"/>
+          </p:cNvSpPr>
+          <p:nvPr>
+            <p:ph idx="1"/>
+          </p:nvPr>
+        </p:nvSpPr>
+        <p:spPr/>
+        <p:txBody>
+          <a:bodyPr/>
+          <a:lstStyle/>
+          <a:p>
+            <a:r>
+              <a:rPr lang="en-US" dirty="0" smtClean="0"/>
+              <a:t>Proliferation of great open source tools</a:t>
+            </a:r>
+          </a:p>
+          <a:p>
+            <a:pPr lvl="1"/>
+            <a:r>
+              <a:rPr lang="en-US" dirty="0" smtClean="0"/>
+              <a:t>jQuery</a:t>
+            </a:r>
+          </a:p>
+          <a:p>
+            <a:pPr lvl="1"/>
+            <a:r>
+              <a:rPr lang="en-US" dirty="0" smtClean="0"/>
+              <a:t>Prototype</a:t>
+            </a:r>
+            <a:endParaRPr lang="en-US" dirty="0"/>
+          </a:p>
+          <a:p>
+            <a:pPr lvl="1"/>
+            <a:r>
+              <a:rPr lang="en-US" dirty="0" smtClean="0"/>
+              <a:t>Underscore…&amp; more</a:t>
+            </a:r>
+          </a:p>
+          <a:p>
+            <a:r>
+              <a:rPr lang="en-US" dirty="0" smtClean="0"/>
+              <a:t>Conferences</a:t>
+            </a:r>
+          </a:p>
+          <a:p>
+            <a:r>
+              <a:rPr lang="en-US" dirty="0" smtClean="0"/>
+              <a:t>Vastly Improved Content</a:t>
+            </a:r>
+          </a:p>
+          <a:p>
+            <a:pPr lvl="1"/>
+            <a:r>
+              <a:rPr lang="en-US" sz="2400" i="1" dirty="0" smtClean="0"/>
+              <a:t>W3Schools is no longer the top hit on Google</a:t>
+            </a:r>
+            <a:endParaRPr lang="en-US" i="1" dirty="0" smtClean="0"/>
+          </a:p>
+          <a:p>
+            <a:r>
+              <a:rPr lang="en-US" dirty="0" smtClean="0"/>
+              <a:t>Openness and Enthusiasm</a:t>
+            </a:r>
+            <a:endParaRPr lang="en-US" dirty="0"/>
+          </a:p>
+        </p:txBody>
+      </p:sp>
+    </p:spTree>
+    <p:extLst>
+      <p:ext uri="{BB962C8B-B14F-4D97-AF65-F5344CB8AC3E}">
+        <p14:creationId xmlns:p14="http://schemas.microsoft.com/office/powerpoint/2010/main" xmlns="" val="2588365543"/>
+      </p:ext>
+    </p:extLst>
+  </p:cSld>
+  <p:clrMapOvr>
+    <a:masterClrMapping/>
+  </p:clrMapOvr>
+  <p:timing>
+    <p:tnLst>
+      <p:par>
+        <p:cTn id="1" dur="indefinite" restart="never" nodeType="tmRoot"/>
+      </p:par>
+    </p:tnLst>
+  </p:timing>
+</p:sld>
+</file>
+
+<file path=ppt/slides/slide9.xml><?xml version="1.0" encoding="utf-8"?>
 <p:sld xmlns:a="http://schemas.openxmlformats.org/drawingml/2006/main" xmlns:r="http://schemas.openxmlformats.org/officeDocument/2006/relationships" xmlns:p="http://schemas.openxmlformats.org/presentationml/2006/main">
   <p:cSld>
     <p:spTree>
@@ -6517,17 +7206,17 @@
           </a:prstGeom>
         </p:spPr>
         <p:style>
-          <a:lnRef idx="1">
-            <a:schemeClr val="accent1"/>
+          <a:lnRef idx="2">
+            <a:schemeClr val="dk1"/>
           </a:lnRef>
-          <a:fillRef idx="3">
-            <a:schemeClr val="accent1"/>
+          <a:fillRef idx="1">
+            <a:schemeClr val="lt1"/>
           </a:fillRef>
-          <a:effectRef idx="2">
-            <a:schemeClr val="accent1"/>
+          <a:effectRef idx="0">
+            <a:schemeClr val="dk1"/>
           </a:effectRef>
           <a:fontRef idx="minor">
-            <a:schemeClr val="lt1"/>
+            <a:schemeClr val="dk1"/>
           </a:fontRef>
         </p:style>
         <p:txBody>
@@ -6664,18 +7353,16 @@
         </p:spPr>
         <p:style>
           <a:lnRef idx="2">
-            <a:schemeClr val="accent3">
-              <a:shade val="50000"/>
-            </a:schemeClr>
+            <a:schemeClr val="dk1"/>
           </a:lnRef>
           <a:fillRef idx="1">
-            <a:schemeClr val="accent3"/>
+            <a:schemeClr val="lt1"/>
           </a:fillRef>
           <a:effectRef idx="0">
-            <a:schemeClr val="accent3"/>
+            <a:schemeClr val="dk1"/>
           </a:effectRef>
           <a:fontRef idx="minor">
-            <a:schemeClr val="lt1"/>
+            <a:schemeClr val="dk1"/>
           </a:fontRef>
         </p:style>
         <p:txBody>
@@ -6702,7 +7389,7 @@
     </p:spTree>
     <p:extLst>
       <p:ext uri="{BB962C8B-B14F-4D97-AF65-F5344CB8AC3E}">
-        <p14:creationId xmlns:p14="http://schemas.microsoft.com/office/powerpoint/2010/main" val="3493061952"/>
+        <p14:creationId xmlns:p14="http://schemas.microsoft.com/office/powerpoint/2010/main" xmlns="" val="3493061952"/>
       </p:ext>
     </p:extLst>
   </p:cSld>
@@ -6712,7 +7399,7 @@
   <p:timing>
     <p:tnLst>
       <p:par>
-        <p:cTn xmlns:p14="http://schemas.microsoft.com/office/powerpoint/2010/main" id="1" dur="indefinite" restart="never" nodeType="tmRoot">
+        <p:cTn id="1" dur="indefinite" restart="never" nodeType="tmRoot">
           <p:childTnLst>
             <p:seq concurrent="1" nextAc="seek">
               <p:cTn id="2" dur="indefinite" nodeType="mainSeq">
@@ -6878,214 +7565,6 @@
       <p:bldP spid="29" grpId="0"/>
       <p:bldP spid="30" grpId="0"/>
     </p:bldLst>
-  </p:timing>
-</p:sld>
-</file>
-
-<file path=ppt/slides/slide8.xml><?xml version="1.0" encoding="utf-8"?>
-<p:sld xmlns:a="http://schemas.openxmlformats.org/drawingml/2006/main" xmlns:r="http://schemas.openxmlformats.org/officeDocument/2006/relationships" xmlns:p="http://schemas.openxmlformats.org/presentationml/2006/main">
-  <p:cSld>
-    <p:spTree>
-      <p:nvGrpSpPr>
-        <p:cNvPr id="1" name=""/>
-        <p:cNvGrpSpPr/>
-        <p:nvPr/>
-      </p:nvGrpSpPr>
-      <p:grpSpPr>
-        <a:xfrm>
-          <a:off x="0" y="0"/>
-          <a:ext cx="0" cy="0"/>
-          <a:chOff x="0" y="0"/>
-          <a:chExt cx="0" cy="0"/>
-        </a:xfrm>
-      </p:grpSpPr>
-      <p:sp>
-        <p:nvSpPr>
-          <p:cNvPr id="2" name="Title 1"/>
-          <p:cNvSpPr>
-            <a:spLocks noGrp="1"/>
-          </p:cNvSpPr>
-          <p:nvPr>
-            <p:ph type="title"/>
-          </p:nvPr>
-        </p:nvSpPr>
-        <p:spPr/>
-        <p:txBody>
-          <a:bodyPr/>
-          <a:lstStyle/>
-          <a:p>
-            <a:r>
-              <a:rPr lang="en-US" dirty="0" smtClean="0"/>
-              <a:t>SproutCore puts it this way:</a:t>
-            </a:r>
-            <a:endParaRPr lang="en-US" dirty="0"/>
-          </a:p>
-        </p:txBody>
-      </p:sp>
-      <p:pic>
-        <p:nvPicPr>
-          <p:cNvPr id="4" name="Picture 3"/>
-          <p:cNvPicPr>
-            <a:picLocks noChangeAspect="1"/>
-          </p:cNvPicPr>
-          <p:nvPr/>
-        </p:nvPicPr>
-        <p:blipFill>
-          <a:blip r:embed="rId2"/>
-          <a:stretch>
-            <a:fillRect/>
-          </a:stretch>
-        </p:blipFill>
-        <p:spPr>
-          <a:xfrm>
-            <a:off x="2197100" y="1816100"/>
-            <a:ext cx="4737100" cy="3225800"/>
-          </a:xfrm>
-          <a:prstGeom prst="rect">
-            <a:avLst/>
-          </a:prstGeom>
-        </p:spPr>
-      </p:pic>
-    </p:spTree>
-    <p:extLst>
-      <p:ext uri="{BB962C8B-B14F-4D97-AF65-F5344CB8AC3E}">
-        <p14:creationId xmlns:p14="http://schemas.microsoft.com/office/powerpoint/2010/main" val="458374057"/>
-      </p:ext>
-    </p:extLst>
-  </p:cSld>
-  <p:clrMapOvr>
-    <a:masterClrMapping/>
-  </p:clrMapOvr>
-  <p:timing>
-    <p:tnLst>
-      <p:par>
-        <p:cTn xmlns:p14="http://schemas.microsoft.com/office/powerpoint/2010/main" id="1" dur="indefinite" restart="never" nodeType="tmRoot"/>
-      </p:par>
-    </p:tnLst>
-  </p:timing>
-</p:sld>
-</file>
-
-<file path=ppt/slides/slide9.xml><?xml version="1.0" encoding="utf-8"?>
-<p:sld xmlns:a="http://schemas.openxmlformats.org/drawingml/2006/main" xmlns:r="http://schemas.openxmlformats.org/officeDocument/2006/relationships" xmlns:p="http://schemas.openxmlformats.org/presentationml/2006/main">
-  <p:cSld>
-    <p:spTree>
-      <p:nvGrpSpPr>
-        <p:cNvPr id="1" name=""/>
-        <p:cNvGrpSpPr/>
-        <p:nvPr/>
-      </p:nvGrpSpPr>
-      <p:grpSpPr>
-        <a:xfrm>
-          <a:off x="0" y="0"/>
-          <a:ext cx="0" cy="0"/>
-          <a:chOff x="0" y="0"/>
-          <a:chExt cx="0" cy="0"/>
-        </a:xfrm>
-      </p:grpSpPr>
-      <p:sp>
-        <p:nvSpPr>
-          <p:cNvPr id="2" name="Title 1"/>
-          <p:cNvSpPr>
-            <a:spLocks noGrp="1"/>
-          </p:cNvSpPr>
-          <p:nvPr>
-            <p:ph type="title"/>
-          </p:nvPr>
-        </p:nvSpPr>
-        <p:spPr/>
-        <p:txBody>
-          <a:bodyPr>
-            <a:normAutofit/>
-          </a:bodyPr>
-          <a:lstStyle/>
-          <a:p>
-            <a:r>
-              <a:rPr lang="en-US" dirty="0" smtClean="0"/>
-              <a:t>SproutCore’s prediction: true?</a:t>
-            </a:r>
-            <a:endParaRPr lang="en-US" dirty="0"/>
-          </a:p>
-        </p:txBody>
-      </p:sp>
-      <p:pic>
-        <p:nvPicPr>
-          <p:cNvPr id="4" name="Picture 3"/>
-          <p:cNvPicPr>
-            <a:picLocks noChangeAspect="1"/>
-          </p:cNvPicPr>
-          <p:nvPr/>
-        </p:nvPicPr>
-        <p:blipFill>
-          <a:blip r:embed="rId2"/>
-          <a:stretch>
-            <a:fillRect/>
-          </a:stretch>
-        </p:blipFill>
-        <p:spPr>
-          <a:xfrm>
-            <a:off x="2197100" y="1803400"/>
-            <a:ext cx="4737100" cy="3238500"/>
-          </a:xfrm>
-          <a:prstGeom prst="rect">
-            <a:avLst/>
-          </a:prstGeom>
-        </p:spPr>
-      </p:pic>
-      <p:sp>
-        <p:nvSpPr>
-          <p:cNvPr id="5" name="TextBox 4"/>
-          <p:cNvSpPr txBox="1"/>
-          <p:nvPr/>
-        </p:nvSpPr>
-        <p:spPr>
-          <a:xfrm>
-            <a:off x="331663" y="5557589"/>
-            <a:ext cx="8355137" cy="584776"/>
-          </a:xfrm>
-          <a:prstGeom prst="rect">
-            <a:avLst/>
-          </a:prstGeom>
-          <a:noFill/>
-        </p:spPr>
-        <p:txBody>
-          <a:bodyPr wrap="square" rtlCol="0">
-            <a:spAutoFit/>
-          </a:bodyPr>
-          <a:lstStyle/>
-          <a:p>
-            <a:pPr algn="ctr"/>
-            <a:r>
-              <a:rPr lang="en-US" dirty="0" smtClean="0"/>
-              <a:t>* We’re not saying that server-focused web apps are going away…entirely</a:t>
-            </a:r>
-          </a:p>
-          <a:p>
-            <a:pPr algn="ctr"/>
-            <a:r>
-              <a:rPr lang="en-US" sz="1400" i="1" dirty="0" smtClean="0"/>
-              <a:t>** Also, no server-side apps were harmed in the making of this presentation….</a:t>
-            </a:r>
-            <a:endParaRPr lang="en-US" i="1" dirty="0"/>
-          </a:p>
-        </p:txBody>
-      </p:sp>
-    </p:spTree>
-    <p:extLst>
-      <p:ext uri="{BB962C8B-B14F-4D97-AF65-F5344CB8AC3E}">
-        <p14:creationId xmlns:p14="http://schemas.microsoft.com/office/powerpoint/2010/main" val="64137391"/>
-      </p:ext>
-    </p:extLst>
-  </p:cSld>
-  <p:clrMapOvr>
-    <a:masterClrMapping/>
-  </p:clrMapOvr>
-  <p:timing>
-    <p:tnLst>
-      <p:par>
-        <p:cTn xmlns:p14="http://schemas.microsoft.com/office/powerpoint/2010/main" id="1" dur="indefinite" restart="never" nodeType="tmRoot"/>
-      </p:par>
-    </p:tnLst>
   </p:timing>
 </p:sld>
 </file>

</xml_diff>